<commit_message>
graph degree, path, cycle, connect
</commit_message>
<xml_diff>
--- a/graph/graph.pptx
+++ b/graph/graph.pptx
@@ -5,12 +5,16 @@
     <p:sldMasterId id="2147483648" r:id="rId1"/>
   </p:sldMasterIdLst>
   <p:notesMasterIdLst>
-    <p:notesMasterId r:id="rId5"/>
+    <p:notesMasterId r:id="rId9"/>
   </p:notesMasterIdLst>
   <p:sldIdLst>
     <p:sldId id="256" r:id="rId2"/>
-    <p:sldId id="257" r:id="rId3"/>
+    <p:sldId id="261" r:id="rId3"/>
     <p:sldId id="258" r:id="rId4"/>
+    <p:sldId id="260" r:id="rId5"/>
+    <p:sldId id="262" r:id="rId6"/>
+    <p:sldId id="263" r:id="rId7"/>
+    <p:sldId id="264" r:id="rId8"/>
   </p:sldIdLst>
   <p:sldSz cx="12192000" cy="6858000"/>
   <p:notesSz cx="6858000" cy="9144000"/>
@@ -199,7 +203,7 @@
           <a:p>
             <a:fld id="{EF89B589-35CB-4095-89F3-CBA9C3D5C94E}" type="datetimeFigureOut">
               <a:rPr lang="ko-KR" altLang="en-US" smtClean="0"/>
-              <a:t>2022-03-15 Tue요일</a:t>
+              <a:t>2022-03-16 Wed요일</a:t>
             </a:fld>
             <a:endParaRPr lang="ko-KR" altLang="en-US"/>
           </a:p>
@@ -613,7 +617,7 @@
           <a:p>
             <a:fld id="{3F5DACAA-BDF7-41DD-B2E5-E4E78D96A16D}" type="datetimeFigureOut">
               <a:rPr lang="ko-KR" altLang="en-US" smtClean="0"/>
-              <a:t>2022-03-15 Tue요일</a:t>
+              <a:t>2022-03-16 Wed요일</a:t>
             </a:fld>
             <a:endParaRPr lang="ko-KR" altLang="en-US"/>
           </a:p>
@@ -811,7 +815,7 @@
           <a:p>
             <a:fld id="{3F5DACAA-BDF7-41DD-B2E5-E4E78D96A16D}" type="datetimeFigureOut">
               <a:rPr lang="ko-KR" altLang="en-US" smtClean="0"/>
-              <a:t>2022-03-15 Tue요일</a:t>
+              <a:t>2022-03-16 Wed요일</a:t>
             </a:fld>
             <a:endParaRPr lang="ko-KR" altLang="en-US"/>
           </a:p>
@@ -1019,7 +1023,7 @@
           <a:p>
             <a:fld id="{3F5DACAA-BDF7-41DD-B2E5-E4E78D96A16D}" type="datetimeFigureOut">
               <a:rPr lang="ko-KR" altLang="en-US" smtClean="0"/>
-              <a:t>2022-03-15 Tue요일</a:t>
+              <a:t>2022-03-16 Wed요일</a:t>
             </a:fld>
             <a:endParaRPr lang="ko-KR" altLang="en-US"/>
           </a:p>
@@ -1217,7 +1221,7 @@
           <a:p>
             <a:fld id="{3F5DACAA-BDF7-41DD-B2E5-E4E78D96A16D}" type="datetimeFigureOut">
               <a:rPr lang="ko-KR" altLang="en-US" smtClean="0"/>
-              <a:t>2022-03-15 Tue요일</a:t>
+              <a:t>2022-03-16 Wed요일</a:t>
             </a:fld>
             <a:endParaRPr lang="ko-KR" altLang="en-US"/>
           </a:p>
@@ -1492,7 +1496,7 @@
           <a:p>
             <a:fld id="{3F5DACAA-BDF7-41DD-B2E5-E4E78D96A16D}" type="datetimeFigureOut">
               <a:rPr lang="ko-KR" altLang="en-US" smtClean="0"/>
-              <a:t>2022-03-15 Tue요일</a:t>
+              <a:t>2022-03-16 Wed요일</a:t>
             </a:fld>
             <a:endParaRPr lang="ko-KR" altLang="en-US"/>
           </a:p>
@@ -1757,7 +1761,7 @@
           <a:p>
             <a:fld id="{3F5DACAA-BDF7-41DD-B2E5-E4E78D96A16D}" type="datetimeFigureOut">
               <a:rPr lang="ko-KR" altLang="en-US" smtClean="0"/>
-              <a:t>2022-03-15 Tue요일</a:t>
+              <a:t>2022-03-16 Wed요일</a:t>
             </a:fld>
             <a:endParaRPr lang="ko-KR" altLang="en-US"/>
           </a:p>
@@ -2169,7 +2173,7 @@
           <a:p>
             <a:fld id="{3F5DACAA-BDF7-41DD-B2E5-E4E78D96A16D}" type="datetimeFigureOut">
               <a:rPr lang="ko-KR" altLang="en-US" smtClean="0"/>
-              <a:t>2022-03-15 Tue요일</a:t>
+              <a:t>2022-03-16 Wed요일</a:t>
             </a:fld>
             <a:endParaRPr lang="ko-KR" altLang="en-US"/>
           </a:p>
@@ -2310,7 +2314,7 @@
           <a:p>
             <a:fld id="{3F5DACAA-BDF7-41DD-B2E5-E4E78D96A16D}" type="datetimeFigureOut">
               <a:rPr lang="ko-KR" altLang="en-US" smtClean="0"/>
-              <a:t>2022-03-15 Tue요일</a:t>
+              <a:t>2022-03-16 Wed요일</a:t>
             </a:fld>
             <a:endParaRPr lang="ko-KR" altLang="en-US"/>
           </a:p>
@@ -2423,7 +2427,7 @@
           <a:p>
             <a:fld id="{3F5DACAA-BDF7-41DD-B2E5-E4E78D96A16D}" type="datetimeFigureOut">
               <a:rPr lang="ko-KR" altLang="en-US" smtClean="0"/>
-              <a:t>2022-03-15 Tue요일</a:t>
+              <a:t>2022-03-16 Wed요일</a:t>
             </a:fld>
             <a:endParaRPr lang="ko-KR" altLang="en-US"/>
           </a:p>
@@ -2734,7 +2738,7 @@
           <a:p>
             <a:fld id="{3F5DACAA-BDF7-41DD-B2E5-E4E78D96A16D}" type="datetimeFigureOut">
               <a:rPr lang="ko-KR" altLang="en-US" smtClean="0"/>
-              <a:t>2022-03-15 Tue요일</a:t>
+              <a:t>2022-03-16 Wed요일</a:t>
             </a:fld>
             <a:endParaRPr lang="ko-KR" altLang="en-US"/>
           </a:p>
@@ -3022,7 +3026,7 @@
           <a:p>
             <a:fld id="{3F5DACAA-BDF7-41DD-B2E5-E4E78D96A16D}" type="datetimeFigureOut">
               <a:rPr lang="ko-KR" altLang="en-US" smtClean="0"/>
-              <a:t>2022-03-15 Tue요일</a:t>
+              <a:t>2022-03-16 Wed요일</a:t>
             </a:fld>
             <a:endParaRPr lang="ko-KR" altLang="en-US"/>
           </a:p>
@@ -3263,7 +3267,7 @@
           <a:p>
             <a:fld id="{3F5DACAA-BDF7-41DD-B2E5-E4E78D96A16D}" type="datetimeFigureOut">
               <a:rPr lang="ko-KR" altLang="en-US" smtClean="0"/>
-              <a:t>2022-03-15 Tue요일</a:t>
+              <a:t>2022-03-16 Wed요일</a:t>
             </a:fld>
             <a:endParaRPr lang="ko-KR" altLang="en-US"/>
           </a:p>
@@ -5331,7 +5335,7 @@
         </p:nvCxnSpPr>
         <p:spPr>
           <a:xfrm>
-            <a:off x="2361253" y="1147741"/>
+            <a:off x="2333544" y="1932832"/>
             <a:ext cx="1671706" cy="0"/>
           </a:xfrm>
           <a:prstGeom prst="line">
@@ -5371,7 +5375,7 @@
         </p:nvCxnSpPr>
         <p:spPr>
           <a:xfrm>
-            <a:off x="2361253" y="3282478"/>
+            <a:off x="2333544" y="4067569"/>
             <a:ext cx="1671706" cy="0"/>
           </a:xfrm>
           <a:prstGeom prst="line">
@@ -5411,7 +5415,7 @@
         </p:nvCxnSpPr>
         <p:spPr>
           <a:xfrm>
-            <a:off x="4379323" y="1480250"/>
+            <a:off x="4351614" y="2265341"/>
             <a:ext cx="0" cy="1469719"/>
           </a:xfrm>
           <a:prstGeom prst="line">
@@ -5451,7 +5455,7 @@
         </p:nvCxnSpPr>
         <p:spPr>
           <a:xfrm flipV="1">
-            <a:off x="2259805" y="1382860"/>
+            <a:off x="2232096" y="2167951"/>
             <a:ext cx="1874602" cy="1664499"/>
           </a:xfrm>
           <a:prstGeom prst="line">
@@ -5487,7 +5491,7 @@
         </p:nvSpPr>
         <p:spPr>
           <a:xfrm>
-            <a:off x="1964236" y="4255468"/>
+            <a:off x="1936527" y="5040559"/>
             <a:ext cx="2465740" cy="523220"/>
           </a:xfrm>
           <a:prstGeom prst="rect">
@@ -5526,7 +5530,7 @@
         </p:nvSpPr>
         <p:spPr>
           <a:xfrm>
-            <a:off x="1668525" y="815232"/>
+            <a:off x="1640816" y="1600323"/>
             <a:ext cx="692728" cy="665018"/>
           </a:xfrm>
           <a:prstGeom prst="ellipse">
@@ -5590,7 +5594,7 @@
         </p:nvSpPr>
         <p:spPr>
           <a:xfrm>
-            <a:off x="4032959" y="815232"/>
+            <a:off x="4005250" y="1600323"/>
             <a:ext cx="692728" cy="665018"/>
           </a:xfrm>
           <a:prstGeom prst="ellipse">
@@ -5654,7 +5658,7 @@
         </p:nvSpPr>
         <p:spPr>
           <a:xfrm>
-            <a:off x="4032959" y="2949969"/>
+            <a:off x="4005250" y="3735060"/>
             <a:ext cx="692728" cy="665018"/>
           </a:xfrm>
           <a:prstGeom prst="ellipse">
@@ -5718,7 +5722,7 @@
         </p:nvSpPr>
         <p:spPr>
           <a:xfrm>
-            <a:off x="1668525" y="2949969"/>
+            <a:off x="1640816" y="3735060"/>
             <a:ext cx="692728" cy="665018"/>
           </a:xfrm>
           <a:prstGeom prst="ellipse">
@@ -5782,7 +5786,7 @@
         </p:nvSpPr>
         <p:spPr>
           <a:xfrm>
-            <a:off x="1345405" y="350901"/>
+            <a:off x="1317696" y="1135992"/>
             <a:ext cx="914400" cy="914400"/>
           </a:xfrm>
           <a:prstGeom prst="arc">
@@ -5833,7 +5837,7 @@
         </p:nvCxnSpPr>
         <p:spPr>
           <a:xfrm>
-            <a:off x="8347484" y="1147741"/>
+            <a:off x="8319775" y="1932832"/>
             <a:ext cx="1671706" cy="0"/>
           </a:xfrm>
           <a:prstGeom prst="line">
@@ -5876,7 +5880,7 @@
         </p:nvCxnSpPr>
         <p:spPr>
           <a:xfrm>
-            <a:off x="8347484" y="3282478"/>
+            <a:off x="8319775" y="4067569"/>
             <a:ext cx="1671706" cy="0"/>
           </a:xfrm>
           <a:prstGeom prst="line">
@@ -5920,7 +5924,7 @@
         </p:nvCxnSpPr>
         <p:spPr>
           <a:xfrm>
-            <a:off x="10365554" y="1480250"/>
+            <a:off x="10337845" y="2265341"/>
             <a:ext cx="0" cy="1469719"/>
           </a:xfrm>
           <a:prstGeom prst="line">
@@ -5963,7 +5967,7 @@
         </p:nvCxnSpPr>
         <p:spPr>
           <a:xfrm flipV="1">
-            <a:off x="8246036" y="1382860"/>
+            <a:off x="8218327" y="2167951"/>
             <a:ext cx="1874602" cy="1664499"/>
           </a:xfrm>
           <a:prstGeom prst="line">
@@ -6003,7 +6007,7 @@
         </p:nvSpPr>
         <p:spPr>
           <a:xfrm>
-            <a:off x="8110887" y="4255468"/>
+            <a:off x="8083178" y="5040559"/>
             <a:ext cx="2106667" cy="523220"/>
           </a:xfrm>
           <a:prstGeom prst="rect">
@@ -6038,7 +6042,7 @@
         </p:nvSpPr>
         <p:spPr>
           <a:xfrm>
-            <a:off x="7654756" y="815232"/>
+            <a:off x="7627047" y="1600323"/>
             <a:ext cx="692728" cy="665018"/>
           </a:xfrm>
           <a:prstGeom prst="ellipse">
@@ -6102,7 +6106,7 @@
         </p:nvSpPr>
         <p:spPr>
           <a:xfrm>
-            <a:off x="10019190" y="815232"/>
+            <a:off x="9991481" y="1600323"/>
             <a:ext cx="692728" cy="665018"/>
           </a:xfrm>
           <a:prstGeom prst="ellipse">
@@ -6166,7 +6170,7 @@
         </p:nvSpPr>
         <p:spPr>
           <a:xfrm>
-            <a:off x="10019190" y="2949969"/>
+            <a:off x="9991481" y="3735060"/>
             <a:ext cx="692728" cy="665018"/>
           </a:xfrm>
           <a:prstGeom prst="ellipse">
@@ -6230,7 +6234,7 @@
         </p:nvSpPr>
         <p:spPr>
           <a:xfrm>
-            <a:off x="7654756" y="2949969"/>
+            <a:off x="7627047" y="3735060"/>
             <a:ext cx="692728" cy="665018"/>
           </a:xfrm>
           <a:prstGeom prst="ellipse">
@@ -6294,7 +6298,7 @@
         </p:nvSpPr>
         <p:spPr>
           <a:xfrm>
-            <a:off x="7331636" y="350901"/>
+            <a:off x="7303927" y="1135992"/>
             <a:ext cx="914400" cy="914400"/>
           </a:xfrm>
           <a:prstGeom prst="arc">
@@ -6331,110 +6335,10 @@
           </a:p>
         </p:txBody>
       </p:sp>
-      <p:sp>
-        <p:nvSpPr>
-          <p:cNvPr id="71" name="TextBox 70">
-            <a:extLst>
-              <a:ext uri="{FF2B5EF4-FFF2-40B4-BE49-F238E27FC236}">
-                <a16:creationId xmlns:a16="http://schemas.microsoft.com/office/drawing/2014/main" id="{A2B8BDFC-ACF0-4559-B361-8BD1F573354B}"/>
-              </a:ext>
-            </a:extLst>
-          </p:cNvPr>
-          <p:cNvSpPr txBox="1"/>
-          <p:nvPr/>
-        </p:nvSpPr>
-        <p:spPr>
-          <a:xfrm>
-            <a:off x="2749137" y="5350270"/>
-            <a:ext cx="8584401" cy="1384995"/>
-          </a:xfrm>
-          <a:prstGeom prst="rect">
-            <a:avLst/>
-          </a:prstGeom>
-          <a:noFill/>
-        </p:spPr>
-        <p:txBody>
-          <a:bodyPr wrap="none" rtlCol="0">
-            <a:spAutoFit/>
-          </a:bodyPr>
-          <a:lstStyle/>
-          <a:p>
-            <a:r>
-              <a:rPr lang="ko-KR" altLang="en-US" sz="2800" dirty="0"/>
-              <a:t>두 그래프 모두 정점 </a:t>
-            </a:r>
-            <a:r>
-              <a:rPr lang="en-US" altLang="ko-KR" sz="2800" dirty="0"/>
-              <a:t>2</a:t>
-            </a:r>
-            <a:r>
-              <a:rPr lang="ko-KR" altLang="en-US" sz="2800" dirty="0"/>
-              <a:t>는 </a:t>
-            </a:r>
-            <a:r>
-              <a:rPr lang="en-US" altLang="ko-KR" sz="2800" dirty="0"/>
-              <a:t>1</a:t>
-            </a:r>
-            <a:r>
-              <a:rPr lang="ko-KR" altLang="en-US" sz="2800" dirty="0"/>
-              <a:t>에 인접한다</a:t>
-            </a:r>
-            <a:r>
-              <a:rPr lang="en-US" altLang="ko-KR" sz="2800" dirty="0"/>
-              <a:t>.</a:t>
-            </a:r>
-          </a:p>
-          <a:p>
-            <a:r>
-              <a:rPr lang="ko-KR" altLang="en-US" sz="2800" dirty="0"/>
-              <a:t>그러나 방향 그래프에서는 간선</a:t>
-            </a:r>
-            <a:r>
-              <a:rPr lang="en-US" altLang="ko-KR" sz="2800" dirty="0"/>
-              <a:t>(2, 1)</a:t>
-            </a:r>
-            <a:r>
-              <a:rPr lang="ko-KR" altLang="en-US" sz="2800" dirty="0"/>
-              <a:t>이 없기 때문에 </a:t>
-            </a:r>
-            <a:endParaRPr lang="en-US" altLang="ko-KR" sz="2800" dirty="0"/>
-          </a:p>
-          <a:p>
-            <a:r>
-              <a:rPr lang="ko-KR" altLang="en-US" sz="2800" dirty="0"/>
-              <a:t>정점 </a:t>
-            </a:r>
-            <a:r>
-              <a:rPr lang="en-US" altLang="ko-KR" sz="2800" dirty="0"/>
-              <a:t>1</a:t>
-            </a:r>
-            <a:r>
-              <a:rPr lang="ko-KR" altLang="en-US" sz="2800" dirty="0"/>
-              <a:t>은 정점 </a:t>
-            </a:r>
-            <a:r>
-              <a:rPr lang="en-US" altLang="ko-KR" sz="2800" dirty="0"/>
-              <a:t>2</a:t>
-            </a:r>
-            <a:r>
-              <a:rPr lang="ko-KR" altLang="en-US" sz="2800" dirty="0"/>
-              <a:t>에 인접하지 않는다</a:t>
-            </a:r>
-            <a:r>
-              <a:rPr lang="en-US" altLang="ko-KR" sz="2800" dirty="0"/>
-              <a:t>.</a:t>
-            </a:r>
-            <a:r>
-              <a:rPr lang="ko-KR" altLang="en-US" sz="2800" dirty="0"/>
-              <a:t> </a:t>
-            </a:r>
-          </a:p>
-        </p:txBody>
-      </p:sp>
     </p:spTree>
     <p:extLst>
       <p:ext uri="{BB962C8B-B14F-4D97-AF65-F5344CB8AC3E}">
-        <p14:creationId xmlns:p14="http://schemas.microsoft.com/office/powerpoint/2010/main" val="2627237510"/>
+        <p14:creationId xmlns:p14="http://schemas.microsoft.com/office/powerpoint/2010/main" val="3645566001"/>
       </p:ext>
     </p:extLst>
   </p:cSld>
@@ -6715,6 +6619,3829 @@
     <p:extLst>
       <p:ext uri="{BB962C8B-B14F-4D97-AF65-F5344CB8AC3E}">
         <p14:creationId xmlns:p14="http://schemas.microsoft.com/office/powerpoint/2010/main" val="1674037862"/>
+      </p:ext>
+    </p:extLst>
+  </p:cSld>
+  <p:clrMapOvr>
+    <a:masterClrMapping/>
+  </p:clrMapOvr>
+</p:sld>
+</file>
+
+<file path=ppt/slides/slide4.xml><?xml version="1.0" encoding="utf-8"?>
+<p:sld xmlns:a="http://schemas.openxmlformats.org/drawingml/2006/main" xmlns:r="http://schemas.openxmlformats.org/officeDocument/2006/relationships" xmlns:p="http://schemas.openxmlformats.org/presentationml/2006/main">
+  <p:cSld>
+    <p:spTree>
+      <p:nvGrpSpPr>
+        <p:cNvPr id="1" name=""/>
+        <p:cNvGrpSpPr/>
+        <p:nvPr/>
+      </p:nvGrpSpPr>
+      <p:grpSpPr>
+        <a:xfrm>
+          <a:off x="0" y="0"/>
+          <a:ext cx="0" cy="0"/>
+          <a:chOff x="0" y="0"/>
+          <a:chExt cx="0" cy="0"/>
+        </a:xfrm>
+      </p:grpSpPr>
+      <p:cxnSp>
+        <p:nvCxnSpPr>
+          <p:cNvPr id="24" name="직선 연결선 23">
+            <a:extLst>
+              <a:ext uri="{FF2B5EF4-FFF2-40B4-BE49-F238E27FC236}">
+                <a16:creationId xmlns:a16="http://schemas.microsoft.com/office/drawing/2014/main" id="{174B7BB4-0285-4194-852E-1F2CB28878E9}"/>
+              </a:ext>
+            </a:extLst>
+          </p:cNvPr>
+          <p:cNvCxnSpPr>
+            <a:cxnSpLocks/>
+            <a:stCxn id="40" idx="6"/>
+            <a:endCxn id="42" idx="2"/>
+          </p:cNvCxnSpPr>
+          <p:nvPr/>
+        </p:nvCxnSpPr>
+        <p:spPr>
+          <a:xfrm>
+            <a:off x="2333544" y="1932832"/>
+            <a:ext cx="1671706" cy="0"/>
+          </a:xfrm>
+          <a:prstGeom prst="line">
+            <a:avLst/>
+          </a:prstGeom>
+        </p:spPr>
+        <p:style>
+          <a:lnRef idx="1">
+            <a:schemeClr val="dk1"/>
+          </a:lnRef>
+          <a:fillRef idx="0">
+            <a:schemeClr val="dk1"/>
+          </a:fillRef>
+          <a:effectRef idx="0">
+            <a:schemeClr val="dk1"/>
+          </a:effectRef>
+          <a:fontRef idx="minor">
+            <a:schemeClr val="tx1"/>
+          </a:fontRef>
+        </p:style>
+      </p:cxnSp>
+      <p:cxnSp>
+        <p:nvCxnSpPr>
+          <p:cNvPr id="27" name="직선 연결선 26">
+            <a:extLst>
+              <a:ext uri="{FF2B5EF4-FFF2-40B4-BE49-F238E27FC236}">
+                <a16:creationId xmlns:a16="http://schemas.microsoft.com/office/drawing/2014/main" id="{396C7BDC-EE35-487D-B2FC-FB32D097E6BB}"/>
+              </a:ext>
+            </a:extLst>
+          </p:cNvPr>
+          <p:cNvCxnSpPr>
+            <a:cxnSpLocks/>
+            <a:stCxn id="45" idx="6"/>
+            <a:endCxn id="44" idx="2"/>
+          </p:cNvCxnSpPr>
+          <p:nvPr/>
+        </p:nvCxnSpPr>
+        <p:spPr>
+          <a:xfrm>
+            <a:off x="2333544" y="4067569"/>
+            <a:ext cx="1671706" cy="0"/>
+          </a:xfrm>
+          <a:prstGeom prst="line">
+            <a:avLst/>
+          </a:prstGeom>
+        </p:spPr>
+        <p:style>
+          <a:lnRef idx="1">
+            <a:schemeClr val="dk1"/>
+          </a:lnRef>
+          <a:fillRef idx="0">
+            <a:schemeClr val="dk1"/>
+          </a:fillRef>
+          <a:effectRef idx="0">
+            <a:schemeClr val="dk1"/>
+          </a:effectRef>
+          <a:fontRef idx="minor">
+            <a:schemeClr val="tx1"/>
+          </a:fontRef>
+        </p:style>
+      </p:cxnSp>
+      <p:cxnSp>
+        <p:nvCxnSpPr>
+          <p:cNvPr id="29" name="직선 연결선 28">
+            <a:extLst>
+              <a:ext uri="{FF2B5EF4-FFF2-40B4-BE49-F238E27FC236}">
+                <a16:creationId xmlns:a16="http://schemas.microsoft.com/office/drawing/2014/main" id="{407A26B2-7C10-439B-8B22-9D7566C02835}"/>
+              </a:ext>
+            </a:extLst>
+          </p:cNvPr>
+          <p:cNvCxnSpPr>
+            <a:cxnSpLocks/>
+            <a:stCxn id="42" idx="4"/>
+            <a:endCxn id="44" idx="0"/>
+          </p:cNvCxnSpPr>
+          <p:nvPr/>
+        </p:nvCxnSpPr>
+        <p:spPr>
+          <a:xfrm>
+            <a:off x="4351614" y="2265341"/>
+            <a:ext cx="0" cy="1469719"/>
+          </a:xfrm>
+          <a:prstGeom prst="line">
+            <a:avLst/>
+          </a:prstGeom>
+        </p:spPr>
+        <p:style>
+          <a:lnRef idx="1">
+            <a:schemeClr val="dk1"/>
+          </a:lnRef>
+          <a:fillRef idx="0">
+            <a:schemeClr val="dk1"/>
+          </a:fillRef>
+          <a:effectRef idx="0">
+            <a:schemeClr val="dk1"/>
+          </a:effectRef>
+          <a:fontRef idx="minor">
+            <a:schemeClr val="tx1"/>
+          </a:fontRef>
+        </p:style>
+      </p:cxnSp>
+      <p:cxnSp>
+        <p:nvCxnSpPr>
+          <p:cNvPr id="31" name="직선 연결선 30">
+            <a:extLst>
+              <a:ext uri="{FF2B5EF4-FFF2-40B4-BE49-F238E27FC236}">
+                <a16:creationId xmlns:a16="http://schemas.microsoft.com/office/drawing/2014/main" id="{233583B9-D36C-42C5-8E41-C1476F68ADE0}"/>
+              </a:ext>
+            </a:extLst>
+          </p:cNvPr>
+          <p:cNvCxnSpPr>
+            <a:cxnSpLocks/>
+            <a:stCxn id="45" idx="7"/>
+            <a:endCxn id="42" idx="3"/>
+          </p:cNvCxnSpPr>
+          <p:nvPr/>
+        </p:nvCxnSpPr>
+        <p:spPr>
+          <a:xfrm flipV="1">
+            <a:off x="2232096" y="2167951"/>
+            <a:ext cx="1874602" cy="1664499"/>
+          </a:xfrm>
+          <a:prstGeom prst="line">
+            <a:avLst/>
+          </a:prstGeom>
+        </p:spPr>
+        <p:style>
+          <a:lnRef idx="1">
+            <a:schemeClr val="dk1"/>
+          </a:lnRef>
+          <a:fillRef idx="0">
+            <a:schemeClr val="dk1"/>
+          </a:fillRef>
+          <a:effectRef idx="0">
+            <a:schemeClr val="dk1"/>
+          </a:effectRef>
+          <a:fontRef idx="minor">
+            <a:schemeClr val="tx1"/>
+          </a:fontRef>
+        </p:style>
+      </p:cxnSp>
+      <p:sp>
+        <p:nvSpPr>
+          <p:cNvPr id="61" name="TextBox 60">
+            <a:extLst>
+              <a:ext uri="{FF2B5EF4-FFF2-40B4-BE49-F238E27FC236}">
+                <a16:creationId xmlns:a16="http://schemas.microsoft.com/office/drawing/2014/main" id="{09008758-47DF-4A32-A25F-AB98F1E83CA5}"/>
+              </a:ext>
+            </a:extLst>
+          </p:cNvPr>
+          <p:cNvSpPr txBox="1"/>
+          <p:nvPr/>
+        </p:nvSpPr>
+        <p:spPr>
+          <a:xfrm>
+            <a:off x="1936527" y="5040559"/>
+            <a:ext cx="2465740" cy="523220"/>
+          </a:xfrm>
+          <a:prstGeom prst="rect">
+            <a:avLst/>
+          </a:prstGeom>
+          <a:noFill/>
+        </p:spPr>
+        <p:txBody>
+          <a:bodyPr wrap="none" rtlCol="0">
+            <a:spAutoFit/>
+          </a:bodyPr>
+          <a:lstStyle/>
+          <a:p>
+            <a:r>
+              <a:rPr lang="ko-KR" altLang="en-US" sz="2800" dirty="0" err="1"/>
+              <a:t>무방향</a:t>
+            </a:r>
+            <a:r>
+              <a:rPr lang="ko-KR" altLang="en-US" sz="2800" dirty="0"/>
+              <a:t> 그래프</a:t>
+            </a:r>
+          </a:p>
+        </p:txBody>
+      </p:sp>
+      <p:sp>
+        <p:nvSpPr>
+          <p:cNvPr id="40" name="타원 39">
+            <a:extLst>
+              <a:ext uri="{FF2B5EF4-FFF2-40B4-BE49-F238E27FC236}">
+                <a16:creationId xmlns:a16="http://schemas.microsoft.com/office/drawing/2014/main" id="{59AA9F5B-F545-4DAD-9781-41EE9AD8B901}"/>
+              </a:ext>
+            </a:extLst>
+          </p:cNvPr>
+          <p:cNvSpPr/>
+          <p:nvPr/>
+        </p:nvSpPr>
+        <p:spPr>
+          <a:xfrm>
+            <a:off x="1640816" y="1600323"/>
+            <a:ext cx="692728" cy="665018"/>
+          </a:xfrm>
+          <a:prstGeom prst="ellipse">
+            <a:avLst/>
+          </a:prstGeom>
+          <a:noFill/>
+          <a:ln>
+            <a:solidFill>
+              <a:schemeClr val="tx1"/>
+            </a:solidFill>
+          </a:ln>
+        </p:spPr>
+        <p:style>
+          <a:lnRef idx="2">
+            <a:schemeClr val="accent1">
+              <a:shade val="50000"/>
+            </a:schemeClr>
+          </a:lnRef>
+          <a:fillRef idx="1">
+            <a:schemeClr val="accent1"/>
+          </a:fillRef>
+          <a:effectRef idx="0">
+            <a:schemeClr val="accent1"/>
+          </a:effectRef>
+          <a:fontRef idx="minor">
+            <a:schemeClr val="lt1"/>
+          </a:fontRef>
+        </p:style>
+        <p:txBody>
+          <a:bodyPr rtlCol="0" anchor="ctr"/>
+          <a:lstStyle/>
+          <a:p>
+            <a:pPr algn="ctr"/>
+            <a:r>
+              <a:rPr lang="en-US" altLang="ko-KR" sz="2800" dirty="0">
+                <a:solidFill>
+                  <a:schemeClr val="tx1"/>
+                </a:solidFill>
+              </a:rPr>
+              <a:t>1</a:t>
+            </a:r>
+            <a:endParaRPr lang="ko-KR" altLang="en-US" sz="2800" dirty="0">
+              <a:solidFill>
+                <a:schemeClr val="tx1"/>
+              </a:solidFill>
+            </a:endParaRPr>
+          </a:p>
+        </p:txBody>
+      </p:sp>
+      <p:sp>
+        <p:nvSpPr>
+          <p:cNvPr id="42" name="타원 41">
+            <a:extLst>
+              <a:ext uri="{FF2B5EF4-FFF2-40B4-BE49-F238E27FC236}">
+                <a16:creationId xmlns:a16="http://schemas.microsoft.com/office/drawing/2014/main" id="{2DACC6EA-123A-4502-A000-728E19B371FF}"/>
+              </a:ext>
+            </a:extLst>
+          </p:cNvPr>
+          <p:cNvSpPr/>
+          <p:nvPr/>
+        </p:nvSpPr>
+        <p:spPr>
+          <a:xfrm>
+            <a:off x="4005250" y="1600323"/>
+            <a:ext cx="692728" cy="665018"/>
+          </a:xfrm>
+          <a:prstGeom prst="ellipse">
+            <a:avLst/>
+          </a:prstGeom>
+          <a:noFill/>
+          <a:ln>
+            <a:solidFill>
+              <a:schemeClr val="tx1"/>
+            </a:solidFill>
+          </a:ln>
+        </p:spPr>
+        <p:style>
+          <a:lnRef idx="2">
+            <a:schemeClr val="accent1">
+              <a:shade val="50000"/>
+            </a:schemeClr>
+          </a:lnRef>
+          <a:fillRef idx="1">
+            <a:schemeClr val="accent1"/>
+          </a:fillRef>
+          <a:effectRef idx="0">
+            <a:schemeClr val="accent1"/>
+          </a:effectRef>
+          <a:fontRef idx="minor">
+            <a:schemeClr val="lt1"/>
+          </a:fontRef>
+        </p:style>
+        <p:txBody>
+          <a:bodyPr rtlCol="0" anchor="ctr"/>
+          <a:lstStyle/>
+          <a:p>
+            <a:pPr algn="ctr"/>
+            <a:r>
+              <a:rPr lang="en-US" altLang="ko-KR" sz="2800" dirty="0">
+                <a:solidFill>
+                  <a:schemeClr val="tx1"/>
+                </a:solidFill>
+              </a:rPr>
+              <a:t>2</a:t>
+            </a:r>
+            <a:endParaRPr lang="ko-KR" altLang="en-US" sz="2800" dirty="0">
+              <a:solidFill>
+                <a:schemeClr val="tx1"/>
+              </a:solidFill>
+            </a:endParaRPr>
+          </a:p>
+        </p:txBody>
+      </p:sp>
+      <p:sp>
+        <p:nvSpPr>
+          <p:cNvPr id="44" name="타원 43">
+            <a:extLst>
+              <a:ext uri="{FF2B5EF4-FFF2-40B4-BE49-F238E27FC236}">
+                <a16:creationId xmlns:a16="http://schemas.microsoft.com/office/drawing/2014/main" id="{FA83D091-BF1A-4C8A-ACFA-6D6B3D103CCC}"/>
+              </a:ext>
+            </a:extLst>
+          </p:cNvPr>
+          <p:cNvSpPr/>
+          <p:nvPr/>
+        </p:nvSpPr>
+        <p:spPr>
+          <a:xfrm>
+            <a:off x="4005250" y="3735060"/>
+            <a:ext cx="692728" cy="665018"/>
+          </a:xfrm>
+          <a:prstGeom prst="ellipse">
+            <a:avLst/>
+          </a:prstGeom>
+          <a:noFill/>
+          <a:ln>
+            <a:solidFill>
+              <a:schemeClr val="tx1"/>
+            </a:solidFill>
+          </a:ln>
+        </p:spPr>
+        <p:style>
+          <a:lnRef idx="2">
+            <a:schemeClr val="accent1">
+              <a:shade val="50000"/>
+            </a:schemeClr>
+          </a:lnRef>
+          <a:fillRef idx="1">
+            <a:schemeClr val="accent1"/>
+          </a:fillRef>
+          <a:effectRef idx="0">
+            <a:schemeClr val="accent1"/>
+          </a:effectRef>
+          <a:fontRef idx="minor">
+            <a:schemeClr val="lt1"/>
+          </a:fontRef>
+        </p:style>
+        <p:txBody>
+          <a:bodyPr rtlCol="0" anchor="ctr"/>
+          <a:lstStyle/>
+          <a:p>
+            <a:pPr algn="ctr"/>
+            <a:r>
+              <a:rPr lang="en-US" altLang="ko-KR" sz="2800" dirty="0">
+                <a:solidFill>
+                  <a:schemeClr val="tx1"/>
+                </a:solidFill>
+              </a:rPr>
+              <a:t>3</a:t>
+            </a:r>
+            <a:endParaRPr lang="ko-KR" altLang="en-US" sz="2800" dirty="0">
+              <a:solidFill>
+                <a:schemeClr val="tx1"/>
+              </a:solidFill>
+            </a:endParaRPr>
+          </a:p>
+        </p:txBody>
+      </p:sp>
+      <p:sp>
+        <p:nvSpPr>
+          <p:cNvPr id="45" name="타원 44">
+            <a:extLst>
+              <a:ext uri="{FF2B5EF4-FFF2-40B4-BE49-F238E27FC236}">
+                <a16:creationId xmlns:a16="http://schemas.microsoft.com/office/drawing/2014/main" id="{563D74F2-4303-49E1-8509-1DEFDE0B1B5B}"/>
+              </a:ext>
+            </a:extLst>
+          </p:cNvPr>
+          <p:cNvSpPr/>
+          <p:nvPr/>
+        </p:nvSpPr>
+        <p:spPr>
+          <a:xfrm>
+            <a:off x="1640816" y="3735060"/>
+            <a:ext cx="692728" cy="665018"/>
+          </a:xfrm>
+          <a:prstGeom prst="ellipse">
+            <a:avLst/>
+          </a:prstGeom>
+          <a:noFill/>
+          <a:ln>
+            <a:solidFill>
+              <a:schemeClr val="tx1"/>
+            </a:solidFill>
+          </a:ln>
+        </p:spPr>
+        <p:style>
+          <a:lnRef idx="2">
+            <a:schemeClr val="accent1">
+              <a:shade val="50000"/>
+            </a:schemeClr>
+          </a:lnRef>
+          <a:fillRef idx="1">
+            <a:schemeClr val="accent1"/>
+          </a:fillRef>
+          <a:effectRef idx="0">
+            <a:schemeClr val="accent1"/>
+          </a:effectRef>
+          <a:fontRef idx="minor">
+            <a:schemeClr val="lt1"/>
+          </a:fontRef>
+        </p:style>
+        <p:txBody>
+          <a:bodyPr rtlCol="0" anchor="ctr"/>
+          <a:lstStyle/>
+          <a:p>
+            <a:pPr algn="ctr"/>
+            <a:r>
+              <a:rPr lang="en-US" altLang="ko-KR" sz="2800" dirty="0">
+                <a:solidFill>
+                  <a:schemeClr val="tx1"/>
+                </a:solidFill>
+              </a:rPr>
+              <a:t>4</a:t>
+            </a:r>
+            <a:endParaRPr lang="ko-KR" altLang="en-US" sz="2800" dirty="0">
+              <a:solidFill>
+                <a:schemeClr val="tx1"/>
+              </a:solidFill>
+            </a:endParaRPr>
+          </a:p>
+        </p:txBody>
+      </p:sp>
+      <p:sp>
+        <p:nvSpPr>
+          <p:cNvPr id="54" name="원호 53">
+            <a:extLst>
+              <a:ext uri="{FF2B5EF4-FFF2-40B4-BE49-F238E27FC236}">
+                <a16:creationId xmlns:a16="http://schemas.microsoft.com/office/drawing/2014/main" id="{E5C06815-E4F9-4683-A3D4-80CBF456E4DC}"/>
+              </a:ext>
+            </a:extLst>
+          </p:cNvPr>
+          <p:cNvSpPr/>
+          <p:nvPr/>
+        </p:nvSpPr>
+        <p:spPr>
+          <a:xfrm>
+            <a:off x="1317696" y="1135992"/>
+            <a:ext cx="914400" cy="914400"/>
+          </a:xfrm>
+          <a:prstGeom prst="arc">
+            <a:avLst>
+              <a:gd name="adj1" fmla="val 6357855"/>
+              <a:gd name="adj2" fmla="val 597034"/>
+            </a:avLst>
+          </a:prstGeom>
+        </p:spPr>
+        <p:style>
+          <a:lnRef idx="1">
+            <a:schemeClr val="dk1"/>
+          </a:lnRef>
+          <a:fillRef idx="0">
+            <a:schemeClr val="dk1"/>
+          </a:fillRef>
+          <a:effectRef idx="0">
+            <a:schemeClr val="dk1"/>
+          </a:effectRef>
+          <a:fontRef idx="minor">
+            <a:schemeClr val="tx1"/>
+          </a:fontRef>
+        </p:style>
+        <p:txBody>
+          <a:bodyPr rtlCol="0" anchor="ctr"/>
+          <a:lstStyle/>
+          <a:p>
+            <a:pPr algn="ctr"/>
+            <a:endParaRPr lang="ko-KR" altLang="en-US"/>
+          </a:p>
+        </p:txBody>
+      </p:sp>
+      <p:cxnSp>
+        <p:nvCxnSpPr>
+          <p:cNvPr id="58" name="직선 연결선 57">
+            <a:extLst>
+              <a:ext uri="{FF2B5EF4-FFF2-40B4-BE49-F238E27FC236}">
+                <a16:creationId xmlns:a16="http://schemas.microsoft.com/office/drawing/2014/main" id="{7E9069B8-819D-46FD-A2A3-ED244CDD36B9}"/>
+              </a:ext>
+            </a:extLst>
+          </p:cNvPr>
+          <p:cNvCxnSpPr>
+            <a:cxnSpLocks/>
+            <a:stCxn id="66" idx="6"/>
+            <a:endCxn id="67" idx="2"/>
+          </p:cNvCxnSpPr>
+          <p:nvPr/>
+        </p:nvCxnSpPr>
+        <p:spPr>
+          <a:xfrm>
+            <a:off x="8319775" y="1932832"/>
+            <a:ext cx="1671706" cy="0"/>
+          </a:xfrm>
+          <a:prstGeom prst="line">
+            <a:avLst/>
+          </a:prstGeom>
+          <a:ln>
+            <a:tailEnd type="triangle"/>
+          </a:ln>
+        </p:spPr>
+        <p:style>
+          <a:lnRef idx="1">
+            <a:schemeClr val="dk1"/>
+          </a:lnRef>
+          <a:fillRef idx="0">
+            <a:schemeClr val="dk1"/>
+          </a:fillRef>
+          <a:effectRef idx="0">
+            <a:schemeClr val="dk1"/>
+          </a:effectRef>
+          <a:fontRef idx="minor">
+            <a:schemeClr val="tx1"/>
+          </a:fontRef>
+        </p:style>
+      </p:cxnSp>
+      <p:cxnSp>
+        <p:nvCxnSpPr>
+          <p:cNvPr id="59" name="직선 연결선 58">
+            <a:extLst>
+              <a:ext uri="{FF2B5EF4-FFF2-40B4-BE49-F238E27FC236}">
+                <a16:creationId xmlns:a16="http://schemas.microsoft.com/office/drawing/2014/main" id="{FAF223EF-FD0E-4A44-8B05-48AB496E9DB8}"/>
+              </a:ext>
+            </a:extLst>
+          </p:cNvPr>
+          <p:cNvCxnSpPr>
+            <a:cxnSpLocks/>
+            <a:stCxn id="69" idx="6"/>
+            <a:endCxn id="68" idx="2"/>
+          </p:cNvCxnSpPr>
+          <p:nvPr/>
+        </p:nvCxnSpPr>
+        <p:spPr>
+          <a:xfrm>
+            <a:off x="8319775" y="4067569"/>
+            <a:ext cx="1671706" cy="0"/>
+          </a:xfrm>
+          <a:prstGeom prst="line">
+            <a:avLst/>
+          </a:prstGeom>
+          <a:ln>
+            <a:headEnd type="none"/>
+            <a:tailEnd type="triangle"/>
+          </a:ln>
+        </p:spPr>
+        <p:style>
+          <a:lnRef idx="1">
+            <a:schemeClr val="dk1"/>
+          </a:lnRef>
+          <a:fillRef idx="0">
+            <a:schemeClr val="dk1"/>
+          </a:fillRef>
+          <a:effectRef idx="0">
+            <a:schemeClr val="dk1"/>
+          </a:effectRef>
+          <a:fontRef idx="minor">
+            <a:schemeClr val="tx1"/>
+          </a:fontRef>
+        </p:style>
+      </p:cxnSp>
+      <p:cxnSp>
+        <p:nvCxnSpPr>
+          <p:cNvPr id="60" name="직선 연결선 59">
+            <a:extLst>
+              <a:ext uri="{FF2B5EF4-FFF2-40B4-BE49-F238E27FC236}">
+                <a16:creationId xmlns:a16="http://schemas.microsoft.com/office/drawing/2014/main" id="{20C08349-A8F2-4C17-AE39-D8352BC8953E}"/>
+              </a:ext>
+            </a:extLst>
+          </p:cNvPr>
+          <p:cNvCxnSpPr>
+            <a:cxnSpLocks/>
+            <a:stCxn id="67" idx="4"/>
+            <a:endCxn id="68" idx="0"/>
+          </p:cNvCxnSpPr>
+          <p:nvPr/>
+        </p:nvCxnSpPr>
+        <p:spPr>
+          <a:xfrm>
+            <a:off x="10337845" y="2265341"/>
+            <a:ext cx="0" cy="1469719"/>
+          </a:xfrm>
+          <a:prstGeom prst="line">
+            <a:avLst/>
+          </a:prstGeom>
+          <a:ln>
+            <a:headEnd type="triangle"/>
+          </a:ln>
+        </p:spPr>
+        <p:style>
+          <a:lnRef idx="1">
+            <a:schemeClr val="dk1"/>
+          </a:lnRef>
+          <a:fillRef idx="0">
+            <a:schemeClr val="dk1"/>
+          </a:fillRef>
+          <a:effectRef idx="0">
+            <a:schemeClr val="dk1"/>
+          </a:effectRef>
+          <a:fontRef idx="minor">
+            <a:schemeClr val="tx1"/>
+          </a:fontRef>
+        </p:style>
+      </p:cxnSp>
+      <p:cxnSp>
+        <p:nvCxnSpPr>
+          <p:cNvPr id="64" name="직선 연결선 63">
+            <a:extLst>
+              <a:ext uri="{FF2B5EF4-FFF2-40B4-BE49-F238E27FC236}">
+                <a16:creationId xmlns:a16="http://schemas.microsoft.com/office/drawing/2014/main" id="{5916EC80-6EDF-4DB4-89A7-072DA24D73DC}"/>
+              </a:ext>
+            </a:extLst>
+          </p:cNvPr>
+          <p:cNvCxnSpPr>
+            <a:cxnSpLocks/>
+            <a:stCxn id="69" idx="7"/>
+            <a:endCxn id="67" idx="3"/>
+          </p:cNvCxnSpPr>
+          <p:nvPr/>
+        </p:nvCxnSpPr>
+        <p:spPr>
+          <a:xfrm flipV="1">
+            <a:off x="8218327" y="2167951"/>
+            <a:ext cx="1874602" cy="1664499"/>
+          </a:xfrm>
+          <a:prstGeom prst="line">
+            <a:avLst/>
+          </a:prstGeom>
+          <a:ln>
+            <a:headEnd type="triangle"/>
+            <a:tailEnd type="none"/>
+          </a:ln>
+        </p:spPr>
+        <p:style>
+          <a:lnRef idx="1">
+            <a:schemeClr val="dk1"/>
+          </a:lnRef>
+          <a:fillRef idx="0">
+            <a:schemeClr val="dk1"/>
+          </a:fillRef>
+          <a:effectRef idx="0">
+            <a:schemeClr val="dk1"/>
+          </a:effectRef>
+          <a:fontRef idx="minor">
+            <a:schemeClr val="tx1"/>
+          </a:fontRef>
+        </p:style>
+      </p:cxnSp>
+      <p:sp>
+        <p:nvSpPr>
+          <p:cNvPr id="65" name="TextBox 64">
+            <a:extLst>
+              <a:ext uri="{FF2B5EF4-FFF2-40B4-BE49-F238E27FC236}">
+                <a16:creationId xmlns:a16="http://schemas.microsoft.com/office/drawing/2014/main" id="{38BC7381-AACA-48D5-B927-C55779C9E641}"/>
+              </a:ext>
+            </a:extLst>
+          </p:cNvPr>
+          <p:cNvSpPr txBox="1"/>
+          <p:nvPr/>
+        </p:nvSpPr>
+        <p:spPr>
+          <a:xfrm>
+            <a:off x="8083178" y="5040559"/>
+            <a:ext cx="2106667" cy="523220"/>
+          </a:xfrm>
+          <a:prstGeom prst="rect">
+            <a:avLst/>
+          </a:prstGeom>
+          <a:noFill/>
+        </p:spPr>
+        <p:txBody>
+          <a:bodyPr wrap="none" rtlCol="0">
+            <a:spAutoFit/>
+          </a:bodyPr>
+          <a:lstStyle/>
+          <a:p>
+            <a:r>
+              <a:rPr lang="ko-KR" altLang="en-US" sz="2800" dirty="0"/>
+              <a:t>방향 그래프</a:t>
+            </a:r>
+          </a:p>
+        </p:txBody>
+      </p:sp>
+      <p:sp>
+        <p:nvSpPr>
+          <p:cNvPr id="66" name="타원 65">
+            <a:extLst>
+              <a:ext uri="{FF2B5EF4-FFF2-40B4-BE49-F238E27FC236}">
+                <a16:creationId xmlns:a16="http://schemas.microsoft.com/office/drawing/2014/main" id="{ADDA561E-FEB7-45FE-96E3-101952CD9F61}"/>
+              </a:ext>
+            </a:extLst>
+          </p:cNvPr>
+          <p:cNvSpPr/>
+          <p:nvPr/>
+        </p:nvSpPr>
+        <p:spPr>
+          <a:xfrm>
+            <a:off x="7627047" y="1600323"/>
+            <a:ext cx="692728" cy="665018"/>
+          </a:xfrm>
+          <a:prstGeom prst="ellipse">
+            <a:avLst/>
+          </a:prstGeom>
+          <a:noFill/>
+          <a:ln>
+            <a:solidFill>
+              <a:schemeClr val="tx1"/>
+            </a:solidFill>
+          </a:ln>
+        </p:spPr>
+        <p:style>
+          <a:lnRef idx="2">
+            <a:schemeClr val="accent1">
+              <a:shade val="50000"/>
+            </a:schemeClr>
+          </a:lnRef>
+          <a:fillRef idx="1">
+            <a:schemeClr val="accent1"/>
+          </a:fillRef>
+          <a:effectRef idx="0">
+            <a:schemeClr val="accent1"/>
+          </a:effectRef>
+          <a:fontRef idx="minor">
+            <a:schemeClr val="lt1"/>
+          </a:fontRef>
+        </p:style>
+        <p:txBody>
+          <a:bodyPr rtlCol="0" anchor="ctr"/>
+          <a:lstStyle/>
+          <a:p>
+            <a:pPr algn="ctr"/>
+            <a:r>
+              <a:rPr lang="en-US" altLang="ko-KR" sz="2800" dirty="0">
+                <a:solidFill>
+                  <a:schemeClr val="tx1"/>
+                </a:solidFill>
+              </a:rPr>
+              <a:t>1</a:t>
+            </a:r>
+            <a:endParaRPr lang="ko-KR" altLang="en-US" sz="2800" dirty="0">
+              <a:solidFill>
+                <a:schemeClr val="tx1"/>
+              </a:solidFill>
+            </a:endParaRPr>
+          </a:p>
+        </p:txBody>
+      </p:sp>
+      <p:sp>
+        <p:nvSpPr>
+          <p:cNvPr id="67" name="타원 66">
+            <a:extLst>
+              <a:ext uri="{FF2B5EF4-FFF2-40B4-BE49-F238E27FC236}">
+                <a16:creationId xmlns:a16="http://schemas.microsoft.com/office/drawing/2014/main" id="{3027CAA9-4170-4406-A1B0-A6C6C2B92425}"/>
+              </a:ext>
+            </a:extLst>
+          </p:cNvPr>
+          <p:cNvSpPr/>
+          <p:nvPr/>
+        </p:nvSpPr>
+        <p:spPr>
+          <a:xfrm>
+            <a:off x="9991481" y="1600323"/>
+            <a:ext cx="692728" cy="665018"/>
+          </a:xfrm>
+          <a:prstGeom prst="ellipse">
+            <a:avLst/>
+          </a:prstGeom>
+          <a:noFill/>
+          <a:ln>
+            <a:solidFill>
+              <a:schemeClr val="tx1"/>
+            </a:solidFill>
+          </a:ln>
+        </p:spPr>
+        <p:style>
+          <a:lnRef idx="2">
+            <a:schemeClr val="accent1">
+              <a:shade val="50000"/>
+            </a:schemeClr>
+          </a:lnRef>
+          <a:fillRef idx="1">
+            <a:schemeClr val="accent1"/>
+          </a:fillRef>
+          <a:effectRef idx="0">
+            <a:schemeClr val="accent1"/>
+          </a:effectRef>
+          <a:fontRef idx="minor">
+            <a:schemeClr val="lt1"/>
+          </a:fontRef>
+        </p:style>
+        <p:txBody>
+          <a:bodyPr rtlCol="0" anchor="ctr"/>
+          <a:lstStyle/>
+          <a:p>
+            <a:pPr algn="ctr"/>
+            <a:r>
+              <a:rPr lang="en-US" altLang="ko-KR" sz="2800" dirty="0">
+                <a:solidFill>
+                  <a:schemeClr val="tx1"/>
+                </a:solidFill>
+              </a:rPr>
+              <a:t>2</a:t>
+            </a:r>
+            <a:endParaRPr lang="ko-KR" altLang="en-US" sz="2800" dirty="0">
+              <a:solidFill>
+                <a:schemeClr val="tx1"/>
+              </a:solidFill>
+            </a:endParaRPr>
+          </a:p>
+        </p:txBody>
+      </p:sp>
+      <p:sp>
+        <p:nvSpPr>
+          <p:cNvPr id="68" name="타원 67">
+            <a:extLst>
+              <a:ext uri="{FF2B5EF4-FFF2-40B4-BE49-F238E27FC236}">
+                <a16:creationId xmlns:a16="http://schemas.microsoft.com/office/drawing/2014/main" id="{4DF5901F-931B-4F61-B337-5A51226C74AE}"/>
+              </a:ext>
+            </a:extLst>
+          </p:cNvPr>
+          <p:cNvSpPr/>
+          <p:nvPr/>
+        </p:nvSpPr>
+        <p:spPr>
+          <a:xfrm>
+            <a:off x="9991481" y="3735060"/>
+            <a:ext cx="692728" cy="665018"/>
+          </a:xfrm>
+          <a:prstGeom prst="ellipse">
+            <a:avLst/>
+          </a:prstGeom>
+          <a:noFill/>
+          <a:ln>
+            <a:solidFill>
+              <a:schemeClr val="tx1"/>
+            </a:solidFill>
+          </a:ln>
+        </p:spPr>
+        <p:style>
+          <a:lnRef idx="2">
+            <a:schemeClr val="accent1">
+              <a:shade val="50000"/>
+            </a:schemeClr>
+          </a:lnRef>
+          <a:fillRef idx="1">
+            <a:schemeClr val="accent1"/>
+          </a:fillRef>
+          <a:effectRef idx="0">
+            <a:schemeClr val="accent1"/>
+          </a:effectRef>
+          <a:fontRef idx="minor">
+            <a:schemeClr val="lt1"/>
+          </a:fontRef>
+        </p:style>
+        <p:txBody>
+          <a:bodyPr rtlCol="0" anchor="ctr"/>
+          <a:lstStyle/>
+          <a:p>
+            <a:pPr algn="ctr"/>
+            <a:r>
+              <a:rPr lang="en-US" altLang="ko-KR" sz="2800" dirty="0">
+                <a:solidFill>
+                  <a:schemeClr val="tx1"/>
+                </a:solidFill>
+              </a:rPr>
+              <a:t>3</a:t>
+            </a:r>
+            <a:endParaRPr lang="ko-KR" altLang="en-US" sz="2800" dirty="0">
+              <a:solidFill>
+                <a:schemeClr val="tx1"/>
+              </a:solidFill>
+            </a:endParaRPr>
+          </a:p>
+        </p:txBody>
+      </p:sp>
+      <p:sp>
+        <p:nvSpPr>
+          <p:cNvPr id="69" name="타원 68">
+            <a:extLst>
+              <a:ext uri="{FF2B5EF4-FFF2-40B4-BE49-F238E27FC236}">
+                <a16:creationId xmlns:a16="http://schemas.microsoft.com/office/drawing/2014/main" id="{2CC24AC8-CD31-4007-B062-5D8B5D51282E}"/>
+              </a:ext>
+            </a:extLst>
+          </p:cNvPr>
+          <p:cNvSpPr/>
+          <p:nvPr/>
+        </p:nvSpPr>
+        <p:spPr>
+          <a:xfrm>
+            <a:off x="7627047" y="3735060"/>
+            <a:ext cx="692728" cy="665018"/>
+          </a:xfrm>
+          <a:prstGeom prst="ellipse">
+            <a:avLst/>
+          </a:prstGeom>
+          <a:noFill/>
+          <a:ln>
+            <a:solidFill>
+              <a:schemeClr val="tx1"/>
+            </a:solidFill>
+          </a:ln>
+        </p:spPr>
+        <p:style>
+          <a:lnRef idx="2">
+            <a:schemeClr val="accent1">
+              <a:shade val="50000"/>
+            </a:schemeClr>
+          </a:lnRef>
+          <a:fillRef idx="1">
+            <a:schemeClr val="accent1"/>
+          </a:fillRef>
+          <a:effectRef idx="0">
+            <a:schemeClr val="accent1"/>
+          </a:effectRef>
+          <a:fontRef idx="minor">
+            <a:schemeClr val="lt1"/>
+          </a:fontRef>
+        </p:style>
+        <p:txBody>
+          <a:bodyPr rtlCol="0" anchor="ctr"/>
+          <a:lstStyle/>
+          <a:p>
+            <a:pPr algn="ctr"/>
+            <a:r>
+              <a:rPr lang="en-US" altLang="ko-KR" sz="2800" dirty="0">
+                <a:solidFill>
+                  <a:schemeClr val="tx1"/>
+                </a:solidFill>
+              </a:rPr>
+              <a:t>4</a:t>
+            </a:r>
+            <a:endParaRPr lang="ko-KR" altLang="en-US" sz="2800" dirty="0">
+              <a:solidFill>
+                <a:schemeClr val="tx1"/>
+              </a:solidFill>
+            </a:endParaRPr>
+          </a:p>
+        </p:txBody>
+      </p:sp>
+      <p:sp>
+        <p:nvSpPr>
+          <p:cNvPr id="70" name="원호 69">
+            <a:extLst>
+              <a:ext uri="{FF2B5EF4-FFF2-40B4-BE49-F238E27FC236}">
+                <a16:creationId xmlns:a16="http://schemas.microsoft.com/office/drawing/2014/main" id="{87BE5BC2-0077-424F-B763-CA2FC5E59E2C}"/>
+              </a:ext>
+            </a:extLst>
+          </p:cNvPr>
+          <p:cNvSpPr/>
+          <p:nvPr/>
+        </p:nvSpPr>
+        <p:spPr>
+          <a:xfrm>
+            <a:off x="7303927" y="1135992"/>
+            <a:ext cx="914400" cy="914400"/>
+          </a:xfrm>
+          <a:prstGeom prst="arc">
+            <a:avLst>
+              <a:gd name="adj1" fmla="val 6357855"/>
+              <a:gd name="adj2" fmla="val 597034"/>
+            </a:avLst>
+          </a:prstGeom>
+          <a:ln>
+            <a:headEnd type="none"/>
+            <a:tailEnd type="triangle"/>
+          </a:ln>
+        </p:spPr>
+        <p:style>
+          <a:lnRef idx="1">
+            <a:schemeClr val="dk1"/>
+          </a:lnRef>
+          <a:fillRef idx="0">
+            <a:schemeClr val="dk1"/>
+          </a:fillRef>
+          <a:effectRef idx="0">
+            <a:schemeClr val="dk1"/>
+          </a:effectRef>
+          <a:fontRef idx="minor">
+            <a:schemeClr val="tx1"/>
+          </a:fontRef>
+        </p:style>
+        <p:txBody>
+          <a:bodyPr rtlCol="0" anchor="ctr"/>
+          <a:lstStyle/>
+          <a:p>
+            <a:pPr algn="ctr"/>
+            <a:endParaRPr lang="ko-KR" altLang="en-US"/>
+          </a:p>
+        </p:txBody>
+      </p:sp>
+    </p:spTree>
+    <p:extLst>
+      <p:ext uri="{BB962C8B-B14F-4D97-AF65-F5344CB8AC3E}">
+        <p14:creationId xmlns:p14="http://schemas.microsoft.com/office/powerpoint/2010/main" val="3423588715"/>
+      </p:ext>
+    </p:extLst>
+  </p:cSld>
+  <p:clrMapOvr>
+    <a:masterClrMapping/>
+  </p:clrMapOvr>
+</p:sld>
+</file>
+
+<file path=ppt/slides/slide5.xml><?xml version="1.0" encoding="utf-8"?>
+<p:sld xmlns:a="http://schemas.openxmlformats.org/drawingml/2006/main" xmlns:r="http://schemas.openxmlformats.org/officeDocument/2006/relationships" xmlns:p="http://schemas.openxmlformats.org/presentationml/2006/main">
+  <p:cSld>
+    <p:spTree>
+      <p:nvGrpSpPr>
+        <p:cNvPr id="1" name=""/>
+        <p:cNvGrpSpPr/>
+        <p:nvPr/>
+      </p:nvGrpSpPr>
+      <p:grpSpPr>
+        <a:xfrm>
+          <a:off x="0" y="0"/>
+          <a:ext cx="0" cy="0"/>
+          <a:chOff x="0" y="0"/>
+          <a:chExt cx="0" cy="0"/>
+        </a:xfrm>
+      </p:grpSpPr>
+      <p:cxnSp>
+        <p:nvCxnSpPr>
+          <p:cNvPr id="24" name="직선 연결선 23">
+            <a:extLst>
+              <a:ext uri="{FF2B5EF4-FFF2-40B4-BE49-F238E27FC236}">
+                <a16:creationId xmlns:a16="http://schemas.microsoft.com/office/drawing/2014/main" id="{174B7BB4-0285-4194-852E-1F2CB28878E9}"/>
+              </a:ext>
+            </a:extLst>
+          </p:cNvPr>
+          <p:cNvCxnSpPr>
+            <a:cxnSpLocks/>
+            <a:stCxn id="40" idx="6"/>
+            <a:endCxn id="42" idx="2"/>
+          </p:cNvCxnSpPr>
+          <p:nvPr/>
+        </p:nvCxnSpPr>
+        <p:spPr>
+          <a:xfrm>
+            <a:off x="5261471" y="2025196"/>
+            <a:ext cx="1671706" cy="0"/>
+          </a:xfrm>
+          <a:prstGeom prst="line">
+            <a:avLst/>
+          </a:prstGeom>
+        </p:spPr>
+        <p:style>
+          <a:lnRef idx="1">
+            <a:schemeClr val="dk1"/>
+          </a:lnRef>
+          <a:fillRef idx="0">
+            <a:schemeClr val="dk1"/>
+          </a:fillRef>
+          <a:effectRef idx="0">
+            <a:schemeClr val="dk1"/>
+          </a:effectRef>
+          <a:fontRef idx="minor">
+            <a:schemeClr val="tx1"/>
+          </a:fontRef>
+        </p:style>
+      </p:cxnSp>
+      <p:cxnSp>
+        <p:nvCxnSpPr>
+          <p:cNvPr id="27" name="직선 연결선 26">
+            <a:extLst>
+              <a:ext uri="{FF2B5EF4-FFF2-40B4-BE49-F238E27FC236}">
+                <a16:creationId xmlns:a16="http://schemas.microsoft.com/office/drawing/2014/main" id="{396C7BDC-EE35-487D-B2FC-FB32D097E6BB}"/>
+              </a:ext>
+            </a:extLst>
+          </p:cNvPr>
+          <p:cNvCxnSpPr>
+            <a:cxnSpLocks/>
+            <a:stCxn id="45" idx="6"/>
+            <a:endCxn id="44" idx="2"/>
+          </p:cNvCxnSpPr>
+          <p:nvPr/>
+        </p:nvCxnSpPr>
+        <p:spPr>
+          <a:xfrm>
+            <a:off x="5261471" y="4159933"/>
+            <a:ext cx="1671706" cy="0"/>
+          </a:xfrm>
+          <a:prstGeom prst="line">
+            <a:avLst/>
+          </a:prstGeom>
+        </p:spPr>
+        <p:style>
+          <a:lnRef idx="1">
+            <a:schemeClr val="dk1"/>
+          </a:lnRef>
+          <a:fillRef idx="0">
+            <a:schemeClr val="dk1"/>
+          </a:fillRef>
+          <a:effectRef idx="0">
+            <a:schemeClr val="dk1"/>
+          </a:effectRef>
+          <a:fontRef idx="minor">
+            <a:schemeClr val="tx1"/>
+          </a:fontRef>
+        </p:style>
+      </p:cxnSp>
+      <p:cxnSp>
+        <p:nvCxnSpPr>
+          <p:cNvPr id="29" name="직선 연결선 28">
+            <a:extLst>
+              <a:ext uri="{FF2B5EF4-FFF2-40B4-BE49-F238E27FC236}">
+                <a16:creationId xmlns:a16="http://schemas.microsoft.com/office/drawing/2014/main" id="{407A26B2-7C10-439B-8B22-9D7566C02835}"/>
+              </a:ext>
+            </a:extLst>
+          </p:cNvPr>
+          <p:cNvCxnSpPr>
+            <a:cxnSpLocks/>
+            <a:stCxn id="42" idx="4"/>
+            <a:endCxn id="44" idx="0"/>
+          </p:cNvCxnSpPr>
+          <p:nvPr/>
+        </p:nvCxnSpPr>
+        <p:spPr>
+          <a:xfrm>
+            <a:off x="7279541" y="2357705"/>
+            <a:ext cx="0" cy="1469719"/>
+          </a:xfrm>
+          <a:prstGeom prst="line">
+            <a:avLst/>
+          </a:prstGeom>
+        </p:spPr>
+        <p:style>
+          <a:lnRef idx="1">
+            <a:schemeClr val="dk1"/>
+          </a:lnRef>
+          <a:fillRef idx="0">
+            <a:schemeClr val="dk1"/>
+          </a:fillRef>
+          <a:effectRef idx="0">
+            <a:schemeClr val="dk1"/>
+          </a:effectRef>
+          <a:fontRef idx="minor">
+            <a:schemeClr val="tx1"/>
+          </a:fontRef>
+        </p:style>
+      </p:cxnSp>
+      <p:cxnSp>
+        <p:nvCxnSpPr>
+          <p:cNvPr id="31" name="직선 연결선 30">
+            <a:extLst>
+              <a:ext uri="{FF2B5EF4-FFF2-40B4-BE49-F238E27FC236}">
+                <a16:creationId xmlns:a16="http://schemas.microsoft.com/office/drawing/2014/main" id="{233583B9-D36C-42C5-8E41-C1476F68ADE0}"/>
+              </a:ext>
+            </a:extLst>
+          </p:cNvPr>
+          <p:cNvCxnSpPr>
+            <a:cxnSpLocks/>
+            <a:stCxn id="45" idx="7"/>
+            <a:endCxn id="42" idx="3"/>
+          </p:cNvCxnSpPr>
+          <p:nvPr/>
+        </p:nvCxnSpPr>
+        <p:spPr>
+          <a:xfrm flipV="1">
+            <a:off x="5160023" y="2260315"/>
+            <a:ext cx="1874602" cy="1664499"/>
+          </a:xfrm>
+          <a:prstGeom prst="line">
+            <a:avLst/>
+          </a:prstGeom>
+        </p:spPr>
+        <p:style>
+          <a:lnRef idx="1">
+            <a:schemeClr val="dk1"/>
+          </a:lnRef>
+          <a:fillRef idx="0">
+            <a:schemeClr val="dk1"/>
+          </a:fillRef>
+          <a:effectRef idx="0">
+            <a:schemeClr val="dk1"/>
+          </a:effectRef>
+          <a:fontRef idx="minor">
+            <a:schemeClr val="tx1"/>
+          </a:fontRef>
+        </p:style>
+      </p:cxnSp>
+      <p:sp>
+        <p:nvSpPr>
+          <p:cNvPr id="40" name="타원 39">
+            <a:extLst>
+              <a:ext uri="{FF2B5EF4-FFF2-40B4-BE49-F238E27FC236}">
+                <a16:creationId xmlns:a16="http://schemas.microsoft.com/office/drawing/2014/main" id="{59AA9F5B-F545-4DAD-9781-41EE9AD8B901}"/>
+              </a:ext>
+            </a:extLst>
+          </p:cNvPr>
+          <p:cNvSpPr/>
+          <p:nvPr/>
+        </p:nvSpPr>
+        <p:spPr>
+          <a:xfrm>
+            <a:off x="4568743" y="1692687"/>
+            <a:ext cx="692728" cy="665018"/>
+          </a:xfrm>
+          <a:prstGeom prst="ellipse">
+            <a:avLst/>
+          </a:prstGeom>
+          <a:noFill/>
+          <a:ln>
+            <a:solidFill>
+              <a:schemeClr val="tx1"/>
+            </a:solidFill>
+          </a:ln>
+        </p:spPr>
+        <p:style>
+          <a:lnRef idx="2">
+            <a:schemeClr val="accent1">
+              <a:shade val="50000"/>
+            </a:schemeClr>
+          </a:lnRef>
+          <a:fillRef idx="1">
+            <a:schemeClr val="accent1"/>
+          </a:fillRef>
+          <a:effectRef idx="0">
+            <a:schemeClr val="accent1"/>
+          </a:effectRef>
+          <a:fontRef idx="minor">
+            <a:schemeClr val="lt1"/>
+          </a:fontRef>
+        </p:style>
+        <p:txBody>
+          <a:bodyPr rtlCol="0" anchor="ctr"/>
+          <a:lstStyle/>
+          <a:p>
+            <a:pPr algn="ctr"/>
+            <a:r>
+              <a:rPr lang="en-US" altLang="ko-KR" sz="2800" dirty="0">
+                <a:solidFill>
+                  <a:schemeClr val="tx1"/>
+                </a:solidFill>
+              </a:rPr>
+              <a:t>1</a:t>
+            </a:r>
+            <a:endParaRPr lang="ko-KR" altLang="en-US" sz="2800" dirty="0">
+              <a:solidFill>
+                <a:schemeClr val="tx1"/>
+              </a:solidFill>
+            </a:endParaRPr>
+          </a:p>
+        </p:txBody>
+      </p:sp>
+      <p:sp>
+        <p:nvSpPr>
+          <p:cNvPr id="42" name="타원 41">
+            <a:extLst>
+              <a:ext uri="{FF2B5EF4-FFF2-40B4-BE49-F238E27FC236}">
+                <a16:creationId xmlns:a16="http://schemas.microsoft.com/office/drawing/2014/main" id="{2DACC6EA-123A-4502-A000-728E19B371FF}"/>
+              </a:ext>
+            </a:extLst>
+          </p:cNvPr>
+          <p:cNvSpPr/>
+          <p:nvPr/>
+        </p:nvSpPr>
+        <p:spPr>
+          <a:xfrm>
+            <a:off x="6933177" y="1692687"/>
+            <a:ext cx="692728" cy="665018"/>
+          </a:xfrm>
+          <a:prstGeom prst="ellipse">
+            <a:avLst/>
+          </a:prstGeom>
+          <a:noFill/>
+          <a:ln>
+            <a:solidFill>
+              <a:schemeClr val="tx1"/>
+            </a:solidFill>
+          </a:ln>
+        </p:spPr>
+        <p:style>
+          <a:lnRef idx="2">
+            <a:schemeClr val="accent1">
+              <a:shade val="50000"/>
+            </a:schemeClr>
+          </a:lnRef>
+          <a:fillRef idx="1">
+            <a:schemeClr val="accent1"/>
+          </a:fillRef>
+          <a:effectRef idx="0">
+            <a:schemeClr val="accent1"/>
+          </a:effectRef>
+          <a:fontRef idx="minor">
+            <a:schemeClr val="lt1"/>
+          </a:fontRef>
+        </p:style>
+        <p:txBody>
+          <a:bodyPr rtlCol="0" anchor="ctr"/>
+          <a:lstStyle/>
+          <a:p>
+            <a:pPr algn="ctr"/>
+            <a:r>
+              <a:rPr lang="en-US" altLang="ko-KR" sz="2800" dirty="0">
+                <a:solidFill>
+                  <a:schemeClr val="tx1"/>
+                </a:solidFill>
+              </a:rPr>
+              <a:t>2</a:t>
+            </a:r>
+            <a:endParaRPr lang="ko-KR" altLang="en-US" sz="2800" dirty="0">
+              <a:solidFill>
+                <a:schemeClr val="tx1"/>
+              </a:solidFill>
+            </a:endParaRPr>
+          </a:p>
+        </p:txBody>
+      </p:sp>
+      <p:sp>
+        <p:nvSpPr>
+          <p:cNvPr id="44" name="타원 43">
+            <a:extLst>
+              <a:ext uri="{FF2B5EF4-FFF2-40B4-BE49-F238E27FC236}">
+                <a16:creationId xmlns:a16="http://schemas.microsoft.com/office/drawing/2014/main" id="{FA83D091-BF1A-4C8A-ACFA-6D6B3D103CCC}"/>
+              </a:ext>
+            </a:extLst>
+          </p:cNvPr>
+          <p:cNvSpPr/>
+          <p:nvPr/>
+        </p:nvSpPr>
+        <p:spPr>
+          <a:xfrm>
+            <a:off x="6933177" y="3827424"/>
+            <a:ext cx="692728" cy="665018"/>
+          </a:xfrm>
+          <a:prstGeom prst="ellipse">
+            <a:avLst/>
+          </a:prstGeom>
+          <a:noFill/>
+          <a:ln>
+            <a:solidFill>
+              <a:schemeClr val="tx1"/>
+            </a:solidFill>
+          </a:ln>
+        </p:spPr>
+        <p:style>
+          <a:lnRef idx="2">
+            <a:schemeClr val="accent1">
+              <a:shade val="50000"/>
+            </a:schemeClr>
+          </a:lnRef>
+          <a:fillRef idx="1">
+            <a:schemeClr val="accent1"/>
+          </a:fillRef>
+          <a:effectRef idx="0">
+            <a:schemeClr val="accent1"/>
+          </a:effectRef>
+          <a:fontRef idx="minor">
+            <a:schemeClr val="lt1"/>
+          </a:fontRef>
+        </p:style>
+        <p:txBody>
+          <a:bodyPr rtlCol="0" anchor="ctr"/>
+          <a:lstStyle/>
+          <a:p>
+            <a:pPr algn="ctr"/>
+            <a:r>
+              <a:rPr lang="en-US" altLang="ko-KR" sz="2800" dirty="0">
+                <a:solidFill>
+                  <a:schemeClr val="tx1"/>
+                </a:solidFill>
+              </a:rPr>
+              <a:t>3</a:t>
+            </a:r>
+            <a:endParaRPr lang="ko-KR" altLang="en-US" sz="2800" dirty="0">
+              <a:solidFill>
+                <a:schemeClr val="tx1"/>
+              </a:solidFill>
+            </a:endParaRPr>
+          </a:p>
+        </p:txBody>
+      </p:sp>
+      <p:sp>
+        <p:nvSpPr>
+          <p:cNvPr id="45" name="타원 44">
+            <a:extLst>
+              <a:ext uri="{FF2B5EF4-FFF2-40B4-BE49-F238E27FC236}">
+                <a16:creationId xmlns:a16="http://schemas.microsoft.com/office/drawing/2014/main" id="{563D74F2-4303-49E1-8509-1DEFDE0B1B5B}"/>
+              </a:ext>
+            </a:extLst>
+          </p:cNvPr>
+          <p:cNvSpPr/>
+          <p:nvPr/>
+        </p:nvSpPr>
+        <p:spPr>
+          <a:xfrm>
+            <a:off x="4568743" y="3827424"/>
+            <a:ext cx="692728" cy="665018"/>
+          </a:xfrm>
+          <a:prstGeom prst="ellipse">
+            <a:avLst/>
+          </a:prstGeom>
+          <a:noFill/>
+          <a:ln>
+            <a:solidFill>
+              <a:schemeClr val="tx1"/>
+            </a:solidFill>
+          </a:ln>
+        </p:spPr>
+        <p:style>
+          <a:lnRef idx="2">
+            <a:schemeClr val="accent1">
+              <a:shade val="50000"/>
+            </a:schemeClr>
+          </a:lnRef>
+          <a:fillRef idx="1">
+            <a:schemeClr val="accent1"/>
+          </a:fillRef>
+          <a:effectRef idx="0">
+            <a:schemeClr val="accent1"/>
+          </a:effectRef>
+          <a:fontRef idx="minor">
+            <a:schemeClr val="lt1"/>
+          </a:fontRef>
+        </p:style>
+        <p:txBody>
+          <a:bodyPr rtlCol="0" anchor="ctr"/>
+          <a:lstStyle/>
+          <a:p>
+            <a:pPr algn="ctr"/>
+            <a:r>
+              <a:rPr lang="en-US" altLang="ko-KR" sz="2800" dirty="0">
+                <a:solidFill>
+                  <a:schemeClr val="tx1"/>
+                </a:solidFill>
+              </a:rPr>
+              <a:t>4</a:t>
+            </a:r>
+            <a:endParaRPr lang="ko-KR" altLang="en-US" sz="2800" dirty="0">
+              <a:solidFill>
+                <a:schemeClr val="tx1"/>
+              </a:solidFill>
+            </a:endParaRPr>
+          </a:p>
+        </p:txBody>
+      </p:sp>
+      <p:cxnSp>
+        <p:nvCxnSpPr>
+          <p:cNvPr id="3" name="직선 연결선 2">
+            <a:extLst>
+              <a:ext uri="{FF2B5EF4-FFF2-40B4-BE49-F238E27FC236}">
+                <a16:creationId xmlns:a16="http://schemas.microsoft.com/office/drawing/2014/main" id="{17314705-9492-4288-A905-C8C7E6BCE660}"/>
+              </a:ext>
+            </a:extLst>
+          </p:cNvPr>
+          <p:cNvCxnSpPr>
+            <a:stCxn id="40" idx="4"/>
+            <a:endCxn id="45" idx="0"/>
+          </p:cNvCxnSpPr>
+          <p:nvPr/>
+        </p:nvCxnSpPr>
+        <p:spPr>
+          <a:xfrm>
+            <a:off x="4915107" y="2357705"/>
+            <a:ext cx="0" cy="1469719"/>
+          </a:xfrm>
+          <a:prstGeom prst="line">
+            <a:avLst/>
+          </a:prstGeom>
+        </p:spPr>
+        <p:style>
+          <a:lnRef idx="1">
+            <a:schemeClr val="dk1"/>
+          </a:lnRef>
+          <a:fillRef idx="0">
+            <a:schemeClr val="dk1"/>
+          </a:fillRef>
+          <a:effectRef idx="0">
+            <a:schemeClr val="dk1"/>
+          </a:effectRef>
+          <a:fontRef idx="minor">
+            <a:schemeClr val="tx1"/>
+          </a:fontRef>
+        </p:style>
+      </p:cxnSp>
+      <p:cxnSp>
+        <p:nvCxnSpPr>
+          <p:cNvPr id="7" name="직선 연결선 6">
+            <a:extLst>
+              <a:ext uri="{FF2B5EF4-FFF2-40B4-BE49-F238E27FC236}">
+                <a16:creationId xmlns:a16="http://schemas.microsoft.com/office/drawing/2014/main" id="{D9584CAD-02CA-44BC-BEA9-A98AACD58BAA}"/>
+              </a:ext>
+            </a:extLst>
+          </p:cNvPr>
+          <p:cNvCxnSpPr>
+            <a:cxnSpLocks/>
+            <a:stCxn id="40" idx="5"/>
+            <a:endCxn id="44" idx="1"/>
+          </p:cNvCxnSpPr>
+          <p:nvPr/>
+        </p:nvCxnSpPr>
+        <p:spPr>
+          <a:xfrm>
+            <a:off x="5160023" y="2260315"/>
+            <a:ext cx="1874602" cy="1664499"/>
+          </a:xfrm>
+          <a:prstGeom prst="line">
+            <a:avLst/>
+          </a:prstGeom>
+        </p:spPr>
+        <p:style>
+          <a:lnRef idx="1">
+            <a:schemeClr val="dk1"/>
+          </a:lnRef>
+          <a:fillRef idx="0">
+            <a:schemeClr val="dk1"/>
+          </a:fillRef>
+          <a:effectRef idx="0">
+            <a:schemeClr val="dk1"/>
+          </a:effectRef>
+          <a:fontRef idx="minor">
+            <a:schemeClr val="tx1"/>
+          </a:fontRef>
+        </p:style>
+      </p:cxnSp>
+    </p:spTree>
+    <p:extLst>
+      <p:ext uri="{BB962C8B-B14F-4D97-AF65-F5344CB8AC3E}">
+        <p14:creationId xmlns:p14="http://schemas.microsoft.com/office/powerpoint/2010/main" val="1337106936"/>
+      </p:ext>
+    </p:extLst>
+  </p:cSld>
+  <p:clrMapOvr>
+    <a:masterClrMapping/>
+  </p:clrMapOvr>
+</p:sld>
+</file>
+
+<file path=ppt/slides/slide6.xml><?xml version="1.0" encoding="utf-8"?>
+<p:sld xmlns:a="http://schemas.openxmlformats.org/drawingml/2006/main" xmlns:r="http://schemas.openxmlformats.org/officeDocument/2006/relationships" xmlns:p="http://schemas.openxmlformats.org/presentationml/2006/main">
+  <p:cSld>
+    <p:spTree>
+      <p:nvGrpSpPr>
+        <p:cNvPr id="1" name=""/>
+        <p:cNvGrpSpPr/>
+        <p:nvPr/>
+      </p:nvGrpSpPr>
+      <p:grpSpPr>
+        <a:xfrm>
+          <a:off x="0" y="0"/>
+          <a:ext cx="0" cy="0"/>
+          <a:chOff x="0" y="0"/>
+          <a:chExt cx="0" cy="0"/>
+        </a:xfrm>
+      </p:grpSpPr>
+      <p:cxnSp>
+        <p:nvCxnSpPr>
+          <p:cNvPr id="24" name="직선 연결선 23">
+            <a:extLst>
+              <a:ext uri="{FF2B5EF4-FFF2-40B4-BE49-F238E27FC236}">
+                <a16:creationId xmlns:a16="http://schemas.microsoft.com/office/drawing/2014/main" id="{174B7BB4-0285-4194-852E-1F2CB28878E9}"/>
+              </a:ext>
+            </a:extLst>
+          </p:cNvPr>
+          <p:cNvCxnSpPr>
+            <a:cxnSpLocks/>
+            <a:stCxn id="40" idx="6"/>
+            <a:endCxn id="42" idx="2"/>
+          </p:cNvCxnSpPr>
+          <p:nvPr/>
+        </p:nvCxnSpPr>
+        <p:spPr>
+          <a:xfrm>
+            <a:off x="5261471" y="2025196"/>
+            <a:ext cx="1671706" cy="0"/>
+          </a:xfrm>
+          <a:prstGeom prst="line">
+            <a:avLst/>
+          </a:prstGeom>
+        </p:spPr>
+        <p:style>
+          <a:lnRef idx="1">
+            <a:schemeClr val="dk1"/>
+          </a:lnRef>
+          <a:fillRef idx="0">
+            <a:schemeClr val="dk1"/>
+          </a:fillRef>
+          <a:effectRef idx="0">
+            <a:schemeClr val="dk1"/>
+          </a:effectRef>
+          <a:fontRef idx="minor">
+            <a:schemeClr val="tx1"/>
+          </a:fontRef>
+        </p:style>
+      </p:cxnSp>
+      <p:cxnSp>
+        <p:nvCxnSpPr>
+          <p:cNvPr id="27" name="직선 연결선 26">
+            <a:extLst>
+              <a:ext uri="{FF2B5EF4-FFF2-40B4-BE49-F238E27FC236}">
+                <a16:creationId xmlns:a16="http://schemas.microsoft.com/office/drawing/2014/main" id="{396C7BDC-EE35-487D-B2FC-FB32D097E6BB}"/>
+              </a:ext>
+            </a:extLst>
+          </p:cNvPr>
+          <p:cNvCxnSpPr>
+            <a:cxnSpLocks/>
+            <a:stCxn id="45" idx="6"/>
+            <a:endCxn id="44" idx="2"/>
+          </p:cNvCxnSpPr>
+          <p:nvPr/>
+        </p:nvCxnSpPr>
+        <p:spPr>
+          <a:xfrm>
+            <a:off x="5261471" y="4159933"/>
+            <a:ext cx="1671706" cy="0"/>
+          </a:xfrm>
+          <a:prstGeom prst="line">
+            <a:avLst/>
+          </a:prstGeom>
+        </p:spPr>
+        <p:style>
+          <a:lnRef idx="1">
+            <a:schemeClr val="dk1"/>
+          </a:lnRef>
+          <a:fillRef idx="0">
+            <a:schemeClr val="dk1"/>
+          </a:fillRef>
+          <a:effectRef idx="0">
+            <a:schemeClr val="dk1"/>
+          </a:effectRef>
+          <a:fontRef idx="minor">
+            <a:schemeClr val="tx1"/>
+          </a:fontRef>
+        </p:style>
+      </p:cxnSp>
+      <p:cxnSp>
+        <p:nvCxnSpPr>
+          <p:cNvPr id="29" name="직선 연결선 28">
+            <a:extLst>
+              <a:ext uri="{FF2B5EF4-FFF2-40B4-BE49-F238E27FC236}">
+                <a16:creationId xmlns:a16="http://schemas.microsoft.com/office/drawing/2014/main" id="{407A26B2-7C10-439B-8B22-9D7566C02835}"/>
+              </a:ext>
+            </a:extLst>
+          </p:cNvPr>
+          <p:cNvCxnSpPr>
+            <a:cxnSpLocks/>
+            <a:stCxn id="42" idx="4"/>
+            <a:endCxn id="44" idx="0"/>
+          </p:cNvCxnSpPr>
+          <p:nvPr/>
+        </p:nvCxnSpPr>
+        <p:spPr>
+          <a:xfrm>
+            <a:off x="7279541" y="2357705"/>
+            <a:ext cx="0" cy="1469719"/>
+          </a:xfrm>
+          <a:prstGeom prst="line">
+            <a:avLst/>
+          </a:prstGeom>
+        </p:spPr>
+        <p:style>
+          <a:lnRef idx="1">
+            <a:schemeClr val="dk1"/>
+          </a:lnRef>
+          <a:fillRef idx="0">
+            <a:schemeClr val="dk1"/>
+          </a:fillRef>
+          <a:effectRef idx="0">
+            <a:schemeClr val="dk1"/>
+          </a:effectRef>
+          <a:fontRef idx="minor">
+            <a:schemeClr val="tx1"/>
+          </a:fontRef>
+        </p:style>
+      </p:cxnSp>
+      <p:cxnSp>
+        <p:nvCxnSpPr>
+          <p:cNvPr id="31" name="직선 연결선 30">
+            <a:extLst>
+              <a:ext uri="{FF2B5EF4-FFF2-40B4-BE49-F238E27FC236}">
+                <a16:creationId xmlns:a16="http://schemas.microsoft.com/office/drawing/2014/main" id="{233583B9-D36C-42C5-8E41-C1476F68ADE0}"/>
+              </a:ext>
+            </a:extLst>
+          </p:cNvPr>
+          <p:cNvCxnSpPr>
+            <a:cxnSpLocks/>
+            <a:stCxn id="45" idx="7"/>
+            <a:endCxn id="42" idx="3"/>
+          </p:cNvCxnSpPr>
+          <p:nvPr/>
+        </p:nvCxnSpPr>
+        <p:spPr>
+          <a:xfrm flipV="1">
+            <a:off x="5160023" y="2260315"/>
+            <a:ext cx="1874602" cy="1664499"/>
+          </a:xfrm>
+          <a:prstGeom prst="line">
+            <a:avLst/>
+          </a:prstGeom>
+        </p:spPr>
+        <p:style>
+          <a:lnRef idx="1">
+            <a:schemeClr val="dk1"/>
+          </a:lnRef>
+          <a:fillRef idx="0">
+            <a:schemeClr val="dk1"/>
+          </a:fillRef>
+          <a:effectRef idx="0">
+            <a:schemeClr val="dk1"/>
+          </a:effectRef>
+          <a:fontRef idx="minor">
+            <a:schemeClr val="tx1"/>
+          </a:fontRef>
+        </p:style>
+      </p:cxnSp>
+      <p:sp>
+        <p:nvSpPr>
+          <p:cNvPr id="40" name="타원 39">
+            <a:extLst>
+              <a:ext uri="{FF2B5EF4-FFF2-40B4-BE49-F238E27FC236}">
+                <a16:creationId xmlns:a16="http://schemas.microsoft.com/office/drawing/2014/main" id="{59AA9F5B-F545-4DAD-9781-41EE9AD8B901}"/>
+              </a:ext>
+            </a:extLst>
+          </p:cNvPr>
+          <p:cNvSpPr/>
+          <p:nvPr/>
+        </p:nvSpPr>
+        <p:spPr>
+          <a:xfrm>
+            <a:off x="4568743" y="1692687"/>
+            <a:ext cx="692728" cy="665018"/>
+          </a:xfrm>
+          <a:prstGeom prst="ellipse">
+            <a:avLst/>
+          </a:prstGeom>
+          <a:noFill/>
+          <a:ln>
+            <a:solidFill>
+              <a:schemeClr val="tx1"/>
+            </a:solidFill>
+          </a:ln>
+        </p:spPr>
+        <p:style>
+          <a:lnRef idx="2">
+            <a:schemeClr val="accent1">
+              <a:shade val="50000"/>
+            </a:schemeClr>
+          </a:lnRef>
+          <a:fillRef idx="1">
+            <a:schemeClr val="accent1"/>
+          </a:fillRef>
+          <a:effectRef idx="0">
+            <a:schemeClr val="accent1"/>
+          </a:effectRef>
+          <a:fontRef idx="minor">
+            <a:schemeClr val="lt1"/>
+          </a:fontRef>
+        </p:style>
+        <p:txBody>
+          <a:bodyPr rtlCol="0" anchor="ctr"/>
+          <a:lstStyle/>
+          <a:p>
+            <a:pPr algn="ctr"/>
+            <a:r>
+              <a:rPr lang="en-US" altLang="ko-KR" sz="2800" dirty="0">
+                <a:solidFill>
+                  <a:schemeClr val="tx1"/>
+                </a:solidFill>
+              </a:rPr>
+              <a:t>1</a:t>
+            </a:r>
+            <a:endParaRPr lang="ko-KR" altLang="en-US" sz="2800" dirty="0">
+              <a:solidFill>
+                <a:schemeClr val="tx1"/>
+              </a:solidFill>
+            </a:endParaRPr>
+          </a:p>
+        </p:txBody>
+      </p:sp>
+      <p:sp>
+        <p:nvSpPr>
+          <p:cNvPr id="42" name="타원 41">
+            <a:extLst>
+              <a:ext uri="{FF2B5EF4-FFF2-40B4-BE49-F238E27FC236}">
+                <a16:creationId xmlns:a16="http://schemas.microsoft.com/office/drawing/2014/main" id="{2DACC6EA-123A-4502-A000-728E19B371FF}"/>
+              </a:ext>
+            </a:extLst>
+          </p:cNvPr>
+          <p:cNvSpPr/>
+          <p:nvPr/>
+        </p:nvSpPr>
+        <p:spPr>
+          <a:xfrm>
+            <a:off x="6933177" y="1692687"/>
+            <a:ext cx="692728" cy="665018"/>
+          </a:xfrm>
+          <a:prstGeom prst="ellipse">
+            <a:avLst/>
+          </a:prstGeom>
+          <a:noFill/>
+          <a:ln>
+            <a:solidFill>
+              <a:schemeClr val="tx1"/>
+            </a:solidFill>
+          </a:ln>
+        </p:spPr>
+        <p:style>
+          <a:lnRef idx="2">
+            <a:schemeClr val="accent1">
+              <a:shade val="50000"/>
+            </a:schemeClr>
+          </a:lnRef>
+          <a:fillRef idx="1">
+            <a:schemeClr val="accent1"/>
+          </a:fillRef>
+          <a:effectRef idx="0">
+            <a:schemeClr val="accent1"/>
+          </a:effectRef>
+          <a:fontRef idx="minor">
+            <a:schemeClr val="lt1"/>
+          </a:fontRef>
+        </p:style>
+        <p:txBody>
+          <a:bodyPr rtlCol="0" anchor="ctr"/>
+          <a:lstStyle/>
+          <a:p>
+            <a:pPr algn="ctr"/>
+            <a:r>
+              <a:rPr lang="en-US" altLang="ko-KR" sz="2800" dirty="0">
+                <a:solidFill>
+                  <a:schemeClr val="tx1"/>
+                </a:solidFill>
+              </a:rPr>
+              <a:t>2</a:t>
+            </a:r>
+            <a:endParaRPr lang="ko-KR" altLang="en-US" sz="2800" dirty="0">
+              <a:solidFill>
+                <a:schemeClr val="tx1"/>
+              </a:solidFill>
+            </a:endParaRPr>
+          </a:p>
+        </p:txBody>
+      </p:sp>
+      <p:sp>
+        <p:nvSpPr>
+          <p:cNvPr id="44" name="타원 43">
+            <a:extLst>
+              <a:ext uri="{FF2B5EF4-FFF2-40B4-BE49-F238E27FC236}">
+                <a16:creationId xmlns:a16="http://schemas.microsoft.com/office/drawing/2014/main" id="{FA83D091-BF1A-4C8A-ACFA-6D6B3D103CCC}"/>
+              </a:ext>
+            </a:extLst>
+          </p:cNvPr>
+          <p:cNvSpPr/>
+          <p:nvPr/>
+        </p:nvSpPr>
+        <p:spPr>
+          <a:xfrm>
+            <a:off x="6933177" y="3827424"/>
+            <a:ext cx="692728" cy="665018"/>
+          </a:xfrm>
+          <a:prstGeom prst="ellipse">
+            <a:avLst/>
+          </a:prstGeom>
+          <a:noFill/>
+          <a:ln>
+            <a:solidFill>
+              <a:schemeClr val="tx1"/>
+            </a:solidFill>
+          </a:ln>
+        </p:spPr>
+        <p:style>
+          <a:lnRef idx="2">
+            <a:schemeClr val="accent1">
+              <a:shade val="50000"/>
+            </a:schemeClr>
+          </a:lnRef>
+          <a:fillRef idx="1">
+            <a:schemeClr val="accent1"/>
+          </a:fillRef>
+          <a:effectRef idx="0">
+            <a:schemeClr val="accent1"/>
+          </a:effectRef>
+          <a:fontRef idx="minor">
+            <a:schemeClr val="lt1"/>
+          </a:fontRef>
+        </p:style>
+        <p:txBody>
+          <a:bodyPr rtlCol="0" anchor="ctr"/>
+          <a:lstStyle/>
+          <a:p>
+            <a:pPr algn="ctr"/>
+            <a:r>
+              <a:rPr lang="en-US" altLang="ko-KR" sz="2800" dirty="0">
+                <a:solidFill>
+                  <a:schemeClr val="tx1"/>
+                </a:solidFill>
+              </a:rPr>
+              <a:t>3</a:t>
+            </a:r>
+            <a:endParaRPr lang="ko-KR" altLang="en-US" sz="2800" dirty="0">
+              <a:solidFill>
+                <a:schemeClr val="tx1"/>
+              </a:solidFill>
+            </a:endParaRPr>
+          </a:p>
+        </p:txBody>
+      </p:sp>
+      <p:sp>
+        <p:nvSpPr>
+          <p:cNvPr id="45" name="타원 44">
+            <a:extLst>
+              <a:ext uri="{FF2B5EF4-FFF2-40B4-BE49-F238E27FC236}">
+                <a16:creationId xmlns:a16="http://schemas.microsoft.com/office/drawing/2014/main" id="{563D74F2-4303-49E1-8509-1DEFDE0B1B5B}"/>
+              </a:ext>
+            </a:extLst>
+          </p:cNvPr>
+          <p:cNvSpPr/>
+          <p:nvPr/>
+        </p:nvSpPr>
+        <p:spPr>
+          <a:xfrm>
+            <a:off x="4568743" y="3827424"/>
+            <a:ext cx="692728" cy="665018"/>
+          </a:xfrm>
+          <a:prstGeom prst="ellipse">
+            <a:avLst/>
+          </a:prstGeom>
+          <a:noFill/>
+          <a:ln>
+            <a:solidFill>
+              <a:schemeClr val="tx1"/>
+            </a:solidFill>
+          </a:ln>
+        </p:spPr>
+        <p:style>
+          <a:lnRef idx="2">
+            <a:schemeClr val="accent1">
+              <a:shade val="50000"/>
+            </a:schemeClr>
+          </a:lnRef>
+          <a:fillRef idx="1">
+            <a:schemeClr val="accent1"/>
+          </a:fillRef>
+          <a:effectRef idx="0">
+            <a:schemeClr val="accent1"/>
+          </a:effectRef>
+          <a:fontRef idx="minor">
+            <a:schemeClr val="lt1"/>
+          </a:fontRef>
+        </p:style>
+        <p:txBody>
+          <a:bodyPr rtlCol="0" anchor="ctr"/>
+          <a:lstStyle/>
+          <a:p>
+            <a:pPr algn="ctr"/>
+            <a:r>
+              <a:rPr lang="en-US" altLang="ko-KR" sz="2800" dirty="0">
+                <a:solidFill>
+                  <a:schemeClr val="tx1"/>
+                </a:solidFill>
+              </a:rPr>
+              <a:t>4</a:t>
+            </a:r>
+            <a:endParaRPr lang="ko-KR" altLang="en-US" sz="2800" dirty="0">
+              <a:solidFill>
+                <a:schemeClr val="tx1"/>
+              </a:solidFill>
+            </a:endParaRPr>
+          </a:p>
+        </p:txBody>
+      </p:sp>
+      <p:cxnSp>
+        <p:nvCxnSpPr>
+          <p:cNvPr id="3" name="직선 연결선 2">
+            <a:extLst>
+              <a:ext uri="{FF2B5EF4-FFF2-40B4-BE49-F238E27FC236}">
+                <a16:creationId xmlns:a16="http://schemas.microsoft.com/office/drawing/2014/main" id="{17314705-9492-4288-A905-C8C7E6BCE660}"/>
+              </a:ext>
+            </a:extLst>
+          </p:cNvPr>
+          <p:cNvCxnSpPr>
+            <a:stCxn id="40" idx="4"/>
+            <a:endCxn id="45" idx="0"/>
+          </p:cNvCxnSpPr>
+          <p:nvPr/>
+        </p:nvCxnSpPr>
+        <p:spPr>
+          <a:xfrm>
+            <a:off x="4915107" y="2357705"/>
+            <a:ext cx="0" cy="1469719"/>
+          </a:xfrm>
+          <a:prstGeom prst="line">
+            <a:avLst/>
+          </a:prstGeom>
+        </p:spPr>
+        <p:style>
+          <a:lnRef idx="1">
+            <a:schemeClr val="dk1"/>
+          </a:lnRef>
+          <a:fillRef idx="0">
+            <a:schemeClr val="dk1"/>
+          </a:fillRef>
+          <a:effectRef idx="0">
+            <a:schemeClr val="dk1"/>
+          </a:effectRef>
+          <a:fontRef idx="minor">
+            <a:schemeClr val="tx1"/>
+          </a:fontRef>
+        </p:style>
+      </p:cxnSp>
+      <p:cxnSp>
+        <p:nvCxnSpPr>
+          <p:cNvPr id="7" name="직선 연결선 6">
+            <a:extLst>
+              <a:ext uri="{FF2B5EF4-FFF2-40B4-BE49-F238E27FC236}">
+                <a16:creationId xmlns:a16="http://schemas.microsoft.com/office/drawing/2014/main" id="{D9584CAD-02CA-44BC-BEA9-A98AACD58BAA}"/>
+              </a:ext>
+            </a:extLst>
+          </p:cNvPr>
+          <p:cNvCxnSpPr>
+            <a:cxnSpLocks/>
+            <a:stCxn id="40" idx="5"/>
+            <a:endCxn id="44" idx="1"/>
+          </p:cNvCxnSpPr>
+          <p:nvPr/>
+        </p:nvCxnSpPr>
+        <p:spPr>
+          <a:xfrm>
+            <a:off x="5160023" y="2260315"/>
+            <a:ext cx="1874602" cy="1664499"/>
+          </a:xfrm>
+          <a:prstGeom prst="line">
+            <a:avLst/>
+          </a:prstGeom>
+        </p:spPr>
+        <p:style>
+          <a:lnRef idx="1">
+            <a:schemeClr val="dk1"/>
+          </a:lnRef>
+          <a:fillRef idx="0">
+            <a:schemeClr val="dk1"/>
+          </a:fillRef>
+          <a:effectRef idx="0">
+            <a:schemeClr val="dk1"/>
+          </a:effectRef>
+          <a:fontRef idx="minor">
+            <a:schemeClr val="tx1"/>
+          </a:fontRef>
+        </p:style>
+      </p:cxnSp>
+    </p:spTree>
+    <p:extLst>
+      <p:ext uri="{BB962C8B-B14F-4D97-AF65-F5344CB8AC3E}">
+        <p14:creationId xmlns:p14="http://schemas.microsoft.com/office/powerpoint/2010/main" val="3444867533"/>
+      </p:ext>
+    </p:extLst>
+  </p:cSld>
+  <p:clrMapOvr>
+    <a:masterClrMapping/>
+  </p:clrMapOvr>
+</p:sld>
+</file>
+
+<file path=ppt/slides/slide7.xml><?xml version="1.0" encoding="utf-8"?>
+<p:sld xmlns:a="http://schemas.openxmlformats.org/drawingml/2006/main" xmlns:r="http://schemas.openxmlformats.org/officeDocument/2006/relationships" xmlns:p="http://schemas.openxmlformats.org/presentationml/2006/main">
+  <p:cSld>
+    <p:spTree>
+      <p:nvGrpSpPr>
+        <p:cNvPr id="1" name=""/>
+        <p:cNvGrpSpPr/>
+        <p:nvPr/>
+      </p:nvGrpSpPr>
+      <p:grpSpPr>
+        <a:xfrm>
+          <a:off x="0" y="0"/>
+          <a:ext cx="0" cy="0"/>
+          <a:chOff x="0" y="0"/>
+          <a:chExt cx="0" cy="0"/>
+        </a:xfrm>
+      </p:grpSpPr>
+      <p:cxnSp>
+        <p:nvCxnSpPr>
+          <p:cNvPr id="12" name="직선 연결선 11">
+            <a:extLst>
+              <a:ext uri="{FF2B5EF4-FFF2-40B4-BE49-F238E27FC236}">
+                <a16:creationId xmlns:a16="http://schemas.microsoft.com/office/drawing/2014/main" id="{341C8632-1C3B-4E60-A0F8-53B6B1588D34}"/>
+              </a:ext>
+            </a:extLst>
+          </p:cNvPr>
+          <p:cNvCxnSpPr>
+            <a:cxnSpLocks/>
+            <a:stCxn id="16" idx="6"/>
+            <a:endCxn id="17" idx="2"/>
+          </p:cNvCxnSpPr>
+          <p:nvPr/>
+        </p:nvCxnSpPr>
+        <p:spPr>
+          <a:xfrm>
+            <a:off x="835748" y="1840469"/>
+            <a:ext cx="1671706" cy="0"/>
+          </a:xfrm>
+          <a:prstGeom prst="line">
+            <a:avLst/>
+          </a:prstGeom>
+          <a:ln>
+            <a:tailEnd type="triangle"/>
+          </a:ln>
+        </p:spPr>
+        <p:style>
+          <a:lnRef idx="1">
+            <a:schemeClr val="dk1"/>
+          </a:lnRef>
+          <a:fillRef idx="0">
+            <a:schemeClr val="dk1"/>
+          </a:fillRef>
+          <a:effectRef idx="0">
+            <a:schemeClr val="dk1"/>
+          </a:effectRef>
+          <a:fontRef idx="minor">
+            <a:schemeClr val="tx1"/>
+          </a:fontRef>
+        </p:style>
+      </p:cxnSp>
+      <p:cxnSp>
+        <p:nvCxnSpPr>
+          <p:cNvPr id="13" name="직선 연결선 12">
+            <a:extLst>
+              <a:ext uri="{FF2B5EF4-FFF2-40B4-BE49-F238E27FC236}">
+                <a16:creationId xmlns:a16="http://schemas.microsoft.com/office/drawing/2014/main" id="{81A8CDA3-D62A-4226-8513-92305E3DC01C}"/>
+              </a:ext>
+            </a:extLst>
+          </p:cNvPr>
+          <p:cNvCxnSpPr>
+            <a:cxnSpLocks/>
+            <a:stCxn id="18" idx="2"/>
+            <a:endCxn id="19" idx="6"/>
+          </p:cNvCxnSpPr>
+          <p:nvPr/>
+        </p:nvCxnSpPr>
+        <p:spPr>
+          <a:xfrm flipH="1">
+            <a:off x="835748" y="3975206"/>
+            <a:ext cx="1671706" cy="0"/>
+          </a:xfrm>
+          <a:prstGeom prst="line">
+            <a:avLst/>
+          </a:prstGeom>
+          <a:ln>
+            <a:headEnd type="none"/>
+            <a:tailEnd type="triangle"/>
+          </a:ln>
+        </p:spPr>
+        <p:style>
+          <a:lnRef idx="1">
+            <a:schemeClr val="dk1"/>
+          </a:lnRef>
+          <a:fillRef idx="0">
+            <a:schemeClr val="dk1"/>
+          </a:fillRef>
+          <a:effectRef idx="0">
+            <a:schemeClr val="dk1"/>
+          </a:effectRef>
+          <a:fontRef idx="minor">
+            <a:schemeClr val="tx1"/>
+          </a:fontRef>
+        </p:style>
+      </p:cxnSp>
+      <p:cxnSp>
+        <p:nvCxnSpPr>
+          <p:cNvPr id="14" name="직선 연결선 13">
+            <a:extLst>
+              <a:ext uri="{FF2B5EF4-FFF2-40B4-BE49-F238E27FC236}">
+                <a16:creationId xmlns:a16="http://schemas.microsoft.com/office/drawing/2014/main" id="{11608D99-7558-406C-8F82-98C79A0064C1}"/>
+              </a:ext>
+            </a:extLst>
+          </p:cNvPr>
+          <p:cNvCxnSpPr>
+            <a:cxnSpLocks/>
+            <a:stCxn id="18" idx="0"/>
+            <a:endCxn id="17" idx="4"/>
+          </p:cNvCxnSpPr>
+          <p:nvPr/>
+        </p:nvCxnSpPr>
+        <p:spPr>
+          <a:xfrm flipV="1">
+            <a:off x="2853818" y="2172978"/>
+            <a:ext cx="0" cy="1469719"/>
+          </a:xfrm>
+          <a:prstGeom prst="line">
+            <a:avLst/>
+          </a:prstGeom>
+          <a:ln>
+            <a:headEnd type="triangle"/>
+          </a:ln>
+        </p:spPr>
+        <p:style>
+          <a:lnRef idx="1">
+            <a:schemeClr val="dk1"/>
+          </a:lnRef>
+          <a:fillRef idx="0">
+            <a:schemeClr val="dk1"/>
+          </a:fillRef>
+          <a:effectRef idx="0">
+            <a:schemeClr val="dk1"/>
+          </a:effectRef>
+          <a:fontRef idx="minor">
+            <a:schemeClr val="tx1"/>
+          </a:fontRef>
+        </p:style>
+      </p:cxnSp>
+      <p:cxnSp>
+        <p:nvCxnSpPr>
+          <p:cNvPr id="15" name="직선 연결선 14">
+            <a:extLst>
+              <a:ext uri="{FF2B5EF4-FFF2-40B4-BE49-F238E27FC236}">
+                <a16:creationId xmlns:a16="http://schemas.microsoft.com/office/drawing/2014/main" id="{8EDD7F1B-E93D-4FE7-A655-9301199587EC}"/>
+              </a:ext>
+            </a:extLst>
+          </p:cNvPr>
+          <p:cNvCxnSpPr>
+            <a:cxnSpLocks/>
+            <a:stCxn id="17" idx="3"/>
+            <a:endCxn id="19" idx="7"/>
+          </p:cNvCxnSpPr>
+          <p:nvPr/>
+        </p:nvCxnSpPr>
+        <p:spPr>
+          <a:xfrm flipH="1">
+            <a:off x="734300" y="2075588"/>
+            <a:ext cx="1874602" cy="1664499"/>
+          </a:xfrm>
+          <a:prstGeom prst="line">
+            <a:avLst/>
+          </a:prstGeom>
+          <a:ln>
+            <a:headEnd type="triangle"/>
+            <a:tailEnd type="none"/>
+          </a:ln>
+        </p:spPr>
+        <p:style>
+          <a:lnRef idx="1">
+            <a:schemeClr val="dk1"/>
+          </a:lnRef>
+          <a:fillRef idx="0">
+            <a:schemeClr val="dk1"/>
+          </a:fillRef>
+          <a:effectRef idx="0">
+            <a:schemeClr val="dk1"/>
+          </a:effectRef>
+          <a:fontRef idx="minor">
+            <a:schemeClr val="tx1"/>
+          </a:fontRef>
+        </p:style>
+      </p:cxnSp>
+      <p:sp>
+        <p:nvSpPr>
+          <p:cNvPr id="16" name="타원 15">
+            <a:extLst>
+              <a:ext uri="{FF2B5EF4-FFF2-40B4-BE49-F238E27FC236}">
+                <a16:creationId xmlns:a16="http://schemas.microsoft.com/office/drawing/2014/main" id="{9D537163-A993-4EDC-A787-7A0C704582F4}"/>
+              </a:ext>
+            </a:extLst>
+          </p:cNvPr>
+          <p:cNvSpPr/>
+          <p:nvPr/>
+        </p:nvSpPr>
+        <p:spPr>
+          <a:xfrm>
+            <a:off x="143020" y="1507960"/>
+            <a:ext cx="692728" cy="665018"/>
+          </a:xfrm>
+          <a:prstGeom prst="ellipse">
+            <a:avLst/>
+          </a:prstGeom>
+          <a:noFill/>
+          <a:ln>
+            <a:solidFill>
+              <a:schemeClr val="tx1"/>
+            </a:solidFill>
+          </a:ln>
+        </p:spPr>
+        <p:style>
+          <a:lnRef idx="2">
+            <a:schemeClr val="accent1">
+              <a:shade val="50000"/>
+            </a:schemeClr>
+          </a:lnRef>
+          <a:fillRef idx="1">
+            <a:schemeClr val="accent1"/>
+          </a:fillRef>
+          <a:effectRef idx="0">
+            <a:schemeClr val="accent1"/>
+          </a:effectRef>
+          <a:fontRef idx="minor">
+            <a:schemeClr val="lt1"/>
+          </a:fontRef>
+        </p:style>
+        <p:txBody>
+          <a:bodyPr rtlCol="0" anchor="ctr"/>
+          <a:lstStyle/>
+          <a:p>
+            <a:pPr algn="ctr"/>
+            <a:r>
+              <a:rPr lang="en-US" altLang="ko-KR" sz="2800" dirty="0">
+                <a:solidFill>
+                  <a:schemeClr val="tx1"/>
+                </a:solidFill>
+              </a:rPr>
+              <a:t>1</a:t>
+            </a:r>
+            <a:endParaRPr lang="ko-KR" altLang="en-US" sz="2800" dirty="0">
+              <a:solidFill>
+                <a:schemeClr val="tx1"/>
+              </a:solidFill>
+            </a:endParaRPr>
+          </a:p>
+        </p:txBody>
+      </p:sp>
+      <p:sp>
+        <p:nvSpPr>
+          <p:cNvPr id="17" name="타원 16">
+            <a:extLst>
+              <a:ext uri="{FF2B5EF4-FFF2-40B4-BE49-F238E27FC236}">
+                <a16:creationId xmlns:a16="http://schemas.microsoft.com/office/drawing/2014/main" id="{C215A3C6-0CBC-475D-8CE0-9B72A9DB9BB6}"/>
+              </a:ext>
+            </a:extLst>
+          </p:cNvPr>
+          <p:cNvSpPr/>
+          <p:nvPr/>
+        </p:nvSpPr>
+        <p:spPr>
+          <a:xfrm>
+            <a:off x="2507454" y="1507960"/>
+            <a:ext cx="692728" cy="665018"/>
+          </a:xfrm>
+          <a:prstGeom prst="ellipse">
+            <a:avLst/>
+          </a:prstGeom>
+          <a:noFill/>
+          <a:ln>
+            <a:solidFill>
+              <a:schemeClr val="tx1"/>
+            </a:solidFill>
+          </a:ln>
+        </p:spPr>
+        <p:style>
+          <a:lnRef idx="2">
+            <a:schemeClr val="accent1">
+              <a:shade val="50000"/>
+            </a:schemeClr>
+          </a:lnRef>
+          <a:fillRef idx="1">
+            <a:schemeClr val="accent1"/>
+          </a:fillRef>
+          <a:effectRef idx="0">
+            <a:schemeClr val="accent1"/>
+          </a:effectRef>
+          <a:fontRef idx="minor">
+            <a:schemeClr val="lt1"/>
+          </a:fontRef>
+        </p:style>
+        <p:txBody>
+          <a:bodyPr rtlCol="0" anchor="ctr"/>
+          <a:lstStyle/>
+          <a:p>
+            <a:pPr algn="ctr"/>
+            <a:r>
+              <a:rPr lang="en-US" altLang="ko-KR" sz="2800" dirty="0">
+                <a:solidFill>
+                  <a:schemeClr val="tx1"/>
+                </a:solidFill>
+              </a:rPr>
+              <a:t>2</a:t>
+            </a:r>
+            <a:endParaRPr lang="ko-KR" altLang="en-US" sz="2800" dirty="0">
+              <a:solidFill>
+                <a:schemeClr val="tx1"/>
+              </a:solidFill>
+            </a:endParaRPr>
+          </a:p>
+        </p:txBody>
+      </p:sp>
+      <p:sp>
+        <p:nvSpPr>
+          <p:cNvPr id="18" name="타원 17">
+            <a:extLst>
+              <a:ext uri="{FF2B5EF4-FFF2-40B4-BE49-F238E27FC236}">
+                <a16:creationId xmlns:a16="http://schemas.microsoft.com/office/drawing/2014/main" id="{1A3EE17C-3C77-458E-BA26-9755489F0875}"/>
+              </a:ext>
+            </a:extLst>
+          </p:cNvPr>
+          <p:cNvSpPr/>
+          <p:nvPr/>
+        </p:nvSpPr>
+        <p:spPr>
+          <a:xfrm>
+            <a:off x="2507454" y="3642697"/>
+            <a:ext cx="692728" cy="665018"/>
+          </a:xfrm>
+          <a:prstGeom prst="ellipse">
+            <a:avLst/>
+          </a:prstGeom>
+          <a:noFill/>
+          <a:ln>
+            <a:solidFill>
+              <a:schemeClr val="tx1"/>
+            </a:solidFill>
+          </a:ln>
+        </p:spPr>
+        <p:style>
+          <a:lnRef idx="2">
+            <a:schemeClr val="accent1">
+              <a:shade val="50000"/>
+            </a:schemeClr>
+          </a:lnRef>
+          <a:fillRef idx="1">
+            <a:schemeClr val="accent1"/>
+          </a:fillRef>
+          <a:effectRef idx="0">
+            <a:schemeClr val="accent1"/>
+          </a:effectRef>
+          <a:fontRef idx="minor">
+            <a:schemeClr val="lt1"/>
+          </a:fontRef>
+        </p:style>
+        <p:txBody>
+          <a:bodyPr rtlCol="0" anchor="ctr"/>
+          <a:lstStyle/>
+          <a:p>
+            <a:pPr algn="ctr"/>
+            <a:r>
+              <a:rPr lang="en-US" altLang="ko-KR" sz="2800" dirty="0">
+                <a:solidFill>
+                  <a:schemeClr val="tx1"/>
+                </a:solidFill>
+              </a:rPr>
+              <a:t>3</a:t>
+            </a:r>
+            <a:endParaRPr lang="ko-KR" altLang="en-US" sz="2800" dirty="0">
+              <a:solidFill>
+                <a:schemeClr val="tx1"/>
+              </a:solidFill>
+            </a:endParaRPr>
+          </a:p>
+        </p:txBody>
+      </p:sp>
+      <p:sp>
+        <p:nvSpPr>
+          <p:cNvPr id="19" name="타원 18">
+            <a:extLst>
+              <a:ext uri="{FF2B5EF4-FFF2-40B4-BE49-F238E27FC236}">
+                <a16:creationId xmlns:a16="http://schemas.microsoft.com/office/drawing/2014/main" id="{481ADA12-1B71-47B0-94CA-0F0EA8C5F6AA}"/>
+              </a:ext>
+            </a:extLst>
+          </p:cNvPr>
+          <p:cNvSpPr/>
+          <p:nvPr/>
+        </p:nvSpPr>
+        <p:spPr>
+          <a:xfrm>
+            <a:off x="143020" y="3642697"/>
+            <a:ext cx="692728" cy="665018"/>
+          </a:xfrm>
+          <a:prstGeom prst="ellipse">
+            <a:avLst/>
+          </a:prstGeom>
+          <a:noFill/>
+          <a:ln>
+            <a:solidFill>
+              <a:schemeClr val="tx1"/>
+            </a:solidFill>
+          </a:ln>
+        </p:spPr>
+        <p:style>
+          <a:lnRef idx="2">
+            <a:schemeClr val="accent1">
+              <a:shade val="50000"/>
+            </a:schemeClr>
+          </a:lnRef>
+          <a:fillRef idx="1">
+            <a:schemeClr val="accent1"/>
+          </a:fillRef>
+          <a:effectRef idx="0">
+            <a:schemeClr val="accent1"/>
+          </a:effectRef>
+          <a:fontRef idx="minor">
+            <a:schemeClr val="lt1"/>
+          </a:fontRef>
+        </p:style>
+        <p:txBody>
+          <a:bodyPr rtlCol="0" anchor="ctr"/>
+          <a:lstStyle/>
+          <a:p>
+            <a:pPr algn="ctr"/>
+            <a:r>
+              <a:rPr lang="en-US" altLang="ko-KR" sz="2800" dirty="0">
+                <a:solidFill>
+                  <a:schemeClr val="tx1"/>
+                </a:solidFill>
+              </a:rPr>
+              <a:t>4</a:t>
+            </a:r>
+            <a:endParaRPr lang="ko-KR" altLang="en-US" sz="2800" dirty="0">
+              <a:solidFill>
+                <a:schemeClr val="tx1"/>
+              </a:solidFill>
+            </a:endParaRPr>
+          </a:p>
+        </p:txBody>
+      </p:sp>
+      <p:cxnSp>
+        <p:nvCxnSpPr>
+          <p:cNvPr id="4" name="직선 화살표 연결선 3">
+            <a:extLst>
+              <a:ext uri="{FF2B5EF4-FFF2-40B4-BE49-F238E27FC236}">
+                <a16:creationId xmlns:a16="http://schemas.microsoft.com/office/drawing/2014/main" id="{8D1A5D66-964B-4374-888B-6353E8EDE7A5}"/>
+              </a:ext>
+            </a:extLst>
+          </p:cNvPr>
+          <p:cNvCxnSpPr>
+            <a:stCxn id="19" idx="0"/>
+            <a:endCxn id="16" idx="4"/>
+          </p:cNvCxnSpPr>
+          <p:nvPr/>
+        </p:nvCxnSpPr>
+        <p:spPr>
+          <a:xfrm flipV="1">
+            <a:off x="489384" y="2172978"/>
+            <a:ext cx="0" cy="1469719"/>
+          </a:xfrm>
+          <a:prstGeom prst="straightConnector1">
+            <a:avLst/>
+          </a:prstGeom>
+          <a:ln>
+            <a:tailEnd type="triangle"/>
+          </a:ln>
+        </p:spPr>
+        <p:style>
+          <a:lnRef idx="1">
+            <a:schemeClr val="dk1"/>
+          </a:lnRef>
+          <a:fillRef idx="0">
+            <a:schemeClr val="dk1"/>
+          </a:fillRef>
+          <a:effectRef idx="0">
+            <a:schemeClr val="dk1"/>
+          </a:effectRef>
+          <a:fontRef idx="minor">
+            <a:schemeClr val="tx1"/>
+          </a:fontRef>
+        </p:style>
+      </p:cxnSp>
+      <p:sp>
+        <p:nvSpPr>
+          <p:cNvPr id="34" name="TextBox 33">
+            <a:extLst>
+              <a:ext uri="{FF2B5EF4-FFF2-40B4-BE49-F238E27FC236}">
+                <a16:creationId xmlns:a16="http://schemas.microsoft.com/office/drawing/2014/main" id="{92C327BA-2E94-4694-BDCA-4AE38D475893}"/>
+              </a:ext>
+            </a:extLst>
+          </p:cNvPr>
+          <p:cNvSpPr txBox="1"/>
+          <p:nvPr/>
+        </p:nvSpPr>
+        <p:spPr>
+          <a:xfrm>
+            <a:off x="1452740" y="5188341"/>
+            <a:ext cx="633507" cy="523220"/>
+          </a:xfrm>
+          <a:prstGeom prst="rect">
+            <a:avLst/>
+          </a:prstGeom>
+          <a:noFill/>
+        </p:spPr>
+        <p:txBody>
+          <a:bodyPr wrap="none" rtlCol="0">
+            <a:spAutoFit/>
+          </a:bodyPr>
+          <a:lstStyle/>
+          <a:p>
+            <a:r>
+              <a:rPr lang="en-US" altLang="ko-KR" sz="2800" dirty="0"/>
+              <a:t>G1</a:t>
+            </a:r>
+            <a:endParaRPr lang="ko-KR" altLang="en-US" sz="2800" dirty="0"/>
+          </a:p>
+        </p:txBody>
+      </p:sp>
+      <p:cxnSp>
+        <p:nvCxnSpPr>
+          <p:cNvPr id="35" name="직선 연결선 34">
+            <a:extLst>
+              <a:ext uri="{FF2B5EF4-FFF2-40B4-BE49-F238E27FC236}">
+                <a16:creationId xmlns:a16="http://schemas.microsoft.com/office/drawing/2014/main" id="{F987486E-39E7-48BA-873D-094C5C237BD8}"/>
+              </a:ext>
+            </a:extLst>
+          </p:cNvPr>
+          <p:cNvCxnSpPr>
+            <a:cxnSpLocks/>
+            <a:stCxn id="41" idx="2"/>
+            <a:endCxn id="39" idx="6"/>
+          </p:cNvCxnSpPr>
+          <p:nvPr/>
+        </p:nvCxnSpPr>
+        <p:spPr>
+          <a:xfrm flipH="1">
+            <a:off x="4925927" y="1840469"/>
+            <a:ext cx="1671706" cy="0"/>
+          </a:xfrm>
+          <a:prstGeom prst="line">
+            <a:avLst/>
+          </a:prstGeom>
+          <a:ln>
+            <a:tailEnd type="triangle"/>
+          </a:ln>
+        </p:spPr>
+        <p:style>
+          <a:lnRef idx="1">
+            <a:schemeClr val="dk1"/>
+          </a:lnRef>
+          <a:fillRef idx="0">
+            <a:schemeClr val="dk1"/>
+          </a:fillRef>
+          <a:effectRef idx="0">
+            <a:schemeClr val="dk1"/>
+          </a:effectRef>
+          <a:fontRef idx="minor">
+            <a:schemeClr val="tx1"/>
+          </a:fontRef>
+        </p:style>
+      </p:cxnSp>
+      <p:cxnSp>
+        <p:nvCxnSpPr>
+          <p:cNvPr id="36" name="직선 연결선 35">
+            <a:extLst>
+              <a:ext uri="{FF2B5EF4-FFF2-40B4-BE49-F238E27FC236}">
+                <a16:creationId xmlns:a16="http://schemas.microsoft.com/office/drawing/2014/main" id="{048AF8D6-50BB-46EB-A034-9BEEB6E30301}"/>
+              </a:ext>
+            </a:extLst>
+          </p:cNvPr>
+          <p:cNvCxnSpPr>
+            <a:cxnSpLocks/>
+            <a:stCxn id="43" idx="2"/>
+            <a:endCxn id="46" idx="6"/>
+          </p:cNvCxnSpPr>
+          <p:nvPr/>
+        </p:nvCxnSpPr>
+        <p:spPr>
+          <a:xfrm flipH="1">
+            <a:off x="4925927" y="3975206"/>
+            <a:ext cx="1671706" cy="0"/>
+          </a:xfrm>
+          <a:prstGeom prst="line">
+            <a:avLst/>
+          </a:prstGeom>
+          <a:ln>
+            <a:headEnd type="none"/>
+            <a:tailEnd type="triangle"/>
+          </a:ln>
+        </p:spPr>
+        <p:style>
+          <a:lnRef idx="1">
+            <a:schemeClr val="dk1"/>
+          </a:lnRef>
+          <a:fillRef idx="0">
+            <a:schemeClr val="dk1"/>
+          </a:fillRef>
+          <a:effectRef idx="0">
+            <a:schemeClr val="dk1"/>
+          </a:effectRef>
+          <a:fontRef idx="minor">
+            <a:schemeClr val="tx1"/>
+          </a:fontRef>
+        </p:style>
+      </p:cxnSp>
+      <p:cxnSp>
+        <p:nvCxnSpPr>
+          <p:cNvPr id="37" name="직선 연결선 36">
+            <a:extLst>
+              <a:ext uri="{FF2B5EF4-FFF2-40B4-BE49-F238E27FC236}">
+                <a16:creationId xmlns:a16="http://schemas.microsoft.com/office/drawing/2014/main" id="{9B0D83B4-589D-4CAF-86D8-57D2DF99E13D}"/>
+              </a:ext>
+            </a:extLst>
+          </p:cNvPr>
+          <p:cNvCxnSpPr>
+            <a:cxnSpLocks/>
+            <a:stCxn id="43" idx="0"/>
+            <a:endCxn id="41" idx="4"/>
+          </p:cNvCxnSpPr>
+          <p:nvPr/>
+        </p:nvCxnSpPr>
+        <p:spPr>
+          <a:xfrm flipV="1">
+            <a:off x="6943997" y="2172978"/>
+            <a:ext cx="0" cy="1469719"/>
+          </a:xfrm>
+          <a:prstGeom prst="line">
+            <a:avLst/>
+          </a:prstGeom>
+          <a:ln>
+            <a:headEnd type="triangle"/>
+          </a:ln>
+        </p:spPr>
+        <p:style>
+          <a:lnRef idx="1">
+            <a:schemeClr val="dk1"/>
+          </a:lnRef>
+          <a:fillRef idx="0">
+            <a:schemeClr val="dk1"/>
+          </a:fillRef>
+          <a:effectRef idx="0">
+            <a:schemeClr val="dk1"/>
+          </a:effectRef>
+          <a:fontRef idx="minor">
+            <a:schemeClr val="tx1"/>
+          </a:fontRef>
+        </p:style>
+      </p:cxnSp>
+      <p:cxnSp>
+        <p:nvCxnSpPr>
+          <p:cNvPr id="38" name="직선 연결선 37">
+            <a:extLst>
+              <a:ext uri="{FF2B5EF4-FFF2-40B4-BE49-F238E27FC236}">
+                <a16:creationId xmlns:a16="http://schemas.microsoft.com/office/drawing/2014/main" id="{74FB32CB-6FA0-4CBA-BC82-E36A61FE3A59}"/>
+              </a:ext>
+            </a:extLst>
+          </p:cNvPr>
+          <p:cNvCxnSpPr>
+            <a:cxnSpLocks/>
+            <a:stCxn id="41" idx="3"/>
+            <a:endCxn id="46" idx="7"/>
+          </p:cNvCxnSpPr>
+          <p:nvPr/>
+        </p:nvCxnSpPr>
+        <p:spPr>
+          <a:xfrm flipH="1">
+            <a:off x="4824479" y="2075588"/>
+            <a:ext cx="1874602" cy="1664499"/>
+          </a:xfrm>
+          <a:prstGeom prst="line">
+            <a:avLst/>
+          </a:prstGeom>
+          <a:ln>
+            <a:headEnd type="triangle"/>
+            <a:tailEnd type="none"/>
+          </a:ln>
+        </p:spPr>
+        <p:style>
+          <a:lnRef idx="1">
+            <a:schemeClr val="dk1"/>
+          </a:lnRef>
+          <a:fillRef idx="0">
+            <a:schemeClr val="dk1"/>
+          </a:fillRef>
+          <a:effectRef idx="0">
+            <a:schemeClr val="dk1"/>
+          </a:effectRef>
+          <a:fontRef idx="minor">
+            <a:schemeClr val="tx1"/>
+          </a:fontRef>
+        </p:style>
+      </p:cxnSp>
+      <p:sp>
+        <p:nvSpPr>
+          <p:cNvPr id="39" name="타원 38">
+            <a:extLst>
+              <a:ext uri="{FF2B5EF4-FFF2-40B4-BE49-F238E27FC236}">
+                <a16:creationId xmlns:a16="http://schemas.microsoft.com/office/drawing/2014/main" id="{7FB0D302-E423-445F-9728-201CC013E495}"/>
+              </a:ext>
+            </a:extLst>
+          </p:cNvPr>
+          <p:cNvSpPr/>
+          <p:nvPr/>
+        </p:nvSpPr>
+        <p:spPr>
+          <a:xfrm>
+            <a:off x="4233199" y="1507960"/>
+            <a:ext cx="692728" cy="665018"/>
+          </a:xfrm>
+          <a:prstGeom prst="ellipse">
+            <a:avLst/>
+          </a:prstGeom>
+          <a:noFill/>
+          <a:ln>
+            <a:solidFill>
+              <a:schemeClr val="tx1"/>
+            </a:solidFill>
+          </a:ln>
+        </p:spPr>
+        <p:style>
+          <a:lnRef idx="2">
+            <a:schemeClr val="accent1">
+              <a:shade val="50000"/>
+            </a:schemeClr>
+          </a:lnRef>
+          <a:fillRef idx="1">
+            <a:schemeClr val="accent1"/>
+          </a:fillRef>
+          <a:effectRef idx="0">
+            <a:schemeClr val="accent1"/>
+          </a:effectRef>
+          <a:fontRef idx="minor">
+            <a:schemeClr val="lt1"/>
+          </a:fontRef>
+        </p:style>
+        <p:txBody>
+          <a:bodyPr rtlCol="0" anchor="ctr"/>
+          <a:lstStyle/>
+          <a:p>
+            <a:pPr algn="ctr"/>
+            <a:r>
+              <a:rPr lang="en-US" altLang="ko-KR" sz="2800" dirty="0">
+                <a:solidFill>
+                  <a:schemeClr val="tx1"/>
+                </a:solidFill>
+              </a:rPr>
+              <a:t>1</a:t>
+            </a:r>
+            <a:endParaRPr lang="ko-KR" altLang="en-US" sz="2800" dirty="0">
+              <a:solidFill>
+                <a:schemeClr val="tx1"/>
+              </a:solidFill>
+            </a:endParaRPr>
+          </a:p>
+        </p:txBody>
+      </p:sp>
+      <p:sp>
+        <p:nvSpPr>
+          <p:cNvPr id="41" name="타원 40">
+            <a:extLst>
+              <a:ext uri="{FF2B5EF4-FFF2-40B4-BE49-F238E27FC236}">
+                <a16:creationId xmlns:a16="http://schemas.microsoft.com/office/drawing/2014/main" id="{33E29E34-0181-4AEF-A270-569DCEC626C3}"/>
+              </a:ext>
+            </a:extLst>
+          </p:cNvPr>
+          <p:cNvSpPr/>
+          <p:nvPr/>
+        </p:nvSpPr>
+        <p:spPr>
+          <a:xfrm>
+            <a:off x="6597633" y="1507960"/>
+            <a:ext cx="692728" cy="665018"/>
+          </a:xfrm>
+          <a:prstGeom prst="ellipse">
+            <a:avLst/>
+          </a:prstGeom>
+          <a:noFill/>
+          <a:ln>
+            <a:solidFill>
+              <a:schemeClr val="tx1"/>
+            </a:solidFill>
+          </a:ln>
+        </p:spPr>
+        <p:style>
+          <a:lnRef idx="2">
+            <a:schemeClr val="accent1">
+              <a:shade val="50000"/>
+            </a:schemeClr>
+          </a:lnRef>
+          <a:fillRef idx="1">
+            <a:schemeClr val="accent1"/>
+          </a:fillRef>
+          <a:effectRef idx="0">
+            <a:schemeClr val="accent1"/>
+          </a:effectRef>
+          <a:fontRef idx="minor">
+            <a:schemeClr val="lt1"/>
+          </a:fontRef>
+        </p:style>
+        <p:txBody>
+          <a:bodyPr rtlCol="0" anchor="ctr"/>
+          <a:lstStyle/>
+          <a:p>
+            <a:pPr algn="ctr"/>
+            <a:r>
+              <a:rPr lang="en-US" altLang="ko-KR" sz="2800" dirty="0">
+                <a:solidFill>
+                  <a:schemeClr val="tx1"/>
+                </a:solidFill>
+              </a:rPr>
+              <a:t>2</a:t>
+            </a:r>
+            <a:endParaRPr lang="ko-KR" altLang="en-US" sz="2800" dirty="0">
+              <a:solidFill>
+                <a:schemeClr val="tx1"/>
+              </a:solidFill>
+            </a:endParaRPr>
+          </a:p>
+        </p:txBody>
+      </p:sp>
+      <p:sp>
+        <p:nvSpPr>
+          <p:cNvPr id="43" name="타원 42">
+            <a:extLst>
+              <a:ext uri="{FF2B5EF4-FFF2-40B4-BE49-F238E27FC236}">
+                <a16:creationId xmlns:a16="http://schemas.microsoft.com/office/drawing/2014/main" id="{C3BBE376-9F38-4CC4-AEB5-D64101524C7F}"/>
+              </a:ext>
+            </a:extLst>
+          </p:cNvPr>
+          <p:cNvSpPr/>
+          <p:nvPr/>
+        </p:nvSpPr>
+        <p:spPr>
+          <a:xfrm>
+            <a:off x="6597633" y="3642697"/>
+            <a:ext cx="692728" cy="665018"/>
+          </a:xfrm>
+          <a:prstGeom prst="ellipse">
+            <a:avLst/>
+          </a:prstGeom>
+          <a:noFill/>
+          <a:ln>
+            <a:solidFill>
+              <a:schemeClr val="tx1"/>
+            </a:solidFill>
+          </a:ln>
+        </p:spPr>
+        <p:style>
+          <a:lnRef idx="2">
+            <a:schemeClr val="accent1">
+              <a:shade val="50000"/>
+            </a:schemeClr>
+          </a:lnRef>
+          <a:fillRef idx="1">
+            <a:schemeClr val="accent1"/>
+          </a:fillRef>
+          <a:effectRef idx="0">
+            <a:schemeClr val="accent1"/>
+          </a:effectRef>
+          <a:fontRef idx="minor">
+            <a:schemeClr val="lt1"/>
+          </a:fontRef>
+        </p:style>
+        <p:txBody>
+          <a:bodyPr rtlCol="0" anchor="ctr"/>
+          <a:lstStyle/>
+          <a:p>
+            <a:pPr algn="ctr"/>
+            <a:r>
+              <a:rPr lang="en-US" altLang="ko-KR" sz="2800" dirty="0">
+                <a:solidFill>
+                  <a:schemeClr val="tx1"/>
+                </a:solidFill>
+              </a:rPr>
+              <a:t>3</a:t>
+            </a:r>
+            <a:endParaRPr lang="ko-KR" altLang="en-US" sz="2800" dirty="0">
+              <a:solidFill>
+                <a:schemeClr val="tx1"/>
+              </a:solidFill>
+            </a:endParaRPr>
+          </a:p>
+        </p:txBody>
+      </p:sp>
+      <p:sp>
+        <p:nvSpPr>
+          <p:cNvPr id="46" name="타원 45">
+            <a:extLst>
+              <a:ext uri="{FF2B5EF4-FFF2-40B4-BE49-F238E27FC236}">
+                <a16:creationId xmlns:a16="http://schemas.microsoft.com/office/drawing/2014/main" id="{7EAFD236-7727-4729-84C7-5733B811819F}"/>
+              </a:ext>
+            </a:extLst>
+          </p:cNvPr>
+          <p:cNvSpPr/>
+          <p:nvPr/>
+        </p:nvSpPr>
+        <p:spPr>
+          <a:xfrm>
+            <a:off x="4233199" y="3642697"/>
+            <a:ext cx="692728" cy="665018"/>
+          </a:xfrm>
+          <a:prstGeom prst="ellipse">
+            <a:avLst/>
+          </a:prstGeom>
+          <a:noFill/>
+          <a:ln>
+            <a:solidFill>
+              <a:schemeClr val="tx1"/>
+            </a:solidFill>
+          </a:ln>
+        </p:spPr>
+        <p:style>
+          <a:lnRef idx="2">
+            <a:schemeClr val="accent1">
+              <a:shade val="50000"/>
+            </a:schemeClr>
+          </a:lnRef>
+          <a:fillRef idx="1">
+            <a:schemeClr val="accent1"/>
+          </a:fillRef>
+          <a:effectRef idx="0">
+            <a:schemeClr val="accent1"/>
+          </a:effectRef>
+          <a:fontRef idx="minor">
+            <a:schemeClr val="lt1"/>
+          </a:fontRef>
+        </p:style>
+        <p:txBody>
+          <a:bodyPr rtlCol="0" anchor="ctr"/>
+          <a:lstStyle/>
+          <a:p>
+            <a:pPr algn="ctr"/>
+            <a:r>
+              <a:rPr lang="en-US" altLang="ko-KR" sz="2800" dirty="0">
+                <a:solidFill>
+                  <a:schemeClr val="tx1"/>
+                </a:solidFill>
+              </a:rPr>
+              <a:t>4</a:t>
+            </a:r>
+            <a:endParaRPr lang="ko-KR" altLang="en-US" sz="2800" dirty="0">
+              <a:solidFill>
+                <a:schemeClr val="tx1"/>
+              </a:solidFill>
+            </a:endParaRPr>
+          </a:p>
+        </p:txBody>
+      </p:sp>
+      <p:cxnSp>
+        <p:nvCxnSpPr>
+          <p:cNvPr id="47" name="직선 화살표 연결선 46">
+            <a:extLst>
+              <a:ext uri="{FF2B5EF4-FFF2-40B4-BE49-F238E27FC236}">
+                <a16:creationId xmlns:a16="http://schemas.microsoft.com/office/drawing/2014/main" id="{FEE1AE72-4BB9-4CCC-94E2-7C77833D9A45}"/>
+              </a:ext>
+            </a:extLst>
+          </p:cNvPr>
+          <p:cNvCxnSpPr>
+            <a:stCxn id="46" idx="0"/>
+            <a:endCxn id="39" idx="4"/>
+          </p:cNvCxnSpPr>
+          <p:nvPr/>
+        </p:nvCxnSpPr>
+        <p:spPr>
+          <a:xfrm flipV="1">
+            <a:off x="4579563" y="2172978"/>
+            <a:ext cx="0" cy="1469719"/>
+          </a:xfrm>
+          <a:prstGeom prst="straightConnector1">
+            <a:avLst/>
+          </a:prstGeom>
+          <a:ln>
+            <a:tailEnd type="triangle"/>
+          </a:ln>
+        </p:spPr>
+        <p:style>
+          <a:lnRef idx="1">
+            <a:schemeClr val="dk1"/>
+          </a:lnRef>
+          <a:fillRef idx="0">
+            <a:schemeClr val="dk1"/>
+          </a:fillRef>
+          <a:effectRef idx="0">
+            <a:schemeClr val="dk1"/>
+          </a:effectRef>
+          <a:fontRef idx="minor">
+            <a:schemeClr val="tx1"/>
+          </a:fontRef>
+        </p:style>
+      </p:cxnSp>
+      <p:sp>
+        <p:nvSpPr>
+          <p:cNvPr id="48" name="TextBox 47">
+            <a:extLst>
+              <a:ext uri="{FF2B5EF4-FFF2-40B4-BE49-F238E27FC236}">
+                <a16:creationId xmlns:a16="http://schemas.microsoft.com/office/drawing/2014/main" id="{163C3A8C-C135-4A19-8A3B-5C76877C8A0D}"/>
+              </a:ext>
+            </a:extLst>
+          </p:cNvPr>
+          <p:cNvSpPr txBox="1"/>
+          <p:nvPr/>
+        </p:nvSpPr>
+        <p:spPr>
+          <a:xfrm>
+            <a:off x="5542919" y="5188341"/>
+            <a:ext cx="633507" cy="523220"/>
+          </a:xfrm>
+          <a:prstGeom prst="rect">
+            <a:avLst/>
+          </a:prstGeom>
+          <a:noFill/>
+        </p:spPr>
+        <p:txBody>
+          <a:bodyPr wrap="none" rtlCol="0">
+            <a:spAutoFit/>
+          </a:bodyPr>
+          <a:lstStyle/>
+          <a:p>
+            <a:r>
+              <a:rPr lang="en-US" altLang="ko-KR" sz="2800" dirty="0"/>
+              <a:t>G2</a:t>
+            </a:r>
+            <a:endParaRPr lang="ko-KR" altLang="en-US" sz="2800" dirty="0"/>
+          </a:p>
+        </p:txBody>
+      </p:sp>
+      <p:cxnSp>
+        <p:nvCxnSpPr>
+          <p:cNvPr id="49" name="직선 연결선 48">
+            <a:extLst>
+              <a:ext uri="{FF2B5EF4-FFF2-40B4-BE49-F238E27FC236}">
+                <a16:creationId xmlns:a16="http://schemas.microsoft.com/office/drawing/2014/main" id="{E68E388B-6857-4EB1-ACE9-CC15928A987F}"/>
+              </a:ext>
+            </a:extLst>
+          </p:cNvPr>
+          <p:cNvCxnSpPr>
+            <a:cxnSpLocks/>
+            <a:stCxn id="53" idx="6"/>
+            <a:endCxn id="54" idx="2"/>
+          </p:cNvCxnSpPr>
+          <p:nvPr/>
+        </p:nvCxnSpPr>
+        <p:spPr>
+          <a:xfrm>
+            <a:off x="9767521" y="1840469"/>
+            <a:ext cx="1671706" cy="0"/>
+          </a:xfrm>
+          <a:prstGeom prst="line">
+            <a:avLst/>
+          </a:prstGeom>
+          <a:ln>
+            <a:tailEnd type="triangle"/>
+          </a:ln>
+        </p:spPr>
+        <p:style>
+          <a:lnRef idx="1">
+            <a:schemeClr val="dk1"/>
+          </a:lnRef>
+          <a:fillRef idx="0">
+            <a:schemeClr val="dk1"/>
+          </a:fillRef>
+          <a:effectRef idx="0">
+            <a:schemeClr val="dk1"/>
+          </a:effectRef>
+          <a:fontRef idx="minor">
+            <a:schemeClr val="tx1"/>
+          </a:fontRef>
+        </p:style>
+      </p:cxnSp>
+      <p:cxnSp>
+        <p:nvCxnSpPr>
+          <p:cNvPr id="50" name="직선 연결선 49">
+            <a:extLst>
+              <a:ext uri="{FF2B5EF4-FFF2-40B4-BE49-F238E27FC236}">
+                <a16:creationId xmlns:a16="http://schemas.microsoft.com/office/drawing/2014/main" id="{F77FBD6F-4B58-4EC3-B8E0-647EEC43CCD7}"/>
+              </a:ext>
+            </a:extLst>
+          </p:cNvPr>
+          <p:cNvCxnSpPr>
+            <a:cxnSpLocks/>
+            <a:stCxn id="56" idx="6"/>
+            <a:endCxn id="55" idx="2"/>
+          </p:cNvCxnSpPr>
+          <p:nvPr/>
+        </p:nvCxnSpPr>
+        <p:spPr>
+          <a:xfrm>
+            <a:off x="9767521" y="3975206"/>
+            <a:ext cx="1671706" cy="0"/>
+          </a:xfrm>
+          <a:prstGeom prst="line">
+            <a:avLst/>
+          </a:prstGeom>
+          <a:ln>
+            <a:headEnd type="none"/>
+            <a:tailEnd type="triangle"/>
+          </a:ln>
+        </p:spPr>
+        <p:style>
+          <a:lnRef idx="1">
+            <a:schemeClr val="dk1"/>
+          </a:lnRef>
+          <a:fillRef idx="0">
+            <a:schemeClr val="dk1"/>
+          </a:fillRef>
+          <a:effectRef idx="0">
+            <a:schemeClr val="dk1"/>
+          </a:effectRef>
+          <a:fontRef idx="minor">
+            <a:schemeClr val="tx1"/>
+          </a:fontRef>
+        </p:style>
+      </p:cxnSp>
+      <p:cxnSp>
+        <p:nvCxnSpPr>
+          <p:cNvPr id="51" name="직선 연결선 50">
+            <a:extLst>
+              <a:ext uri="{FF2B5EF4-FFF2-40B4-BE49-F238E27FC236}">
+                <a16:creationId xmlns:a16="http://schemas.microsoft.com/office/drawing/2014/main" id="{576068A0-92FA-4B14-BC3F-B3665AC2A52F}"/>
+              </a:ext>
+            </a:extLst>
+          </p:cNvPr>
+          <p:cNvCxnSpPr>
+            <a:cxnSpLocks/>
+            <a:stCxn id="54" idx="4"/>
+            <a:endCxn id="55" idx="0"/>
+          </p:cNvCxnSpPr>
+          <p:nvPr/>
+        </p:nvCxnSpPr>
+        <p:spPr>
+          <a:xfrm>
+            <a:off x="11785591" y="2172978"/>
+            <a:ext cx="0" cy="1469719"/>
+          </a:xfrm>
+          <a:prstGeom prst="line">
+            <a:avLst/>
+          </a:prstGeom>
+          <a:ln>
+            <a:headEnd type="triangle"/>
+          </a:ln>
+        </p:spPr>
+        <p:style>
+          <a:lnRef idx="1">
+            <a:schemeClr val="dk1"/>
+          </a:lnRef>
+          <a:fillRef idx="0">
+            <a:schemeClr val="dk1"/>
+          </a:fillRef>
+          <a:effectRef idx="0">
+            <a:schemeClr val="dk1"/>
+          </a:effectRef>
+          <a:fontRef idx="minor">
+            <a:schemeClr val="tx1"/>
+          </a:fontRef>
+        </p:style>
+      </p:cxnSp>
+      <p:cxnSp>
+        <p:nvCxnSpPr>
+          <p:cNvPr id="52" name="직선 연결선 51">
+            <a:extLst>
+              <a:ext uri="{FF2B5EF4-FFF2-40B4-BE49-F238E27FC236}">
+                <a16:creationId xmlns:a16="http://schemas.microsoft.com/office/drawing/2014/main" id="{9B0A73A4-FB65-4BED-A1DE-EA88FF312403}"/>
+              </a:ext>
+            </a:extLst>
+          </p:cNvPr>
+          <p:cNvCxnSpPr>
+            <a:cxnSpLocks/>
+            <a:stCxn id="56" idx="7"/>
+            <a:endCxn id="54" idx="3"/>
+          </p:cNvCxnSpPr>
+          <p:nvPr/>
+        </p:nvCxnSpPr>
+        <p:spPr>
+          <a:xfrm flipV="1">
+            <a:off x="9666073" y="2075588"/>
+            <a:ext cx="1874602" cy="1664499"/>
+          </a:xfrm>
+          <a:prstGeom prst="line">
+            <a:avLst/>
+          </a:prstGeom>
+          <a:ln>
+            <a:headEnd type="triangle"/>
+            <a:tailEnd type="none"/>
+          </a:ln>
+        </p:spPr>
+        <p:style>
+          <a:lnRef idx="1">
+            <a:schemeClr val="dk1"/>
+          </a:lnRef>
+          <a:fillRef idx="0">
+            <a:schemeClr val="dk1"/>
+          </a:fillRef>
+          <a:effectRef idx="0">
+            <a:schemeClr val="dk1"/>
+          </a:effectRef>
+          <a:fontRef idx="minor">
+            <a:schemeClr val="tx1"/>
+          </a:fontRef>
+        </p:style>
+      </p:cxnSp>
+      <p:sp>
+        <p:nvSpPr>
+          <p:cNvPr id="53" name="타원 52">
+            <a:extLst>
+              <a:ext uri="{FF2B5EF4-FFF2-40B4-BE49-F238E27FC236}">
+                <a16:creationId xmlns:a16="http://schemas.microsoft.com/office/drawing/2014/main" id="{425EE9E3-F4E6-4E78-B8EF-032EA41E34E6}"/>
+              </a:ext>
+            </a:extLst>
+          </p:cNvPr>
+          <p:cNvSpPr/>
+          <p:nvPr/>
+        </p:nvSpPr>
+        <p:spPr>
+          <a:xfrm>
+            <a:off x="9074793" y="1507960"/>
+            <a:ext cx="692728" cy="665018"/>
+          </a:xfrm>
+          <a:prstGeom prst="ellipse">
+            <a:avLst/>
+          </a:prstGeom>
+          <a:noFill/>
+          <a:ln>
+            <a:solidFill>
+              <a:schemeClr val="tx1"/>
+            </a:solidFill>
+          </a:ln>
+        </p:spPr>
+        <p:style>
+          <a:lnRef idx="2">
+            <a:schemeClr val="accent1">
+              <a:shade val="50000"/>
+            </a:schemeClr>
+          </a:lnRef>
+          <a:fillRef idx="1">
+            <a:schemeClr val="accent1"/>
+          </a:fillRef>
+          <a:effectRef idx="0">
+            <a:schemeClr val="accent1"/>
+          </a:effectRef>
+          <a:fontRef idx="minor">
+            <a:schemeClr val="lt1"/>
+          </a:fontRef>
+        </p:style>
+        <p:txBody>
+          <a:bodyPr rtlCol="0" anchor="ctr"/>
+          <a:lstStyle/>
+          <a:p>
+            <a:pPr algn="ctr"/>
+            <a:r>
+              <a:rPr lang="en-US" altLang="ko-KR" sz="2800" dirty="0">
+                <a:solidFill>
+                  <a:schemeClr val="tx1"/>
+                </a:solidFill>
+              </a:rPr>
+              <a:t>3</a:t>
+            </a:r>
+            <a:endParaRPr lang="ko-KR" altLang="en-US" sz="2800" dirty="0">
+              <a:solidFill>
+                <a:schemeClr val="tx1"/>
+              </a:solidFill>
+            </a:endParaRPr>
+          </a:p>
+        </p:txBody>
+      </p:sp>
+      <p:sp>
+        <p:nvSpPr>
+          <p:cNvPr id="54" name="타원 53">
+            <a:extLst>
+              <a:ext uri="{FF2B5EF4-FFF2-40B4-BE49-F238E27FC236}">
+                <a16:creationId xmlns:a16="http://schemas.microsoft.com/office/drawing/2014/main" id="{F6BD69D2-0EBD-4017-AB94-B032640F168D}"/>
+              </a:ext>
+            </a:extLst>
+          </p:cNvPr>
+          <p:cNvSpPr/>
+          <p:nvPr/>
+        </p:nvSpPr>
+        <p:spPr>
+          <a:xfrm>
+            <a:off x="11439227" y="1507960"/>
+            <a:ext cx="692728" cy="665018"/>
+          </a:xfrm>
+          <a:prstGeom prst="ellipse">
+            <a:avLst/>
+          </a:prstGeom>
+          <a:noFill/>
+          <a:ln>
+            <a:solidFill>
+              <a:schemeClr val="tx1"/>
+            </a:solidFill>
+          </a:ln>
+        </p:spPr>
+        <p:style>
+          <a:lnRef idx="2">
+            <a:schemeClr val="accent1">
+              <a:shade val="50000"/>
+            </a:schemeClr>
+          </a:lnRef>
+          <a:fillRef idx="1">
+            <a:schemeClr val="accent1"/>
+          </a:fillRef>
+          <a:effectRef idx="0">
+            <a:schemeClr val="accent1"/>
+          </a:effectRef>
+          <a:fontRef idx="minor">
+            <a:schemeClr val="lt1"/>
+          </a:fontRef>
+        </p:style>
+        <p:txBody>
+          <a:bodyPr rtlCol="0" anchor="ctr"/>
+          <a:lstStyle/>
+          <a:p>
+            <a:pPr algn="ctr"/>
+            <a:r>
+              <a:rPr lang="en-US" altLang="ko-KR" sz="2800" dirty="0">
+                <a:solidFill>
+                  <a:schemeClr val="tx1"/>
+                </a:solidFill>
+              </a:rPr>
+              <a:t>4</a:t>
+            </a:r>
+            <a:endParaRPr lang="ko-KR" altLang="en-US" sz="2800" dirty="0">
+              <a:solidFill>
+                <a:schemeClr val="tx1"/>
+              </a:solidFill>
+            </a:endParaRPr>
+          </a:p>
+        </p:txBody>
+      </p:sp>
+      <p:sp>
+        <p:nvSpPr>
+          <p:cNvPr id="55" name="타원 54">
+            <a:extLst>
+              <a:ext uri="{FF2B5EF4-FFF2-40B4-BE49-F238E27FC236}">
+                <a16:creationId xmlns:a16="http://schemas.microsoft.com/office/drawing/2014/main" id="{E83F7072-BDAC-4606-98E3-3B9FD30A80E7}"/>
+              </a:ext>
+            </a:extLst>
+          </p:cNvPr>
+          <p:cNvSpPr/>
+          <p:nvPr/>
+        </p:nvSpPr>
+        <p:spPr>
+          <a:xfrm>
+            <a:off x="11439227" y="3642697"/>
+            <a:ext cx="692728" cy="665018"/>
+          </a:xfrm>
+          <a:prstGeom prst="ellipse">
+            <a:avLst/>
+          </a:prstGeom>
+          <a:noFill/>
+          <a:ln>
+            <a:solidFill>
+              <a:schemeClr val="tx1"/>
+            </a:solidFill>
+          </a:ln>
+        </p:spPr>
+        <p:style>
+          <a:lnRef idx="2">
+            <a:schemeClr val="accent1">
+              <a:shade val="50000"/>
+            </a:schemeClr>
+          </a:lnRef>
+          <a:fillRef idx="1">
+            <a:schemeClr val="accent1"/>
+          </a:fillRef>
+          <a:effectRef idx="0">
+            <a:schemeClr val="accent1"/>
+          </a:effectRef>
+          <a:fontRef idx="minor">
+            <a:schemeClr val="lt1"/>
+          </a:fontRef>
+        </p:style>
+        <p:txBody>
+          <a:bodyPr rtlCol="0" anchor="ctr"/>
+          <a:lstStyle/>
+          <a:p>
+            <a:pPr algn="ctr"/>
+            <a:r>
+              <a:rPr lang="en-US" altLang="ko-KR" sz="2800" dirty="0">
+                <a:solidFill>
+                  <a:schemeClr val="tx1"/>
+                </a:solidFill>
+              </a:rPr>
+              <a:t>5</a:t>
+            </a:r>
+            <a:endParaRPr lang="ko-KR" altLang="en-US" sz="2800" dirty="0">
+              <a:solidFill>
+                <a:schemeClr val="tx1"/>
+              </a:solidFill>
+            </a:endParaRPr>
+          </a:p>
+        </p:txBody>
+      </p:sp>
+      <p:sp>
+        <p:nvSpPr>
+          <p:cNvPr id="56" name="타원 55">
+            <a:extLst>
+              <a:ext uri="{FF2B5EF4-FFF2-40B4-BE49-F238E27FC236}">
+                <a16:creationId xmlns:a16="http://schemas.microsoft.com/office/drawing/2014/main" id="{4BEEC1E6-C1C9-4105-8099-95704D9E9FEC}"/>
+              </a:ext>
+            </a:extLst>
+          </p:cNvPr>
+          <p:cNvSpPr/>
+          <p:nvPr/>
+        </p:nvSpPr>
+        <p:spPr>
+          <a:xfrm>
+            <a:off x="9074793" y="3642697"/>
+            <a:ext cx="692728" cy="665018"/>
+          </a:xfrm>
+          <a:prstGeom prst="ellipse">
+            <a:avLst/>
+          </a:prstGeom>
+          <a:noFill/>
+          <a:ln>
+            <a:solidFill>
+              <a:schemeClr val="tx1"/>
+            </a:solidFill>
+          </a:ln>
+        </p:spPr>
+        <p:style>
+          <a:lnRef idx="2">
+            <a:schemeClr val="accent1">
+              <a:shade val="50000"/>
+            </a:schemeClr>
+          </a:lnRef>
+          <a:fillRef idx="1">
+            <a:schemeClr val="accent1"/>
+          </a:fillRef>
+          <a:effectRef idx="0">
+            <a:schemeClr val="accent1"/>
+          </a:effectRef>
+          <a:fontRef idx="minor">
+            <a:schemeClr val="lt1"/>
+          </a:fontRef>
+        </p:style>
+        <p:txBody>
+          <a:bodyPr rtlCol="0" anchor="ctr"/>
+          <a:lstStyle/>
+          <a:p>
+            <a:pPr algn="ctr"/>
+            <a:r>
+              <a:rPr lang="en-US" altLang="ko-KR" sz="2800" dirty="0">
+                <a:solidFill>
+                  <a:schemeClr val="tx1"/>
+                </a:solidFill>
+              </a:rPr>
+              <a:t>6</a:t>
+            </a:r>
+            <a:endParaRPr lang="ko-KR" altLang="en-US" sz="2800" dirty="0">
+              <a:solidFill>
+                <a:schemeClr val="tx1"/>
+              </a:solidFill>
+            </a:endParaRPr>
+          </a:p>
+        </p:txBody>
+      </p:sp>
+      <p:cxnSp>
+        <p:nvCxnSpPr>
+          <p:cNvPr id="57" name="직선 화살표 연결선 56">
+            <a:extLst>
+              <a:ext uri="{FF2B5EF4-FFF2-40B4-BE49-F238E27FC236}">
+                <a16:creationId xmlns:a16="http://schemas.microsoft.com/office/drawing/2014/main" id="{344138FA-5022-4272-9426-BFA66BB309E2}"/>
+              </a:ext>
+            </a:extLst>
+          </p:cNvPr>
+          <p:cNvCxnSpPr>
+            <a:stCxn id="56" idx="0"/>
+            <a:endCxn id="53" idx="4"/>
+          </p:cNvCxnSpPr>
+          <p:nvPr/>
+        </p:nvCxnSpPr>
+        <p:spPr>
+          <a:xfrm flipV="1">
+            <a:off x="9421157" y="2172978"/>
+            <a:ext cx="0" cy="1469719"/>
+          </a:xfrm>
+          <a:prstGeom prst="straightConnector1">
+            <a:avLst/>
+          </a:prstGeom>
+          <a:ln>
+            <a:tailEnd type="triangle"/>
+          </a:ln>
+        </p:spPr>
+        <p:style>
+          <a:lnRef idx="1">
+            <a:schemeClr val="dk1"/>
+          </a:lnRef>
+          <a:fillRef idx="0">
+            <a:schemeClr val="dk1"/>
+          </a:fillRef>
+          <a:effectRef idx="0">
+            <a:schemeClr val="dk1"/>
+          </a:effectRef>
+          <a:fontRef idx="minor">
+            <a:schemeClr val="tx1"/>
+          </a:fontRef>
+        </p:style>
+      </p:cxnSp>
+      <p:sp>
+        <p:nvSpPr>
+          <p:cNvPr id="58" name="TextBox 57">
+            <a:extLst>
+              <a:ext uri="{FF2B5EF4-FFF2-40B4-BE49-F238E27FC236}">
+                <a16:creationId xmlns:a16="http://schemas.microsoft.com/office/drawing/2014/main" id="{04F44DBE-51FB-4D51-8406-7D52B129455E}"/>
+              </a:ext>
+            </a:extLst>
+          </p:cNvPr>
+          <p:cNvSpPr txBox="1"/>
+          <p:nvPr/>
+        </p:nvSpPr>
+        <p:spPr>
+          <a:xfrm>
+            <a:off x="9839567" y="5188341"/>
+            <a:ext cx="633507" cy="523220"/>
+          </a:xfrm>
+          <a:prstGeom prst="rect">
+            <a:avLst/>
+          </a:prstGeom>
+          <a:noFill/>
+        </p:spPr>
+        <p:txBody>
+          <a:bodyPr wrap="none" rtlCol="0">
+            <a:spAutoFit/>
+          </a:bodyPr>
+          <a:lstStyle/>
+          <a:p>
+            <a:r>
+              <a:rPr lang="en-US" altLang="ko-KR" sz="2800" dirty="0"/>
+              <a:t>G3</a:t>
+            </a:r>
+            <a:endParaRPr lang="ko-KR" altLang="en-US" sz="2800" dirty="0"/>
+          </a:p>
+        </p:txBody>
+      </p:sp>
+      <p:sp>
+        <p:nvSpPr>
+          <p:cNvPr id="59" name="타원 58">
+            <a:extLst>
+              <a:ext uri="{FF2B5EF4-FFF2-40B4-BE49-F238E27FC236}">
+                <a16:creationId xmlns:a16="http://schemas.microsoft.com/office/drawing/2014/main" id="{A3CFDFF2-C257-425D-930E-10FE42CA9266}"/>
+              </a:ext>
+            </a:extLst>
+          </p:cNvPr>
+          <p:cNvSpPr/>
+          <p:nvPr/>
+        </p:nvSpPr>
+        <p:spPr>
+          <a:xfrm>
+            <a:off x="8208883" y="1507960"/>
+            <a:ext cx="692728" cy="665018"/>
+          </a:xfrm>
+          <a:prstGeom prst="ellipse">
+            <a:avLst/>
+          </a:prstGeom>
+          <a:noFill/>
+          <a:ln>
+            <a:solidFill>
+              <a:schemeClr val="tx1"/>
+            </a:solidFill>
+          </a:ln>
+        </p:spPr>
+        <p:style>
+          <a:lnRef idx="2">
+            <a:schemeClr val="accent1">
+              <a:shade val="50000"/>
+            </a:schemeClr>
+          </a:lnRef>
+          <a:fillRef idx="1">
+            <a:schemeClr val="accent1"/>
+          </a:fillRef>
+          <a:effectRef idx="0">
+            <a:schemeClr val="accent1"/>
+          </a:effectRef>
+          <a:fontRef idx="minor">
+            <a:schemeClr val="lt1"/>
+          </a:fontRef>
+        </p:style>
+        <p:txBody>
+          <a:bodyPr rtlCol="0" anchor="ctr"/>
+          <a:lstStyle/>
+          <a:p>
+            <a:pPr algn="ctr"/>
+            <a:r>
+              <a:rPr lang="en-US" altLang="ko-KR" sz="2800" dirty="0">
+                <a:solidFill>
+                  <a:schemeClr val="tx1"/>
+                </a:solidFill>
+              </a:rPr>
+              <a:t>1</a:t>
+            </a:r>
+            <a:endParaRPr lang="ko-KR" altLang="en-US" sz="2800" dirty="0">
+              <a:solidFill>
+                <a:schemeClr val="tx1"/>
+              </a:solidFill>
+            </a:endParaRPr>
+          </a:p>
+        </p:txBody>
+      </p:sp>
+      <p:sp>
+        <p:nvSpPr>
+          <p:cNvPr id="60" name="타원 59">
+            <a:extLst>
+              <a:ext uri="{FF2B5EF4-FFF2-40B4-BE49-F238E27FC236}">
+                <a16:creationId xmlns:a16="http://schemas.microsoft.com/office/drawing/2014/main" id="{0F506FA7-0C16-439B-A4A5-D1363850700B}"/>
+              </a:ext>
+            </a:extLst>
+          </p:cNvPr>
+          <p:cNvSpPr/>
+          <p:nvPr/>
+        </p:nvSpPr>
+        <p:spPr>
+          <a:xfrm>
+            <a:off x="8208883" y="3642697"/>
+            <a:ext cx="692728" cy="665018"/>
+          </a:xfrm>
+          <a:prstGeom prst="ellipse">
+            <a:avLst/>
+          </a:prstGeom>
+          <a:noFill/>
+          <a:ln>
+            <a:solidFill>
+              <a:schemeClr val="tx1"/>
+            </a:solidFill>
+          </a:ln>
+        </p:spPr>
+        <p:style>
+          <a:lnRef idx="2">
+            <a:schemeClr val="accent1">
+              <a:shade val="50000"/>
+            </a:schemeClr>
+          </a:lnRef>
+          <a:fillRef idx="1">
+            <a:schemeClr val="accent1"/>
+          </a:fillRef>
+          <a:effectRef idx="0">
+            <a:schemeClr val="accent1"/>
+          </a:effectRef>
+          <a:fontRef idx="minor">
+            <a:schemeClr val="lt1"/>
+          </a:fontRef>
+        </p:style>
+        <p:txBody>
+          <a:bodyPr rtlCol="0" anchor="ctr"/>
+          <a:lstStyle/>
+          <a:p>
+            <a:pPr algn="ctr"/>
+            <a:r>
+              <a:rPr lang="en-US" altLang="ko-KR" sz="2800" dirty="0">
+                <a:solidFill>
+                  <a:schemeClr val="tx1"/>
+                </a:solidFill>
+              </a:rPr>
+              <a:t>2</a:t>
+            </a:r>
+            <a:endParaRPr lang="ko-KR" altLang="en-US" sz="2800" dirty="0">
+              <a:solidFill>
+                <a:schemeClr val="tx1"/>
+              </a:solidFill>
+            </a:endParaRPr>
+          </a:p>
+        </p:txBody>
+      </p:sp>
+      <p:cxnSp>
+        <p:nvCxnSpPr>
+          <p:cNvPr id="61" name="직선 화살표 연결선 60">
+            <a:extLst>
+              <a:ext uri="{FF2B5EF4-FFF2-40B4-BE49-F238E27FC236}">
+                <a16:creationId xmlns:a16="http://schemas.microsoft.com/office/drawing/2014/main" id="{3C1E30AB-F342-47A5-9D1D-A3FDC0302FDA}"/>
+              </a:ext>
+            </a:extLst>
+          </p:cNvPr>
+          <p:cNvCxnSpPr>
+            <a:cxnSpLocks/>
+            <a:stCxn id="59" idx="4"/>
+            <a:endCxn id="60" idx="0"/>
+          </p:cNvCxnSpPr>
+          <p:nvPr/>
+        </p:nvCxnSpPr>
+        <p:spPr>
+          <a:xfrm>
+            <a:off x="8555247" y="2172978"/>
+            <a:ext cx="0" cy="1469719"/>
+          </a:xfrm>
+          <a:prstGeom prst="straightConnector1">
+            <a:avLst/>
+          </a:prstGeom>
+          <a:ln>
+            <a:tailEnd type="triangle"/>
+          </a:ln>
+        </p:spPr>
+        <p:style>
+          <a:lnRef idx="1">
+            <a:schemeClr val="dk1"/>
+          </a:lnRef>
+          <a:fillRef idx="0">
+            <a:schemeClr val="dk1"/>
+          </a:fillRef>
+          <a:effectRef idx="0">
+            <a:schemeClr val="dk1"/>
+          </a:effectRef>
+          <a:fontRef idx="minor">
+            <a:schemeClr val="tx1"/>
+          </a:fontRef>
+        </p:style>
+      </p:cxnSp>
+    </p:spTree>
+    <p:extLst>
+      <p:ext uri="{BB962C8B-B14F-4D97-AF65-F5344CB8AC3E}">
+        <p14:creationId xmlns:p14="http://schemas.microsoft.com/office/powerpoint/2010/main" val="698371012"/>
       </p:ext>
     </p:extLst>
   </p:cSld>

</xml_diff>

<commit_message>
weight simple complete graph
</commit_message>
<xml_diff>
--- a/graph/graph.pptx
+++ b/graph/graph.pptx
@@ -5,7 +5,7 @@
     <p:sldMasterId id="2147483648" r:id="rId1"/>
   </p:sldMasterIdLst>
   <p:notesMasterIdLst>
-    <p:notesMasterId r:id="rId9"/>
+    <p:notesMasterId r:id="rId12"/>
   </p:notesMasterIdLst>
   <p:sldIdLst>
     <p:sldId id="256" r:id="rId2"/>
@@ -15,6 +15,9 @@
     <p:sldId id="262" r:id="rId6"/>
     <p:sldId id="263" r:id="rId7"/>
     <p:sldId id="264" r:id="rId8"/>
+    <p:sldId id="265" r:id="rId9"/>
+    <p:sldId id="267" r:id="rId10"/>
+    <p:sldId id="268" r:id="rId11"/>
   </p:sldIdLst>
   <p:sldSz cx="12192000" cy="6858000"/>
   <p:notesSz cx="6858000" cy="9144000"/>
@@ -203,7 +206,7 @@
           <a:p>
             <a:fld id="{EF89B589-35CB-4095-89F3-CBA9C3D5C94E}" type="datetimeFigureOut">
               <a:rPr lang="ko-KR" altLang="en-US" smtClean="0"/>
-              <a:t>2022-03-16 Wed요일</a:t>
+              <a:t>2022-03-17 Thu요일</a:t>
             </a:fld>
             <a:endParaRPr lang="ko-KR" altLang="en-US"/>
           </a:p>
@@ -617,7 +620,7 @@
           <a:p>
             <a:fld id="{3F5DACAA-BDF7-41DD-B2E5-E4E78D96A16D}" type="datetimeFigureOut">
               <a:rPr lang="ko-KR" altLang="en-US" smtClean="0"/>
-              <a:t>2022-03-16 Wed요일</a:t>
+              <a:t>2022-03-17 Thu요일</a:t>
             </a:fld>
             <a:endParaRPr lang="ko-KR" altLang="en-US"/>
           </a:p>
@@ -815,7 +818,7 @@
           <a:p>
             <a:fld id="{3F5DACAA-BDF7-41DD-B2E5-E4E78D96A16D}" type="datetimeFigureOut">
               <a:rPr lang="ko-KR" altLang="en-US" smtClean="0"/>
-              <a:t>2022-03-16 Wed요일</a:t>
+              <a:t>2022-03-17 Thu요일</a:t>
             </a:fld>
             <a:endParaRPr lang="ko-KR" altLang="en-US"/>
           </a:p>
@@ -1023,7 +1026,7 @@
           <a:p>
             <a:fld id="{3F5DACAA-BDF7-41DD-B2E5-E4E78D96A16D}" type="datetimeFigureOut">
               <a:rPr lang="ko-KR" altLang="en-US" smtClean="0"/>
-              <a:t>2022-03-16 Wed요일</a:t>
+              <a:t>2022-03-17 Thu요일</a:t>
             </a:fld>
             <a:endParaRPr lang="ko-KR" altLang="en-US"/>
           </a:p>
@@ -1221,7 +1224,7 @@
           <a:p>
             <a:fld id="{3F5DACAA-BDF7-41DD-B2E5-E4E78D96A16D}" type="datetimeFigureOut">
               <a:rPr lang="ko-KR" altLang="en-US" smtClean="0"/>
-              <a:t>2022-03-16 Wed요일</a:t>
+              <a:t>2022-03-17 Thu요일</a:t>
             </a:fld>
             <a:endParaRPr lang="ko-KR" altLang="en-US"/>
           </a:p>
@@ -1496,7 +1499,7 @@
           <a:p>
             <a:fld id="{3F5DACAA-BDF7-41DD-B2E5-E4E78D96A16D}" type="datetimeFigureOut">
               <a:rPr lang="ko-KR" altLang="en-US" smtClean="0"/>
-              <a:t>2022-03-16 Wed요일</a:t>
+              <a:t>2022-03-17 Thu요일</a:t>
             </a:fld>
             <a:endParaRPr lang="ko-KR" altLang="en-US"/>
           </a:p>
@@ -1761,7 +1764,7 @@
           <a:p>
             <a:fld id="{3F5DACAA-BDF7-41DD-B2E5-E4E78D96A16D}" type="datetimeFigureOut">
               <a:rPr lang="ko-KR" altLang="en-US" smtClean="0"/>
-              <a:t>2022-03-16 Wed요일</a:t>
+              <a:t>2022-03-17 Thu요일</a:t>
             </a:fld>
             <a:endParaRPr lang="ko-KR" altLang="en-US"/>
           </a:p>
@@ -2173,7 +2176,7 @@
           <a:p>
             <a:fld id="{3F5DACAA-BDF7-41DD-B2E5-E4E78D96A16D}" type="datetimeFigureOut">
               <a:rPr lang="ko-KR" altLang="en-US" smtClean="0"/>
-              <a:t>2022-03-16 Wed요일</a:t>
+              <a:t>2022-03-17 Thu요일</a:t>
             </a:fld>
             <a:endParaRPr lang="ko-KR" altLang="en-US"/>
           </a:p>
@@ -2314,7 +2317,7 @@
           <a:p>
             <a:fld id="{3F5DACAA-BDF7-41DD-B2E5-E4E78D96A16D}" type="datetimeFigureOut">
               <a:rPr lang="ko-KR" altLang="en-US" smtClean="0"/>
-              <a:t>2022-03-16 Wed요일</a:t>
+              <a:t>2022-03-17 Thu요일</a:t>
             </a:fld>
             <a:endParaRPr lang="ko-KR" altLang="en-US"/>
           </a:p>
@@ -2427,7 +2430,7 @@
           <a:p>
             <a:fld id="{3F5DACAA-BDF7-41DD-B2E5-E4E78D96A16D}" type="datetimeFigureOut">
               <a:rPr lang="ko-KR" altLang="en-US" smtClean="0"/>
-              <a:t>2022-03-16 Wed요일</a:t>
+              <a:t>2022-03-17 Thu요일</a:t>
             </a:fld>
             <a:endParaRPr lang="ko-KR" altLang="en-US"/>
           </a:p>
@@ -2738,7 +2741,7 @@
           <a:p>
             <a:fld id="{3F5DACAA-BDF7-41DD-B2E5-E4E78D96A16D}" type="datetimeFigureOut">
               <a:rPr lang="ko-KR" altLang="en-US" smtClean="0"/>
-              <a:t>2022-03-16 Wed요일</a:t>
+              <a:t>2022-03-17 Thu요일</a:t>
             </a:fld>
             <a:endParaRPr lang="ko-KR" altLang="en-US"/>
           </a:p>
@@ -3026,7 +3029,7 @@
           <a:p>
             <a:fld id="{3F5DACAA-BDF7-41DD-B2E5-E4E78D96A16D}" type="datetimeFigureOut">
               <a:rPr lang="ko-KR" altLang="en-US" smtClean="0"/>
-              <a:t>2022-03-16 Wed요일</a:t>
+              <a:t>2022-03-17 Thu요일</a:t>
             </a:fld>
             <a:endParaRPr lang="ko-KR" altLang="en-US"/>
           </a:p>
@@ -3267,7 +3270,7 @@
           <a:p>
             <a:fld id="{3F5DACAA-BDF7-41DD-B2E5-E4E78D96A16D}" type="datetimeFigureOut">
               <a:rPr lang="ko-KR" altLang="en-US" smtClean="0"/>
-              <a:t>2022-03-16 Wed요일</a:t>
+              <a:t>2022-03-17 Thu요일</a:t>
             </a:fld>
             <a:endParaRPr lang="ko-KR" altLang="en-US"/>
           </a:p>
@@ -5300,6 +5303,925 @@
 </p:sld>
 </file>
 
+<file path=ppt/slides/slide10.xml><?xml version="1.0" encoding="utf-8"?>
+<p:sld xmlns:a="http://schemas.openxmlformats.org/drawingml/2006/main" xmlns:r="http://schemas.openxmlformats.org/officeDocument/2006/relationships" xmlns:p="http://schemas.openxmlformats.org/presentationml/2006/main">
+  <p:cSld>
+    <p:spTree>
+      <p:nvGrpSpPr>
+        <p:cNvPr id="1" name=""/>
+        <p:cNvGrpSpPr/>
+        <p:nvPr/>
+      </p:nvGrpSpPr>
+      <p:grpSpPr>
+        <a:xfrm>
+          <a:off x="0" y="0"/>
+          <a:ext cx="0" cy="0"/>
+          <a:chOff x="0" y="0"/>
+          <a:chExt cx="0" cy="0"/>
+        </a:xfrm>
+      </p:grpSpPr>
+      <p:cxnSp>
+        <p:nvCxnSpPr>
+          <p:cNvPr id="24" name="직선 연결선 23">
+            <a:extLst>
+              <a:ext uri="{FF2B5EF4-FFF2-40B4-BE49-F238E27FC236}">
+                <a16:creationId xmlns:a16="http://schemas.microsoft.com/office/drawing/2014/main" id="{174B7BB4-0285-4194-852E-1F2CB28878E9}"/>
+              </a:ext>
+            </a:extLst>
+          </p:cNvPr>
+          <p:cNvCxnSpPr>
+            <a:cxnSpLocks/>
+            <a:stCxn id="40" idx="6"/>
+            <a:endCxn id="42" idx="0"/>
+          </p:cNvCxnSpPr>
+          <p:nvPr/>
+        </p:nvCxnSpPr>
+        <p:spPr>
+          <a:xfrm>
+            <a:off x="3555918" y="1932832"/>
+            <a:ext cx="1009036" cy="1802228"/>
+          </a:xfrm>
+          <a:prstGeom prst="line">
+            <a:avLst/>
+          </a:prstGeom>
+        </p:spPr>
+        <p:style>
+          <a:lnRef idx="1">
+            <a:schemeClr val="dk1"/>
+          </a:lnRef>
+          <a:fillRef idx="0">
+            <a:schemeClr val="dk1"/>
+          </a:fillRef>
+          <a:effectRef idx="0">
+            <a:schemeClr val="dk1"/>
+          </a:effectRef>
+          <a:fontRef idx="minor">
+            <a:schemeClr val="tx1"/>
+          </a:fontRef>
+        </p:style>
+      </p:cxnSp>
+      <p:cxnSp>
+        <p:nvCxnSpPr>
+          <p:cNvPr id="27" name="직선 연결선 26">
+            <a:extLst>
+              <a:ext uri="{FF2B5EF4-FFF2-40B4-BE49-F238E27FC236}">
+                <a16:creationId xmlns:a16="http://schemas.microsoft.com/office/drawing/2014/main" id="{396C7BDC-EE35-487D-B2FC-FB32D097E6BB}"/>
+              </a:ext>
+            </a:extLst>
+          </p:cNvPr>
+          <p:cNvCxnSpPr>
+            <a:cxnSpLocks/>
+            <a:stCxn id="44" idx="0"/>
+            <a:endCxn id="40" idx="2"/>
+          </p:cNvCxnSpPr>
+          <p:nvPr/>
+        </p:nvCxnSpPr>
+        <p:spPr>
+          <a:xfrm flipV="1">
+            <a:off x="1854155" y="1932832"/>
+            <a:ext cx="1009035" cy="1802228"/>
+          </a:xfrm>
+          <a:prstGeom prst="line">
+            <a:avLst/>
+          </a:prstGeom>
+        </p:spPr>
+        <p:style>
+          <a:lnRef idx="1">
+            <a:schemeClr val="dk1"/>
+          </a:lnRef>
+          <a:fillRef idx="0">
+            <a:schemeClr val="dk1"/>
+          </a:fillRef>
+          <a:effectRef idx="0">
+            <a:schemeClr val="dk1"/>
+          </a:effectRef>
+          <a:fontRef idx="minor">
+            <a:schemeClr val="tx1"/>
+          </a:fontRef>
+        </p:style>
+      </p:cxnSp>
+      <p:cxnSp>
+        <p:nvCxnSpPr>
+          <p:cNvPr id="29" name="직선 연결선 28">
+            <a:extLst>
+              <a:ext uri="{FF2B5EF4-FFF2-40B4-BE49-F238E27FC236}">
+                <a16:creationId xmlns:a16="http://schemas.microsoft.com/office/drawing/2014/main" id="{407A26B2-7C10-439B-8B22-9D7566C02835}"/>
+              </a:ext>
+            </a:extLst>
+          </p:cNvPr>
+          <p:cNvCxnSpPr>
+            <a:cxnSpLocks/>
+            <a:stCxn id="42" idx="2"/>
+            <a:endCxn id="44" idx="6"/>
+          </p:cNvCxnSpPr>
+          <p:nvPr/>
+        </p:nvCxnSpPr>
+        <p:spPr>
+          <a:xfrm flipH="1">
+            <a:off x="2200519" y="4067569"/>
+            <a:ext cx="2018071" cy="0"/>
+          </a:xfrm>
+          <a:prstGeom prst="line">
+            <a:avLst/>
+          </a:prstGeom>
+        </p:spPr>
+        <p:style>
+          <a:lnRef idx="1">
+            <a:schemeClr val="dk1"/>
+          </a:lnRef>
+          <a:fillRef idx="0">
+            <a:schemeClr val="dk1"/>
+          </a:fillRef>
+          <a:effectRef idx="0">
+            <a:schemeClr val="dk1"/>
+          </a:effectRef>
+          <a:fontRef idx="minor">
+            <a:schemeClr val="tx1"/>
+          </a:fontRef>
+        </p:style>
+      </p:cxnSp>
+      <p:sp>
+        <p:nvSpPr>
+          <p:cNvPr id="61" name="TextBox 60">
+            <a:extLst>
+              <a:ext uri="{FF2B5EF4-FFF2-40B4-BE49-F238E27FC236}">
+                <a16:creationId xmlns:a16="http://schemas.microsoft.com/office/drawing/2014/main" id="{09008758-47DF-4A32-A25F-AB98F1E83CA5}"/>
+              </a:ext>
+            </a:extLst>
+          </p:cNvPr>
+          <p:cNvSpPr txBox="1"/>
+          <p:nvPr/>
+        </p:nvSpPr>
+        <p:spPr>
+          <a:xfrm>
+            <a:off x="2872681" y="4916734"/>
+            <a:ext cx="593432" cy="523220"/>
+          </a:xfrm>
+          <a:prstGeom prst="rect">
+            <a:avLst/>
+          </a:prstGeom>
+          <a:noFill/>
+        </p:spPr>
+        <p:txBody>
+          <a:bodyPr wrap="none" rtlCol="0">
+            <a:spAutoFit/>
+          </a:bodyPr>
+          <a:lstStyle/>
+          <a:p>
+            <a:r>
+              <a:rPr lang="en-US" altLang="ko-KR" sz="2800" dirty="0"/>
+              <a:t>K3</a:t>
+            </a:r>
+            <a:endParaRPr lang="ko-KR" altLang="en-US" sz="2800" dirty="0"/>
+          </a:p>
+        </p:txBody>
+      </p:sp>
+      <p:sp>
+        <p:nvSpPr>
+          <p:cNvPr id="40" name="타원 39">
+            <a:extLst>
+              <a:ext uri="{FF2B5EF4-FFF2-40B4-BE49-F238E27FC236}">
+                <a16:creationId xmlns:a16="http://schemas.microsoft.com/office/drawing/2014/main" id="{59AA9F5B-F545-4DAD-9781-41EE9AD8B901}"/>
+              </a:ext>
+            </a:extLst>
+          </p:cNvPr>
+          <p:cNvSpPr/>
+          <p:nvPr/>
+        </p:nvSpPr>
+        <p:spPr>
+          <a:xfrm>
+            <a:off x="2863190" y="1600323"/>
+            <a:ext cx="692728" cy="665018"/>
+          </a:xfrm>
+          <a:prstGeom prst="ellipse">
+            <a:avLst/>
+          </a:prstGeom>
+          <a:noFill/>
+          <a:ln>
+            <a:solidFill>
+              <a:schemeClr val="tx1"/>
+            </a:solidFill>
+          </a:ln>
+        </p:spPr>
+        <p:style>
+          <a:lnRef idx="2">
+            <a:schemeClr val="accent1">
+              <a:shade val="50000"/>
+            </a:schemeClr>
+          </a:lnRef>
+          <a:fillRef idx="1">
+            <a:schemeClr val="accent1"/>
+          </a:fillRef>
+          <a:effectRef idx="0">
+            <a:schemeClr val="accent1"/>
+          </a:effectRef>
+          <a:fontRef idx="minor">
+            <a:schemeClr val="lt1"/>
+          </a:fontRef>
+        </p:style>
+        <p:txBody>
+          <a:bodyPr rtlCol="0" anchor="ctr"/>
+          <a:lstStyle/>
+          <a:p>
+            <a:pPr algn="ctr"/>
+            <a:r>
+              <a:rPr lang="en-US" altLang="ko-KR" sz="2800" dirty="0">
+                <a:solidFill>
+                  <a:schemeClr val="tx1"/>
+                </a:solidFill>
+              </a:rPr>
+              <a:t>1</a:t>
+            </a:r>
+            <a:endParaRPr lang="ko-KR" altLang="en-US" sz="2800" dirty="0">
+              <a:solidFill>
+                <a:schemeClr val="tx1"/>
+              </a:solidFill>
+            </a:endParaRPr>
+          </a:p>
+        </p:txBody>
+      </p:sp>
+      <p:sp>
+        <p:nvSpPr>
+          <p:cNvPr id="42" name="타원 41">
+            <a:extLst>
+              <a:ext uri="{FF2B5EF4-FFF2-40B4-BE49-F238E27FC236}">
+                <a16:creationId xmlns:a16="http://schemas.microsoft.com/office/drawing/2014/main" id="{2DACC6EA-123A-4502-A000-728E19B371FF}"/>
+              </a:ext>
+            </a:extLst>
+          </p:cNvPr>
+          <p:cNvSpPr/>
+          <p:nvPr/>
+        </p:nvSpPr>
+        <p:spPr>
+          <a:xfrm>
+            <a:off x="4218590" y="3735060"/>
+            <a:ext cx="692728" cy="665018"/>
+          </a:xfrm>
+          <a:prstGeom prst="ellipse">
+            <a:avLst/>
+          </a:prstGeom>
+          <a:noFill/>
+          <a:ln>
+            <a:solidFill>
+              <a:schemeClr val="tx1"/>
+            </a:solidFill>
+          </a:ln>
+        </p:spPr>
+        <p:style>
+          <a:lnRef idx="2">
+            <a:schemeClr val="accent1">
+              <a:shade val="50000"/>
+            </a:schemeClr>
+          </a:lnRef>
+          <a:fillRef idx="1">
+            <a:schemeClr val="accent1"/>
+          </a:fillRef>
+          <a:effectRef idx="0">
+            <a:schemeClr val="accent1"/>
+          </a:effectRef>
+          <a:fontRef idx="minor">
+            <a:schemeClr val="lt1"/>
+          </a:fontRef>
+        </p:style>
+        <p:txBody>
+          <a:bodyPr rtlCol="0" anchor="ctr"/>
+          <a:lstStyle/>
+          <a:p>
+            <a:pPr algn="ctr"/>
+            <a:r>
+              <a:rPr lang="en-US" altLang="ko-KR" sz="2800" dirty="0">
+                <a:solidFill>
+                  <a:schemeClr val="tx1"/>
+                </a:solidFill>
+              </a:rPr>
+              <a:t>2</a:t>
+            </a:r>
+            <a:endParaRPr lang="ko-KR" altLang="en-US" sz="2800" dirty="0">
+              <a:solidFill>
+                <a:schemeClr val="tx1"/>
+              </a:solidFill>
+            </a:endParaRPr>
+          </a:p>
+        </p:txBody>
+      </p:sp>
+      <p:sp>
+        <p:nvSpPr>
+          <p:cNvPr id="44" name="타원 43">
+            <a:extLst>
+              <a:ext uri="{FF2B5EF4-FFF2-40B4-BE49-F238E27FC236}">
+                <a16:creationId xmlns:a16="http://schemas.microsoft.com/office/drawing/2014/main" id="{FA83D091-BF1A-4C8A-ACFA-6D6B3D103CCC}"/>
+              </a:ext>
+            </a:extLst>
+          </p:cNvPr>
+          <p:cNvSpPr/>
+          <p:nvPr/>
+        </p:nvSpPr>
+        <p:spPr>
+          <a:xfrm>
+            <a:off x="1507791" y="3735060"/>
+            <a:ext cx="692728" cy="665018"/>
+          </a:xfrm>
+          <a:prstGeom prst="ellipse">
+            <a:avLst/>
+          </a:prstGeom>
+          <a:noFill/>
+          <a:ln>
+            <a:solidFill>
+              <a:schemeClr val="tx1"/>
+            </a:solidFill>
+          </a:ln>
+        </p:spPr>
+        <p:style>
+          <a:lnRef idx="2">
+            <a:schemeClr val="accent1">
+              <a:shade val="50000"/>
+            </a:schemeClr>
+          </a:lnRef>
+          <a:fillRef idx="1">
+            <a:schemeClr val="accent1"/>
+          </a:fillRef>
+          <a:effectRef idx="0">
+            <a:schemeClr val="accent1"/>
+          </a:effectRef>
+          <a:fontRef idx="minor">
+            <a:schemeClr val="lt1"/>
+          </a:fontRef>
+        </p:style>
+        <p:txBody>
+          <a:bodyPr rtlCol="0" anchor="ctr"/>
+          <a:lstStyle/>
+          <a:p>
+            <a:pPr algn="ctr"/>
+            <a:r>
+              <a:rPr lang="en-US" altLang="ko-KR" sz="2800" dirty="0">
+                <a:solidFill>
+                  <a:schemeClr val="tx1"/>
+                </a:solidFill>
+              </a:rPr>
+              <a:t>3</a:t>
+            </a:r>
+            <a:endParaRPr lang="ko-KR" altLang="en-US" sz="2800" dirty="0">
+              <a:solidFill>
+                <a:schemeClr val="tx1"/>
+              </a:solidFill>
+            </a:endParaRPr>
+          </a:p>
+        </p:txBody>
+      </p:sp>
+      <p:cxnSp>
+        <p:nvCxnSpPr>
+          <p:cNvPr id="58" name="직선 연결선 57">
+            <a:extLst>
+              <a:ext uri="{FF2B5EF4-FFF2-40B4-BE49-F238E27FC236}">
+                <a16:creationId xmlns:a16="http://schemas.microsoft.com/office/drawing/2014/main" id="{7E9069B8-819D-46FD-A2A3-ED244CDD36B9}"/>
+              </a:ext>
+            </a:extLst>
+          </p:cNvPr>
+          <p:cNvCxnSpPr>
+            <a:cxnSpLocks/>
+            <a:stCxn id="66" idx="6"/>
+            <a:endCxn id="67" idx="2"/>
+          </p:cNvCxnSpPr>
+          <p:nvPr/>
+        </p:nvCxnSpPr>
+        <p:spPr>
+          <a:xfrm>
+            <a:off x="8319775" y="1932832"/>
+            <a:ext cx="1671706" cy="0"/>
+          </a:xfrm>
+          <a:prstGeom prst="line">
+            <a:avLst/>
+          </a:prstGeom>
+          <a:ln>
+            <a:headEnd type="none"/>
+            <a:tailEnd type="none"/>
+          </a:ln>
+        </p:spPr>
+        <p:style>
+          <a:lnRef idx="1">
+            <a:schemeClr val="dk1"/>
+          </a:lnRef>
+          <a:fillRef idx="0">
+            <a:schemeClr val="dk1"/>
+          </a:fillRef>
+          <a:effectRef idx="0">
+            <a:schemeClr val="dk1"/>
+          </a:effectRef>
+          <a:fontRef idx="minor">
+            <a:schemeClr val="tx1"/>
+          </a:fontRef>
+        </p:style>
+      </p:cxnSp>
+      <p:cxnSp>
+        <p:nvCxnSpPr>
+          <p:cNvPr id="59" name="직선 연결선 58">
+            <a:extLst>
+              <a:ext uri="{FF2B5EF4-FFF2-40B4-BE49-F238E27FC236}">
+                <a16:creationId xmlns:a16="http://schemas.microsoft.com/office/drawing/2014/main" id="{FAF223EF-FD0E-4A44-8B05-48AB496E9DB8}"/>
+              </a:ext>
+            </a:extLst>
+          </p:cNvPr>
+          <p:cNvCxnSpPr>
+            <a:cxnSpLocks/>
+            <a:stCxn id="69" idx="6"/>
+            <a:endCxn id="68" idx="2"/>
+          </p:cNvCxnSpPr>
+          <p:nvPr/>
+        </p:nvCxnSpPr>
+        <p:spPr>
+          <a:xfrm>
+            <a:off x="8319775" y="4067569"/>
+            <a:ext cx="1671706" cy="0"/>
+          </a:xfrm>
+          <a:prstGeom prst="line">
+            <a:avLst/>
+          </a:prstGeom>
+          <a:ln>
+            <a:headEnd type="none"/>
+            <a:tailEnd type="none"/>
+          </a:ln>
+        </p:spPr>
+        <p:style>
+          <a:lnRef idx="1">
+            <a:schemeClr val="dk1"/>
+          </a:lnRef>
+          <a:fillRef idx="0">
+            <a:schemeClr val="dk1"/>
+          </a:fillRef>
+          <a:effectRef idx="0">
+            <a:schemeClr val="dk1"/>
+          </a:effectRef>
+          <a:fontRef idx="minor">
+            <a:schemeClr val="tx1"/>
+          </a:fontRef>
+        </p:style>
+      </p:cxnSp>
+      <p:cxnSp>
+        <p:nvCxnSpPr>
+          <p:cNvPr id="60" name="직선 연결선 59">
+            <a:extLst>
+              <a:ext uri="{FF2B5EF4-FFF2-40B4-BE49-F238E27FC236}">
+                <a16:creationId xmlns:a16="http://schemas.microsoft.com/office/drawing/2014/main" id="{20C08349-A8F2-4C17-AE39-D8352BC8953E}"/>
+              </a:ext>
+            </a:extLst>
+          </p:cNvPr>
+          <p:cNvCxnSpPr>
+            <a:cxnSpLocks/>
+            <a:stCxn id="67" idx="4"/>
+            <a:endCxn id="68" idx="0"/>
+          </p:cNvCxnSpPr>
+          <p:nvPr/>
+        </p:nvCxnSpPr>
+        <p:spPr>
+          <a:xfrm>
+            <a:off x="10337845" y="2265341"/>
+            <a:ext cx="0" cy="1469719"/>
+          </a:xfrm>
+          <a:prstGeom prst="line">
+            <a:avLst/>
+          </a:prstGeom>
+          <a:ln>
+            <a:headEnd type="none"/>
+            <a:tailEnd type="none"/>
+          </a:ln>
+        </p:spPr>
+        <p:style>
+          <a:lnRef idx="1">
+            <a:schemeClr val="dk1"/>
+          </a:lnRef>
+          <a:fillRef idx="0">
+            <a:schemeClr val="dk1"/>
+          </a:fillRef>
+          <a:effectRef idx="0">
+            <a:schemeClr val="dk1"/>
+          </a:effectRef>
+          <a:fontRef idx="minor">
+            <a:schemeClr val="tx1"/>
+          </a:fontRef>
+        </p:style>
+      </p:cxnSp>
+      <p:sp>
+        <p:nvSpPr>
+          <p:cNvPr id="65" name="TextBox 64">
+            <a:extLst>
+              <a:ext uri="{FF2B5EF4-FFF2-40B4-BE49-F238E27FC236}">
+                <a16:creationId xmlns:a16="http://schemas.microsoft.com/office/drawing/2014/main" id="{38BC7381-AACA-48D5-B927-C55779C9E641}"/>
+              </a:ext>
+            </a:extLst>
+          </p:cNvPr>
+          <p:cNvSpPr txBox="1"/>
+          <p:nvPr/>
+        </p:nvSpPr>
+        <p:spPr>
+          <a:xfrm>
+            <a:off x="8938900" y="4916734"/>
+            <a:ext cx="593432" cy="523220"/>
+          </a:xfrm>
+          <a:prstGeom prst="rect">
+            <a:avLst/>
+          </a:prstGeom>
+          <a:noFill/>
+        </p:spPr>
+        <p:txBody>
+          <a:bodyPr wrap="none" rtlCol="0">
+            <a:spAutoFit/>
+          </a:bodyPr>
+          <a:lstStyle/>
+          <a:p>
+            <a:r>
+              <a:rPr lang="en-US" altLang="ko-KR" sz="2800" dirty="0"/>
+              <a:t>K4</a:t>
+            </a:r>
+            <a:endParaRPr lang="ko-KR" altLang="en-US" sz="2800" dirty="0"/>
+          </a:p>
+        </p:txBody>
+      </p:sp>
+      <p:sp>
+        <p:nvSpPr>
+          <p:cNvPr id="66" name="타원 65">
+            <a:extLst>
+              <a:ext uri="{FF2B5EF4-FFF2-40B4-BE49-F238E27FC236}">
+                <a16:creationId xmlns:a16="http://schemas.microsoft.com/office/drawing/2014/main" id="{ADDA561E-FEB7-45FE-96E3-101952CD9F61}"/>
+              </a:ext>
+            </a:extLst>
+          </p:cNvPr>
+          <p:cNvSpPr/>
+          <p:nvPr/>
+        </p:nvSpPr>
+        <p:spPr>
+          <a:xfrm>
+            <a:off x="7627047" y="1600323"/>
+            <a:ext cx="692728" cy="665018"/>
+          </a:xfrm>
+          <a:prstGeom prst="ellipse">
+            <a:avLst/>
+          </a:prstGeom>
+          <a:noFill/>
+          <a:ln>
+            <a:solidFill>
+              <a:schemeClr val="tx1"/>
+            </a:solidFill>
+          </a:ln>
+        </p:spPr>
+        <p:style>
+          <a:lnRef idx="2">
+            <a:schemeClr val="accent1">
+              <a:shade val="50000"/>
+            </a:schemeClr>
+          </a:lnRef>
+          <a:fillRef idx="1">
+            <a:schemeClr val="accent1"/>
+          </a:fillRef>
+          <a:effectRef idx="0">
+            <a:schemeClr val="accent1"/>
+          </a:effectRef>
+          <a:fontRef idx="minor">
+            <a:schemeClr val="lt1"/>
+          </a:fontRef>
+        </p:style>
+        <p:txBody>
+          <a:bodyPr rtlCol="0" anchor="ctr"/>
+          <a:lstStyle/>
+          <a:p>
+            <a:pPr algn="ctr"/>
+            <a:r>
+              <a:rPr lang="en-US" altLang="ko-KR" sz="2800" dirty="0">
+                <a:solidFill>
+                  <a:schemeClr val="tx1"/>
+                </a:solidFill>
+              </a:rPr>
+              <a:t>1</a:t>
+            </a:r>
+            <a:endParaRPr lang="ko-KR" altLang="en-US" sz="2800" dirty="0">
+              <a:solidFill>
+                <a:schemeClr val="tx1"/>
+              </a:solidFill>
+            </a:endParaRPr>
+          </a:p>
+        </p:txBody>
+      </p:sp>
+      <p:sp>
+        <p:nvSpPr>
+          <p:cNvPr id="67" name="타원 66">
+            <a:extLst>
+              <a:ext uri="{FF2B5EF4-FFF2-40B4-BE49-F238E27FC236}">
+                <a16:creationId xmlns:a16="http://schemas.microsoft.com/office/drawing/2014/main" id="{3027CAA9-4170-4406-A1B0-A6C6C2B92425}"/>
+              </a:ext>
+            </a:extLst>
+          </p:cNvPr>
+          <p:cNvSpPr/>
+          <p:nvPr/>
+        </p:nvSpPr>
+        <p:spPr>
+          <a:xfrm>
+            <a:off x="9991481" y="1600323"/>
+            <a:ext cx="692728" cy="665018"/>
+          </a:xfrm>
+          <a:prstGeom prst="ellipse">
+            <a:avLst/>
+          </a:prstGeom>
+          <a:noFill/>
+          <a:ln>
+            <a:solidFill>
+              <a:schemeClr val="tx1"/>
+            </a:solidFill>
+          </a:ln>
+        </p:spPr>
+        <p:style>
+          <a:lnRef idx="2">
+            <a:schemeClr val="accent1">
+              <a:shade val="50000"/>
+            </a:schemeClr>
+          </a:lnRef>
+          <a:fillRef idx="1">
+            <a:schemeClr val="accent1"/>
+          </a:fillRef>
+          <a:effectRef idx="0">
+            <a:schemeClr val="accent1"/>
+          </a:effectRef>
+          <a:fontRef idx="minor">
+            <a:schemeClr val="lt1"/>
+          </a:fontRef>
+        </p:style>
+        <p:txBody>
+          <a:bodyPr rtlCol="0" anchor="ctr"/>
+          <a:lstStyle/>
+          <a:p>
+            <a:pPr algn="ctr"/>
+            <a:r>
+              <a:rPr lang="en-US" altLang="ko-KR" sz="2800" dirty="0">
+                <a:solidFill>
+                  <a:schemeClr val="tx1"/>
+                </a:solidFill>
+              </a:rPr>
+              <a:t>2</a:t>
+            </a:r>
+            <a:endParaRPr lang="ko-KR" altLang="en-US" sz="2800" dirty="0">
+              <a:solidFill>
+                <a:schemeClr val="tx1"/>
+              </a:solidFill>
+            </a:endParaRPr>
+          </a:p>
+        </p:txBody>
+      </p:sp>
+      <p:sp>
+        <p:nvSpPr>
+          <p:cNvPr id="68" name="타원 67">
+            <a:extLst>
+              <a:ext uri="{FF2B5EF4-FFF2-40B4-BE49-F238E27FC236}">
+                <a16:creationId xmlns:a16="http://schemas.microsoft.com/office/drawing/2014/main" id="{4DF5901F-931B-4F61-B337-5A51226C74AE}"/>
+              </a:ext>
+            </a:extLst>
+          </p:cNvPr>
+          <p:cNvSpPr/>
+          <p:nvPr/>
+        </p:nvSpPr>
+        <p:spPr>
+          <a:xfrm>
+            <a:off x="9991481" y="3735060"/>
+            <a:ext cx="692728" cy="665018"/>
+          </a:xfrm>
+          <a:prstGeom prst="ellipse">
+            <a:avLst/>
+          </a:prstGeom>
+          <a:noFill/>
+          <a:ln>
+            <a:solidFill>
+              <a:schemeClr val="tx1"/>
+            </a:solidFill>
+          </a:ln>
+        </p:spPr>
+        <p:style>
+          <a:lnRef idx="2">
+            <a:schemeClr val="accent1">
+              <a:shade val="50000"/>
+            </a:schemeClr>
+          </a:lnRef>
+          <a:fillRef idx="1">
+            <a:schemeClr val="accent1"/>
+          </a:fillRef>
+          <a:effectRef idx="0">
+            <a:schemeClr val="accent1"/>
+          </a:effectRef>
+          <a:fontRef idx="minor">
+            <a:schemeClr val="lt1"/>
+          </a:fontRef>
+        </p:style>
+        <p:txBody>
+          <a:bodyPr rtlCol="0" anchor="ctr"/>
+          <a:lstStyle/>
+          <a:p>
+            <a:pPr algn="ctr"/>
+            <a:r>
+              <a:rPr lang="en-US" altLang="ko-KR" sz="2800" dirty="0">
+                <a:solidFill>
+                  <a:schemeClr val="tx1"/>
+                </a:solidFill>
+              </a:rPr>
+              <a:t>3</a:t>
+            </a:r>
+            <a:endParaRPr lang="ko-KR" altLang="en-US" sz="2800" dirty="0">
+              <a:solidFill>
+                <a:schemeClr val="tx1"/>
+              </a:solidFill>
+            </a:endParaRPr>
+          </a:p>
+        </p:txBody>
+      </p:sp>
+      <p:sp>
+        <p:nvSpPr>
+          <p:cNvPr id="69" name="타원 68">
+            <a:extLst>
+              <a:ext uri="{FF2B5EF4-FFF2-40B4-BE49-F238E27FC236}">
+                <a16:creationId xmlns:a16="http://schemas.microsoft.com/office/drawing/2014/main" id="{2CC24AC8-CD31-4007-B062-5D8B5D51282E}"/>
+              </a:ext>
+            </a:extLst>
+          </p:cNvPr>
+          <p:cNvSpPr/>
+          <p:nvPr/>
+        </p:nvSpPr>
+        <p:spPr>
+          <a:xfrm>
+            <a:off x="7627047" y="3735060"/>
+            <a:ext cx="692728" cy="665018"/>
+          </a:xfrm>
+          <a:prstGeom prst="ellipse">
+            <a:avLst/>
+          </a:prstGeom>
+          <a:noFill/>
+          <a:ln>
+            <a:solidFill>
+              <a:schemeClr val="tx1"/>
+            </a:solidFill>
+          </a:ln>
+        </p:spPr>
+        <p:style>
+          <a:lnRef idx="2">
+            <a:schemeClr val="accent1">
+              <a:shade val="50000"/>
+            </a:schemeClr>
+          </a:lnRef>
+          <a:fillRef idx="1">
+            <a:schemeClr val="accent1"/>
+          </a:fillRef>
+          <a:effectRef idx="0">
+            <a:schemeClr val="accent1"/>
+          </a:effectRef>
+          <a:fontRef idx="minor">
+            <a:schemeClr val="lt1"/>
+          </a:fontRef>
+        </p:style>
+        <p:txBody>
+          <a:bodyPr rtlCol="0" anchor="ctr"/>
+          <a:lstStyle/>
+          <a:p>
+            <a:pPr algn="ctr"/>
+            <a:r>
+              <a:rPr lang="en-US" altLang="ko-KR" sz="2800" dirty="0">
+                <a:solidFill>
+                  <a:schemeClr val="tx1"/>
+                </a:solidFill>
+              </a:rPr>
+              <a:t>4</a:t>
+            </a:r>
+            <a:endParaRPr lang="ko-KR" altLang="en-US" sz="2800" dirty="0">
+              <a:solidFill>
+                <a:schemeClr val="tx1"/>
+              </a:solidFill>
+            </a:endParaRPr>
+          </a:p>
+        </p:txBody>
+      </p:sp>
+      <p:cxnSp>
+        <p:nvCxnSpPr>
+          <p:cNvPr id="3" name="직선 연결선 2">
+            <a:extLst>
+              <a:ext uri="{FF2B5EF4-FFF2-40B4-BE49-F238E27FC236}">
+                <a16:creationId xmlns:a16="http://schemas.microsoft.com/office/drawing/2014/main" id="{26FAA8F5-3787-4CB7-B275-243029EA503C}"/>
+              </a:ext>
+            </a:extLst>
+          </p:cNvPr>
+          <p:cNvCxnSpPr>
+            <a:stCxn id="66" idx="4"/>
+            <a:endCxn id="69" idx="0"/>
+          </p:cNvCxnSpPr>
+          <p:nvPr/>
+        </p:nvCxnSpPr>
+        <p:spPr>
+          <a:xfrm>
+            <a:off x="7973411" y="2265341"/>
+            <a:ext cx="0" cy="1469719"/>
+          </a:xfrm>
+          <a:prstGeom prst="line">
+            <a:avLst/>
+          </a:prstGeom>
+        </p:spPr>
+        <p:style>
+          <a:lnRef idx="1">
+            <a:schemeClr val="dk1"/>
+          </a:lnRef>
+          <a:fillRef idx="0">
+            <a:schemeClr val="dk1"/>
+          </a:fillRef>
+          <a:effectRef idx="0">
+            <a:schemeClr val="dk1"/>
+          </a:effectRef>
+          <a:fontRef idx="minor">
+            <a:schemeClr val="tx1"/>
+          </a:fontRef>
+        </p:style>
+      </p:cxnSp>
+      <p:cxnSp>
+        <p:nvCxnSpPr>
+          <p:cNvPr id="5" name="직선 연결선 4">
+            <a:extLst>
+              <a:ext uri="{FF2B5EF4-FFF2-40B4-BE49-F238E27FC236}">
+                <a16:creationId xmlns:a16="http://schemas.microsoft.com/office/drawing/2014/main" id="{26E606BC-2845-4852-847A-25608AC2314C}"/>
+              </a:ext>
+            </a:extLst>
+          </p:cNvPr>
+          <p:cNvCxnSpPr>
+            <a:stCxn id="66" idx="5"/>
+            <a:endCxn id="68" idx="1"/>
+          </p:cNvCxnSpPr>
+          <p:nvPr/>
+        </p:nvCxnSpPr>
+        <p:spPr>
+          <a:xfrm>
+            <a:off x="8218327" y="2167951"/>
+            <a:ext cx="1874602" cy="1664499"/>
+          </a:xfrm>
+          <a:prstGeom prst="line">
+            <a:avLst/>
+          </a:prstGeom>
+        </p:spPr>
+        <p:style>
+          <a:lnRef idx="1">
+            <a:schemeClr val="dk1"/>
+          </a:lnRef>
+          <a:fillRef idx="0">
+            <a:schemeClr val="dk1"/>
+          </a:fillRef>
+          <a:effectRef idx="0">
+            <a:schemeClr val="dk1"/>
+          </a:effectRef>
+          <a:fontRef idx="minor">
+            <a:schemeClr val="tx1"/>
+          </a:fontRef>
+        </p:style>
+      </p:cxnSp>
+      <p:cxnSp>
+        <p:nvCxnSpPr>
+          <p:cNvPr id="8" name="직선 연결선 7">
+            <a:extLst>
+              <a:ext uri="{FF2B5EF4-FFF2-40B4-BE49-F238E27FC236}">
+                <a16:creationId xmlns:a16="http://schemas.microsoft.com/office/drawing/2014/main" id="{924B06EF-437B-4F4E-A8DE-8BEDA4B85389}"/>
+              </a:ext>
+            </a:extLst>
+          </p:cNvPr>
+          <p:cNvCxnSpPr>
+            <a:stCxn id="69" idx="7"/>
+            <a:endCxn id="67" idx="3"/>
+          </p:cNvCxnSpPr>
+          <p:nvPr/>
+        </p:nvCxnSpPr>
+        <p:spPr>
+          <a:xfrm flipV="1">
+            <a:off x="8218327" y="2167951"/>
+            <a:ext cx="1874602" cy="1664499"/>
+          </a:xfrm>
+          <a:prstGeom prst="line">
+            <a:avLst/>
+          </a:prstGeom>
+        </p:spPr>
+        <p:style>
+          <a:lnRef idx="1">
+            <a:schemeClr val="dk1"/>
+          </a:lnRef>
+          <a:fillRef idx="0">
+            <a:schemeClr val="dk1"/>
+          </a:fillRef>
+          <a:effectRef idx="0">
+            <a:schemeClr val="dk1"/>
+          </a:effectRef>
+          <a:fontRef idx="minor">
+            <a:schemeClr val="tx1"/>
+          </a:fontRef>
+        </p:style>
+      </p:cxnSp>
+    </p:spTree>
+    <p:extLst>
+      <p:ext uri="{BB962C8B-B14F-4D97-AF65-F5344CB8AC3E}">
+        <p14:creationId xmlns:p14="http://schemas.microsoft.com/office/powerpoint/2010/main" val="2657392791"/>
+      </p:ext>
+    </p:extLst>
+  </p:cSld>
+  <p:clrMapOvr>
+    <a:masterClrMapping/>
+  </p:clrMapOvr>
+</p:sld>
+</file>
+
 <file path=ppt/slides/slide2.xml><?xml version="1.0" encoding="utf-8"?>
 <p:sld xmlns:a="http://schemas.openxmlformats.org/drawingml/2006/main" xmlns:r="http://schemas.openxmlformats.org/officeDocument/2006/relationships" xmlns:p="http://schemas.openxmlformats.org/presentationml/2006/main">
   <p:cSld>
@@ -10442,6 +11364,1755 @@
     <p:extLst>
       <p:ext uri="{BB962C8B-B14F-4D97-AF65-F5344CB8AC3E}">
         <p14:creationId xmlns:p14="http://schemas.microsoft.com/office/powerpoint/2010/main" val="698371012"/>
+      </p:ext>
+    </p:extLst>
+  </p:cSld>
+  <p:clrMapOvr>
+    <a:masterClrMapping/>
+  </p:clrMapOvr>
+</p:sld>
+</file>
+
+<file path=ppt/slides/slide8.xml><?xml version="1.0" encoding="utf-8"?>
+<p:sld xmlns:a="http://schemas.openxmlformats.org/drawingml/2006/main" xmlns:r="http://schemas.openxmlformats.org/officeDocument/2006/relationships" xmlns:p="http://schemas.openxmlformats.org/presentationml/2006/main">
+  <p:cSld>
+    <p:spTree>
+      <p:nvGrpSpPr>
+        <p:cNvPr id="1" name=""/>
+        <p:cNvGrpSpPr/>
+        <p:nvPr/>
+      </p:nvGrpSpPr>
+      <p:grpSpPr>
+        <a:xfrm>
+          <a:off x="0" y="0"/>
+          <a:ext cx="0" cy="0"/>
+          <a:chOff x="0" y="0"/>
+          <a:chExt cx="0" cy="0"/>
+        </a:xfrm>
+      </p:grpSpPr>
+      <p:cxnSp>
+        <p:nvCxnSpPr>
+          <p:cNvPr id="24" name="직선 연결선 23">
+            <a:extLst>
+              <a:ext uri="{FF2B5EF4-FFF2-40B4-BE49-F238E27FC236}">
+                <a16:creationId xmlns:a16="http://schemas.microsoft.com/office/drawing/2014/main" id="{174B7BB4-0285-4194-852E-1F2CB28878E9}"/>
+              </a:ext>
+            </a:extLst>
+          </p:cNvPr>
+          <p:cNvCxnSpPr>
+            <a:cxnSpLocks/>
+            <a:stCxn id="40" idx="6"/>
+            <a:endCxn id="42" idx="2"/>
+          </p:cNvCxnSpPr>
+          <p:nvPr/>
+        </p:nvCxnSpPr>
+        <p:spPr>
+          <a:xfrm>
+            <a:off x="5261471" y="2025196"/>
+            <a:ext cx="1671706" cy="0"/>
+          </a:xfrm>
+          <a:prstGeom prst="line">
+            <a:avLst/>
+          </a:prstGeom>
+        </p:spPr>
+        <p:style>
+          <a:lnRef idx="1">
+            <a:schemeClr val="dk1"/>
+          </a:lnRef>
+          <a:fillRef idx="0">
+            <a:schemeClr val="dk1"/>
+          </a:fillRef>
+          <a:effectRef idx="0">
+            <a:schemeClr val="dk1"/>
+          </a:effectRef>
+          <a:fontRef idx="minor">
+            <a:schemeClr val="tx1"/>
+          </a:fontRef>
+        </p:style>
+      </p:cxnSp>
+      <p:cxnSp>
+        <p:nvCxnSpPr>
+          <p:cNvPr id="27" name="직선 연결선 26">
+            <a:extLst>
+              <a:ext uri="{FF2B5EF4-FFF2-40B4-BE49-F238E27FC236}">
+                <a16:creationId xmlns:a16="http://schemas.microsoft.com/office/drawing/2014/main" id="{396C7BDC-EE35-487D-B2FC-FB32D097E6BB}"/>
+              </a:ext>
+            </a:extLst>
+          </p:cNvPr>
+          <p:cNvCxnSpPr>
+            <a:cxnSpLocks/>
+            <a:stCxn id="45" idx="6"/>
+            <a:endCxn id="44" idx="2"/>
+          </p:cNvCxnSpPr>
+          <p:nvPr/>
+        </p:nvCxnSpPr>
+        <p:spPr>
+          <a:xfrm>
+            <a:off x="5261471" y="4159933"/>
+            <a:ext cx="1671706" cy="0"/>
+          </a:xfrm>
+          <a:prstGeom prst="line">
+            <a:avLst/>
+          </a:prstGeom>
+        </p:spPr>
+        <p:style>
+          <a:lnRef idx="1">
+            <a:schemeClr val="dk1"/>
+          </a:lnRef>
+          <a:fillRef idx="0">
+            <a:schemeClr val="dk1"/>
+          </a:fillRef>
+          <a:effectRef idx="0">
+            <a:schemeClr val="dk1"/>
+          </a:effectRef>
+          <a:fontRef idx="minor">
+            <a:schemeClr val="tx1"/>
+          </a:fontRef>
+        </p:style>
+      </p:cxnSp>
+      <p:cxnSp>
+        <p:nvCxnSpPr>
+          <p:cNvPr id="29" name="직선 연결선 28">
+            <a:extLst>
+              <a:ext uri="{FF2B5EF4-FFF2-40B4-BE49-F238E27FC236}">
+                <a16:creationId xmlns:a16="http://schemas.microsoft.com/office/drawing/2014/main" id="{407A26B2-7C10-439B-8B22-9D7566C02835}"/>
+              </a:ext>
+            </a:extLst>
+          </p:cNvPr>
+          <p:cNvCxnSpPr>
+            <a:cxnSpLocks/>
+            <a:stCxn id="42" idx="4"/>
+            <a:endCxn id="44" idx="0"/>
+          </p:cNvCxnSpPr>
+          <p:nvPr/>
+        </p:nvCxnSpPr>
+        <p:spPr>
+          <a:xfrm>
+            <a:off x="7279541" y="2357705"/>
+            <a:ext cx="0" cy="1469719"/>
+          </a:xfrm>
+          <a:prstGeom prst="line">
+            <a:avLst/>
+          </a:prstGeom>
+        </p:spPr>
+        <p:style>
+          <a:lnRef idx="1">
+            <a:schemeClr val="dk1"/>
+          </a:lnRef>
+          <a:fillRef idx="0">
+            <a:schemeClr val="dk1"/>
+          </a:fillRef>
+          <a:effectRef idx="0">
+            <a:schemeClr val="dk1"/>
+          </a:effectRef>
+          <a:fontRef idx="minor">
+            <a:schemeClr val="tx1"/>
+          </a:fontRef>
+        </p:style>
+      </p:cxnSp>
+      <p:cxnSp>
+        <p:nvCxnSpPr>
+          <p:cNvPr id="31" name="직선 연결선 30">
+            <a:extLst>
+              <a:ext uri="{FF2B5EF4-FFF2-40B4-BE49-F238E27FC236}">
+                <a16:creationId xmlns:a16="http://schemas.microsoft.com/office/drawing/2014/main" id="{233583B9-D36C-42C5-8E41-C1476F68ADE0}"/>
+              </a:ext>
+            </a:extLst>
+          </p:cNvPr>
+          <p:cNvCxnSpPr>
+            <a:cxnSpLocks/>
+            <a:stCxn id="45" idx="7"/>
+            <a:endCxn id="42" idx="3"/>
+          </p:cNvCxnSpPr>
+          <p:nvPr/>
+        </p:nvCxnSpPr>
+        <p:spPr>
+          <a:xfrm flipV="1">
+            <a:off x="5160023" y="2260315"/>
+            <a:ext cx="1874602" cy="1664499"/>
+          </a:xfrm>
+          <a:prstGeom prst="line">
+            <a:avLst/>
+          </a:prstGeom>
+        </p:spPr>
+        <p:style>
+          <a:lnRef idx="1">
+            <a:schemeClr val="dk1"/>
+          </a:lnRef>
+          <a:fillRef idx="0">
+            <a:schemeClr val="dk1"/>
+          </a:fillRef>
+          <a:effectRef idx="0">
+            <a:schemeClr val="dk1"/>
+          </a:effectRef>
+          <a:fontRef idx="minor">
+            <a:schemeClr val="tx1"/>
+          </a:fontRef>
+        </p:style>
+      </p:cxnSp>
+      <p:sp>
+        <p:nvSpPr>
+          <p:cNvPr id="40" name="타원 39">
+            <a:extLst>
+              <a:ext uri="{FF2B5EF4-FFF2-40B4-BE49-F238E27FC236}">
+                <a16:creationId xmlns:a16="http://schemas.microsoft.com/office/drawing/2014/main" id="{59AA9F5B-F545-4DAD-9781-41EE9AD8B901}"/>
+              </a:ext>
+            </a:extLst>
+          </p:cNvPr>
+          <p:cNvSpPr/>
+          <p:nvPr/>
+        </p:nvSpPr>
+        <p:spPr>
+          <a:xfrm>
+            <a:off x="4568743" y="1692687"/>
+            <a:ext cx="692728" cy="665018"/>
+          </a:xfrm>
+          <a:prstGeom prst="ellipse">
+            <a:avLst/>
+          </a:prstGeom>
+          <a:noFill/>
+          <a:ln>
+            <a:solidFill>
+              <a:schemeClr val="tx1"/>
+            </a:solidFill>
+          </a:ln>
+        </p:spPr>
+        <p:style>
+          <a:lnRef idx="2">
+            <a:schemeClr val="accent1">
+              <a:shade val="50000"/>
+            </a:schemeClr>
+          </a:lnRef>
+          <a:fillRef idx="1">
+            <a:schemeClr val="accent1"/>
+          </a:fillRef>
+          <a:effectRef idx="0">
+            <a:schemeClr val="accent1"/>
+          </a:effectRef>
+          <a:fontRef idx="minor">
+            <a:schemeClr val="lt1"/>
+          </a:fontRef>
+        </p:style>
+        <p:txBody>
+          <a:bodyPr rtlCol="0" anchor="ctr"/>
+          <a:lstStyle/>
+          <a:p>
+            <a:pPr algn="ctr"/>
+            <a:r>
+              <a:rPr lang="en-US" altLang="ko-KR" sz="2800" dirty="0">
+                <a:solidFill>
+                  <a:schemeClr val="tx1"/>
+                </a:solidFill>
+              </a:rPr>
+              <a:t>1</a:t>
+            </a:r>
+            <a:endParaRPr lang="ko-KR" altLang="en-US" sz="2800" dirty="0">
+              <a:solidFill>
+                <a:schemeClr val="tx1"/>
+              </a:solidFill>
+            </a:endParaRPr>
+          </a:p>
+        </p:txBody>
+      </p:sp>
+      <p:sp>
+        <p:nvSpPr>
+          <p:cNvPr id="42" name="타원 41">
+            <a:extLst>
+              <a:ext uri="{FF2B5EF4-FFF2-40B4-BE49-F238E27FC236}">
+                <a16:creationId xmlns:a16="http://schemas.microsoft.com/office/drawing/2014/main" id="{2DACC6EA-123A-4502-A000-728E19B371FF}"/>
+              </a:ext>
+            </a:extLst>
+          </p:cNvPr>
+          <p:cNvSpPr/>
+          <p:nvPr/>
+        </p:nvSpPr>
+        <p:spPr>
+          <a:xfrm>
+            <a:off x="6933177" y="1692687"/>
+            <a:ext cx="692728" cy="665018"/>
+          </a:xfrm>
+          <a:prstGeom prst="ellipse">
+            <a:avLst/>
+          </a:prstGeom>
+          <a:noFill/>
+          <a:ln>
+            <a:solidFill>
+              <a:schemeClr val="tx1"/>
+            </a:solidFill>
+          </a:ln>
+        </p:spPr>
+        <p:style>
+          <a:lnRef idx="2">
+            <a:schemeClr val="accent1">
+              <a:shade val="50000"/>
+            </a:schemeClr>
+          </a:lnRef>
+          <a:fillRef idx="1">
+            <a:schemeClr val="accent1"/>
+          </a:fillRef>
+          <a:effectRef idx="0">
+            <a:schemeClr val="accent1"/>
+          </a:effectRef>
+          <a:fontRef idx="minor">
+            <a:schemeClr val="lt1"/>
+          </a:fontRef>
+        </p:style>
+        <p:txBody>
+          <a:bodyPr rtlCol="0" anchor="ctr"/>
+          <a:lstStyle/>
+          <a:p>
+            <a:pPr algn="ctr"/>
+            <a:r>
+              <a:rPr lang="en-US" altLang="ko-KR" sz="2800" dirty="0">
+                <a:solidFill>
+                  <a:schemeClr val="tx1"/>
+                </a:solidFill>
+              </a:rPr>
+              <a:t>2</a:t>
+            </a:r>
+            <a:endParaRPr lang="ko-KR" altLang="en-US" sz="2800" dirty="0">
+              <a:solidFill>
+                <a:schemeClr val="tx1"/>
+              </a:solidFill>
+            </a:endParaRPr>
+          </a:p>
+        </p:txBody>
+      </p:sp>
+      <p:sp>
+        <p:nvSpPr>
+          <p:cNvPr id="44" name="타원 43">
+            <a:extLst>
+              <a:ext uri="{FF2B5EF4-FFF2-40B4-BE49-F238E27FC236}">
+                <a16:creationId xmlns:a16="http://schemas.microsoft.com/office/drawing/2014/main" id="{FA83D091-BF1A-4C8A-ACFA-6D6B3D103CCC}"/>
+              </a:ext>
+            </a:extLst>
+          </p:cNvPr>
+          <p:cNvSpPr/>
+          <p:nvPr/>
+        </p:nvSpPr>
+        <p:spPr>
+          <a:xfrm>
+            <a:off x="6933177" y="3827424"/>
+            <a:ext cx="692728" cy="665018"/>
+          </a:xfrm>
+          <a:prstGeom prst="ellipse">
+            <a:avLst/>
+          </a:prstGeom>
+          <a:noFill/>
+          <a:ln>
+            <a:solidFill>
+              <a:schemeClr val="tx1"/>
+            </a:solidFill>
+          </a:ln>
+        </p:spPr>
+        <p:style>
+          <a:lnRef idx="2">
+            <a:schemeClr val="accent1">
+              <a:shade val="50000"/>
+            </a:schemeClr>
+          </a:lnRef>
+          <a:fillRef idx="1">
+            <a:schemeClr val="accent1"/>
+          </a:fillRef>
+          <a:effectRef idx="0">
+            <a:schemeClr val="accent1"/>
+          </a:effectRef>
+          <a:fontRef idx="minor">
+            <a:schemeClr val="lt1"/>
+          </a:fontRef>
+        </p:style>
+        <p:txBody>
+          <a:bodyPr rtlCol="0" anchor="ctr"/>
+          <a:lstStyle/>
+          <a:p>
+            <a:pPr algn="ctr"/>
+            <a:r>
+              <a:rPr lang="en-US" altLang="ko-KR" sz="2800" dirty="0">
+                <a:solidFill>
+                  <a:schemeClr val="tx1"/>
+                </a:solidFill>
+              </a:rPr>
+              <a:t>3</a:t>
+            </a:r>
+            <a:endParaRPr lang="ko-KR" altLang="en-US" sz="2800" dirty="0">
+              <a:solidFill>
+                <a:schemeClr val="tx1"/>
+              </a:solidFill>
+            </a:endParaRPr>
+          </a:p>
+        </p:txBody>
+      </p:sp>
+      <p:sp>
+        <p:nvSpPr>
+          <p:cNvPr id="45" name="타원 44">
+            <a:extLst>
+              <a:ext uri="{FF2B5EF4-FFF2-40B4-BE49-F238E27FC236}">
+                <a16:creationId xmlns:a16="http://schemas.microsoft.com/office/drawing/2014/main" id="{563D74F2-4303-49E1-8509-1DEFDE0B1B5B}"/>
+              </a:ext>
+            </a:extLst>
+          </p:cNvPr>
+          <p:cNvSpPr/>
+          <p:nvPr/>
+        </p:nvSpPr>
+        <p:spPr>
+          <a:xfrm>
+            <a:off x="4568743" y="3827424"/>
+            <a:ext cx="692728" cy="665018"/>
+          </a:xfrm>
+          <a:prstGeom prst="ellipse">
+            <a:avLst/>
+          </a:prstGeom>
+          <a:noFill/>
+          <a:ln>
+            <a:solidFill>
+              <a:schemeClr val="tx1"/>
+            </a:solidFill>
+          </a:ln>
+        </p:spPr>
+        <p:style>
+          <a:lnRef idx="2">
+            <a:schemeClr val="accent1">
+              <a:shade val="50000"/>
+            </a:schemeClr>
+          </a:lnRef>
+          <a:fillRef idx="1">
+            <a:schemeClr val="accent1"/>
+          </a:fillRef>
+          <a:effectRef idx="0">
+            <a:schemeClr val="accent1"/>
+          </a:effectRef>
+          <a:fontRef idx="minor">
+            <a:schemeClr val="lt1"/>
+          </a:fontRef>
+        </p:style>
+        <p:txBody>
+          <a:bodyPr rtlCol="0" anchor="ctr"/>
+          <a:lstStyle/>
+          <a:p>
+            <a:pPr algn="ctr"/>
+            <a:r>
+              <a:rPr lang="en-US" altLang="ko-KR" sz="2800" dirty="0">
+                <a:solidFill>
+                  <a:schemeClr val="tx1"/>
+                </a:solidFill>
+              </a:rPr>
+              <a:t>4</a:t>
+            </a:r>
+            <a:endParaRPr lang="ko-KR" altLang="en-US" sz="2800" dirty="0">
+              <a:solidFill>
+                <a:schemeClr val="tx1"/>
+              </a:solidFill>
+            </a:endParaRPr>
+          </a:p>
+        </p:txBody>
+      </p:sp>
+      <p:sp>
+        <p:nvSpPr>
+          <p:cNvPr id="12" name="TextBox 11">
+            <a:extLst>
+              <a:ext uri="{FF2B5EF4-FFF2-40B4-BE49-F238E27FC236}">
+                <a16:creationId xmlns:a16="http://schemas.microsoft.com/office/drawing/2014/main" id="{73FF9700-A2AA-47BF-9232-826912AFFC91}"/>
+              </a:ext>
+            </a:extLst>
+          </p:cNvPr>
+          <p:cNvSpPr txBox="1"/>
+          <p:nvPr/>
+        </p:nvSpPr>
+        <p:spPr>
+          <a:xfrm>
+            <a:off x="5956834" y="1501976"/>
+            <a:ext cx="381836" cy="523220"/>
+          </a:xfrm>
+          <a:prstGeom prst="rect">
+            <a:avLst/>
+          </a:prstGeom>
+          <a:noFill/>
+        </p:spPr>
+        <p:txBody>
+          <a:bodyPr wrap="none" rtlCol="0">
+            <a:spAutoFit/>
+          </a:bodyPr>
+          <a:lstStyle/>
+          <a:p>
+            <a:r>
+              <a:rPr lang="en-US" altLang="ko-KR" sz="2800" dirty="0"/>
+              <a:t>5</a:t>
+            </a:r>
+            <a:endParaRPr lang="ko-KR" altLang="en-US" sz="2800" dirty="0"/>
+          </a:p>
+        </p:txBody>
+      </p:sp>
+      <p:sp>
+        <p:nvSpPr>
+          <p:cNvPr id="13" name="TextBox 12">
+            <a:extLst>
+              <a:ext uri="{FF2B5EF4-FFF2-40B4-BE49-F238E27FC236}">
+                <a16:creationId xmlns:a16="http://schemas.microsoft.com/office/drawing/2014/main" id="{1629AAEA-18A6-49D9-9A9D-0E1383D002CC}"/>
+              </a:ext>
+            </a:extLst>
+          </p:cNvPr>
+          <p:cNvSpPr txBox="1"/>
+          <p:nvPr/>
+        </p:nvSpPr>
+        <p:spPr>
+          <a:xfrm>
+            <a:off x="5956834" y="2548416"/>
+            <a:ext cx="381836" cy="523220"/>
+          </a:xfrm>
+          <a:prstGeom prst="rect">
+            <a:avLst/>
+          </a:prstGeom>
+          <a:noFill/>
+        </p:spPr>
+        <p:txBody>
+          <a:bodyPr wrap="none" rtlCol="0">
+            <a:spAutoFit/>
+          </a:bodyPr>
+          <a:lstStyle/>
+          <a:p>
+            <a:r>
+              <a:rPr lang="en-US" altLang="ko-KR" sz="2800" dirty="0"/>
+              <a:t>7</a:t>
+            </a:r>
+            <a:endParaRPr lang="ko-KR" altLang="en-US" sz="2800" dirty="0"/>
+          </a:p>
+        </p:txBody>
+      </p:sp>
+      <p:sp>
+        <p:nvSpPr>
+          <p:cNvPr id="14" name="TextBox 13">
+            <a:extLst>
+              <a:ext uri="{FF2B5EF4-FFF2-40B4-BE49-F238E27FC236}">
+                <a16:creationId xmlns:a16="http://schemas.microsoft.com/office/drawing/2014/main" id="{68CA6062-D1D1-4E8D-B306-0FF6BED12B88}"/>
+              </a:ext>
+            </a:extLst>
+          </p:cNvPr>
+          <p:cNvSpPr txBox="1"/>
+          <p:nvPr/>
+        </p:nvSpPr>
+        <p:spPr>
+          <a:xfrm>
+            <a:off x="7333540" y="2810026"/>
+            <a:ext cx="381836" cy="523220"/>
+          </a:xfrm>
+          <a:prstGeom prst="rect">
+            <a:avLst/>
+          </a:prstGeom>
+          <a:noFill/>
+        </p:spPr>
+        <p:txBody>
+          <a:bodyPr wrap="none" rtlCol="0">
+            <a:spAutoFit/>
+          </a:bodyPr>
+          <a:lstStyle/>
+          <a:p>
+            <a:r>
+              <a:rPr lang="en-US" altLang="ko-KR" sz="2800" dirty="0"/>
+              <a:t>1</a:t>
+            </a:r>
+            <a:endParaRPr lang="ko-KR" altLang="en-US" sz="2800" dirty="0"/>
+          </a:p>
+        </p:txBody>
+      </p:sp>
+      <p:sp>
+        <p:nvSpPr>
+          <p:cNvPr id="15" name="TextBox 14">
+            <a:extLst>
+              <a:ext uri="{FF2B5EF4-FFF2-40B4-BE49-F238E27FC236}">
+                <a16:creationId xmlns:a16="http://schemas.microsoft.com/office/drawing/2014/main" id="{57CE85A3-44ED-4426-B6B8-D88D14EA652D}"/>
+              </a:ext>
+            </a:extLst>
+          </p:cNvPr>
+          <p:cNvSpPr txBox="1"/>
+          <p:nvPr/>
+        </p:nvSpPr>
+        <p:spPr>
+          <a:xfrm>
+            <a:off x="5956834" y="4159932"/>
+            <a:ext cx="381836" cy="523220"/>
+          </a:xfrm>
+          <a:prstGeom prst="rect">
+            <a:avLst/>
+          </a:prstGeom>
+          <a:noFill/>
+        </p:spPr>
+        <p:txBody>
+          <a:bodyPr wrap="none" rtlCol="0">
+            <a:spAutoFit/>
+          </a:bodyPr>
+          <a:lstStyle/>
+          <a:p>
+            <a:r>
+              <a:rPr lang="en-US" altLang="ko-KR" sz="2800" dirty="0"/>
+              <a:t>8</a:t>
+            </a:r>
+            <a:endParaRPr lang="ko-KR" altLang="en-US" sz="2800" dirty="0"/>
+          </a:p>
+        </p:txBody>
+      </p:sp>
+    </p:spTree>
+    <p:extLst>
+      <p:ext uri="{BB962C8B-B14F-4D97-AF65-F5344CB8AC3E}">
+        <p14:creationId xmlns:p14="http://schemas.microsoft.com/office/powerpoint/2010/main" val="1182925971"/>
+      </p:ext>
+    </p:extLst>
+  </p:cSld>
+  <p:clrMapOvr>
+    <a:masterClrMapping/>
+  </p:clrMapOvr>
+</p:sld>
+</file>
+
+<file path=ppt/slides/slide9.xml><?xml version="1.0" encoding="utf-8"?>
+<p:sld xmlns:a="http://schemas.openxmlformats.org/drawingml/2006/main" xmlns:r="http://schemas.openxmlformats.org/officeDocument/2006/relationships" xmlns:p="http://schemas.openxmlformats.org/presentationml/2006/main">
+  <p:cSld>
+    <p:spTree>
+      <p:nvGrpSpPr>
+        <p:cNvPr id="1" name=""/>
+        <p:cNvGrpSpPr/>
+        <p:nvPr/>
+      </p:nvGrpSpPr>
+      <p:grpSpPr>
+        <a:xfrm>
+          <a:off x="0" y="0"/>
+          <a:ext cx="0" cy="0"/>
+          <a:chOff x="0" y="0"/>
+          <a:chExt cx="0" cy="0"/>
+        </a:xfrm>
+      </p:grpSpPr>
+      <p:cxnSp>
+        <p:nvCxnSpPr>
+          <p:cNvPr id="24" name="직선 연결선 23">
+            <a:extLst>
+              <a:ext uri="{FF2B5EF4-FFF2-40B4-BE49-F238E27FC236}">
+                <a16:creationId xmlns:a16="http://schemas.microsoft.com/office/drawing/2014/main" id="{174B7BB4-0285-4194-852E-1F2CB28878E9}"/>
+              </a:ext>
+            </a:extLst>
+          </p:cNvPr>
+          <p:cNvCxnSpPr>
+            <a:cxnSpLocks/>
+            <a:stCxn id="40" idx="6"/>
+            <a:endCxn id="42" idx="2"/>
+          </p:cNvCxnSpPr>
+          <p:nvPr/>
+        </p:nvCxnSpPr>
+        <p:spPr>
+          <a:xfrm>
+            <a:off x="2333544" y="1932832"/>
+            <a:ext cx="1671706" cy="0"/>
+          </a:xfrm>
+          <a:prstGeom prst="line">
+            <a:avLst/>
+          </a:prstGeom>
+        </p:spPr>
+        <p:style>
+          <a:lnRef idx="1">
+            <a:schemeClr val="dk1"/>
+          </a:lnRef>
+          <a:fillRef idx="0">
+            <a:schemeClr val="dk1"/>
+          </a:fillRef>
+          <a:effectRef idx="0">
+            <a:schemeClr val="dk1"/>
+          </a:effectRef>
+          <a:fontRef idx="minor">
+            <a:schemeClr val="tx1"/>
+          </a:fontRef>
+        </p:style>
+      </p:cxnSp>
+      <p:cxnSp>
+        <p:nvCxnSpPr>
+          <p:cNvPr id="27" name="직선 연결선 26">
+            <a:extLst>
+              <a:ext uri="{FF2B5EF4-FFF2-40B4-BE49-F238E27FC236}">
+                <a16:creationId xmlns:a16="http://schemas.microsoft.com/office/drawing/2014/main" id="{396C7BDC-EE35-487D-B2FC-FB32D097E6BB}"/>
+              </a:ext>
+            </a:extLst>
+          </p:cNvPr>
+          <p:cNvCxnSpPr>
+            <a:cxnSpLocks/>
+            <a:stCxn id="45" idx="6"/>
+            <a:endCxn id="44" idx="2"/>
+          </p:cNvCxnSpPr>
+          <p:nvPr/>
+        </p:nvCxnSpPr>
+        <p:spPr>
+          <a:xfrm>
+            <a:off x="2333544" y="4067569"/>
+            <a:ext cx="1671706" cy="0"/>
+          </a:xfrm>
+          <a:prstGeom prst="line">
+            <a:avLst/>
+          </a:prstGeom>
+        </p:spPr>
+        <p:style>
+          <a:lnRef idx="1">
+            <a:schemeClr val="dk1"/>
+          </a:lnRef>
+          <a:fillRef idx="0">
+            <a:schemeClr val="dk1"/>
+          </a:fillRef>
+          <a:effectRef idx="0">
+            <a:schemeClr val="dk1"/>
+          </a:effectRef>
+          <a:fontRef idx="minor">
+            <a:schemeClr val="tx1"/>
+          </a:fontRef>
+        </p:style>
+      </p:cxnSp>
+      <p:cxnSp>
+        <p:nvCxnSpPr>
+          <p:cNvPr id="29" name="직선 연결선 28">
+            <a:extLst>
+              <a:ext uri="{FF2B5EF4-FFF2-40B4-BE49-F238E27FC236}">
+                <a16:creationId xmlns:a16="http://schemas.microsoft.com/office/drawing/2014/main" id="{407A26B2-7C10-439B-8B22-9D7566C02835}"/>
+              </a:ext>
+            </a:extLst>
+          </p:cNvPr>
+          <p:cNvCxnSpPr>
+            <a:cxnSpLocks/>
+            <a:stCxn id="42" idx="4"/>
+            <a:endCxn id="44" idx="0"/>
+          </p:cNvCxnSpPr>
+          <p:nvPr/>
+        </p:nvCxnSpPr>
+        <p:spPr>
+          <a:xfrm>
+            <a:off x="4351614" y="2265341"/>
+            <a:ext cx="0" cy="1469719"/>
+          </a:xfrm>
+          <a:prstGeom prst="line">
+            <a:avLst/>
+          </a:prstGeom>
+        </p:spPr>
+        <p:style>
+          <a:lnRef idx="1">
+            <a:schemeClr val="dk1"/>
+          </a:lnRef>
+          <a:fillRef idx="0">
+            <a:schemeClr val="dk1"/>
+          </a:fillRef>
+          <a:effectRef idx="0">
+            <a:schemeClr val="dk1"/>
+          </a:effectRef>
+          <a:fontRef idx="minor">
+            <a:schemeClr val="tx1"/>
+          </a:fontRef>
+        </p:style>
+      </p:cxnSp>
+      <p:cxnSp>
+        <p:nvCxnSpPr>
+          <p:cNvPr id="31" name="직선 연결선 30">
+            <a:extLst>
+              <a:ext uri="{FF2B5EF4-FFF2-40B4-BE49-F238E27FC236}">
+                <a16:creationId xmlns:a16="http://schemas.microsoft.com/office/drawing/2014/main" id="{233583B9-D36C-42C5-8E41-C1476F68ADE0}"/>
+              </a:ext>
+            </a:extLst>
+          </p:cNvPr>
+          <p:cNvCxnSpPr>
+            <a:cxnSpLocks/>
+            <a:stCxn id="45" idx="7"/>
+            <a:endCxn id="42" idx="3"/>
+          </p:cNvCxnSpPr>
+          <p:nvPr/>
+        </p:nvCxnSpPr>
+        <p:spPr>
+          <a:xfrm flipV="1">
+            <a:off x="2232096" y="2167951"/>
+            <a:ext cx="1874602" cy="1664499"/>
+          </a:xfrm>
+          <a:prstGeom prst="line">
+            <a:avLst/>
+          </a:prstGeom>
+        </p:spPr>
+        <p:style>
+          <a:lnRef idx="1">
+            <a:schemeClr val="dk1"/>
+          </a:lnRef>
+          <a:fillRef idx="0">
+            <a:schemeClr val="dk1"/>
+          </a:fillRef>
+          <a:effectRef idx="0">
+            <a:schemeClr val="dk1"/>
+          </a:effectRef>
+          <a:fontRef idx="minor">
+            <a:schemeClr val="tx1"/>
+          </a:fontRef>
+        </p:style>
+      </p:cxnSp>
+      <p:sp>
+        <p:nvSpPr>
+          <p:cNvPr id="61" name="TextBox 60">
+            <a:extLst>
+              <a:ext uri="{FF2B5EF4-FFF2-40B4-BE49-F238E27FC236}">
+                <a16:creationId xmlns:a16="http://schemas.microsoft.com/office/drawing/2014/main" id="{09008758-47DF-4A32-A25F-AB98F1E83CA5}"/>
+              </a:ext>
+            </a:extLst>
+          </p:cNvPr>
+          <p:cNvSpPr txBox="1"/>
+          <p:nvPr/>
+        </p:nvSpPr>
+        <p:spPr>
+          <a:xfrm>
+            <a:off x="1936527" y="5040559"/>
+            <a:ext cx="2106667" cy="523220"/>
+          </a:xfrm>
+          <a:prstGeom prst="rect">
+            <a:avLst/>
+          </a:prstGeom>
+          <a:noFill/>
+        </p:spPr>
+        <p:txBody>
+          <a:bodyPr wrap="none" rtlCol="0">
+            <a:spAutoFit/>
+          </a:bodyPr>
+          <a:lstStyle/>
+          <a:p>
+            <a:r>
+              <a:rPr lang="ko-KR" altLang="en-US" sz="2800" dirty="0"/>
+              <a:t>단순 그래프</a:t>
+            </a:r>
+          </a:p>
+        </p:txBody>
+      </p:sp>
+      <p:sp>
+        <p:nvSpPr>
+          <p:cNvPr id="40" name="타원 39">
+            <a:extLst>
+              <a:ext uri="{FF2B5EF4-FFF2-40B4-BE49-F238E27FC236}">
+                <a16:creationId xmlns:a16="http://schemas.microsoft.com/office/drawing/2014/main" id="{59AA9F5B-F545-4DAD-9781-41EE9AD8B901}"/>
+              </a:ext>
+            </a:extLst>
+          </p:cNvPr>
+          <p:cNvSpPr/>
+          <p:nvPr/>
+        </p:nvSpPr>
+        <p:spPr>
+          <a:xfrm>
+            <a:off x="1640816" y="1600323"/>
+            <a:ext cx="692728" cy="665018"/>
+          </a:xfrm>
+          <a:prstGeom prst="ellipse">
+            <a:avLst/>
+          </a:prstGeom>
+          <a:noFill/>
+          <a:ln>
+            <a:solidFill>
+              <a:schemeClr val="tx1"/>
+            </a:solidFill>
+          </a:ln>
+        </p:spPr>
+        <p:style>
+          <a:lnRef idx="2">
+            <a:schemeClr val="accent1">
+              <a:shade val="50000"/>
+            </a:schemeClr>
+          </a:lnRef>
+          <a:fillRef idx="1">
+            <a:schemeClr val="accent1"/>
+          </a:fillRef>
+          <a:effectRef idx="0">
+            <a:schemeClr val="accent1"/>
+          </a:effectRef>
+          <a:fontRef idx="minor">
+            <a:schemeClr val="lt1"/>
+          </a:fontRef>
+        </p:style>
+        <p:txBody>
+          <a:bodyPr rtlCol="0" anchor="ctr"/>
+          <a:lstStyle/>
+          <a:p>
+            <a:pPr algn="ctr"/>
+            <a:r>
+              <a:rPr lang="en-US" altLang="ko-KR" sz="2800" dirty="0">
+                <a:solidFill>
+                  <a:schemeClr val="tx1"/>
+                </a:solidFill>
+              </a:rPr>
+              <a:t>1</a:t>
+            </a:r>
+            <a:endParaRPr lang="ko-KR" altLang="en-US" sz="2800" dirty="0">
+              <a:solidFill>
+                <a:schemeClr val="tx1"/>
+              </a:solidFill>
+            </a:endParaRPr>
+          </a:p>
+        </p:txBody>
+      </p:sp>
+      <p:sp>
+        <p:nvSpPr>
+          <p:cNvPr id="42" name="타원 41">
+            <a:extLst>
+              <a:ext uri="{FF2B5EF4-FFF2-40B4-BE49-F238E27FC236}">
+                <a16:creationId xmlns:a16="http://schemas.microsoft.com/office/drawing/2014/main" id="{2DACC6EA-123A-4502-A000-728E19B371FF}"/>
+              </a:ext>
+            </a:extLst>
+          </p:cNvPr>
+          <p:cNvSpPr/>
+          <p:nvPr/>
+        </p:nvSpPr>
+        <p:spPr>
+          <a:xfrm>
+            <a:off x="4005250" y="1600323"/>
+            <a:ext cx="692728" cy="665018"/>
+          </a:xfrm>
+          <a:prstGeom prst="ellipse">
+            <a:avLst/>
+          </a:prstGeom>
+          <a:noFill/>
+          <a:ln>
+            <a:solidFill>
+              <a:schemeClr val="tx1"/>
+            </a:solidFill>
+          </a:ln>
+        </p:spPr>
+        <p:style>
+          <a:lnRef idx="2">
+            <a:schemeClr val="accent1">
+              <a:shade val="50000"/>
+            </a:schemeClr>
+          </a:lnRef>
+          <a:fillRef idx="1">
+            <a:schemeClr val="accent1"/>
+          </a:fillRef>
+          <a:effectRef idx="0">
+            <a:schemeClr val="accent1"/>
+          </a:effectRef>
+          <a:fontRef idx="minor">
+            <a:schemeClr val="lt1"/>
+          </a:fontRef>
+        </p:style>
+        <p:txBody>
+          <a:bodyPr rtlCol="0" anchor="ctr"/>
+          <a:lstStyle/>
+          <a:p>
+            <a:pPr algn="ctr"/>
+            <a:r>
+              <a:rPr lang="en-US" altLang="ko-KR" sz="2800" dirty="0">
+                <a:solidFill>
+                  <a:schemeClr val="tx1"/>
+                </a:solidFill>
+              </a:rPr>
+              <a:t>2</a:t>
+            </a:r>
+            <a:endParaRPr lang="ko-KR" altLang="en-US" sz="2800" dirty="0">
+              <a:solidFill>
+                <a:schemeClr val="tx1"/>
+              </a:solidFill>
+            </a:endParaRPr>
+          </a:p>
+        </p:txBody>
+      </p:sp>
+      <p:sp>
+        <p:nvSpPr>
+          <p:cNvPr id="44" name="타원 43">
+            <a:extLst>
+              <a:ext uri="{FF2B5EF4-FFF2-40B4-BE49-F238E27FC236}">
+                <a16:creationId xmlns:a16="http://schemas.microsoft.com/office/drawing/2014/main" id="{FA83D091-BF1A-4C8A-ACFA-6D6B3D103CCC}"/>
+              </a:ext>
+            </a:extLst>
+          </p:cNvPr>
+          <p:cNvSpPr/>
+          <p:nvPr/>
+        </p:nvSpPr>
+        <p:spPr>
+          <a:xfrm>
+            <a:off x="4005250" y="3735060"/>
+            <a:ext cx="692728" cy="665018"/>
+          </a:xfrm>
+          <a:prstGeom prst="ellipse">
+            <a:avLst/>
+          </a:prstGeom>
+          <a:noFill/>
+          <a:ln>
+            <a:solidFill>
+              <a:schemeClr val="tx1"/>
+            </a:solidFill>
+          </a:ln>
+        </p:spPr>
+        <p:style>
+          <a:lnRef idx="2">
+            <a:schemeClr val="accent1">
+              <a:shade val="50000"/>
+            </a:schemeClr>
+          </a:lnRef>
+          <a:fillRef idx="1">
+            <a:schemeClr val="accent1"/>
+          </a:fillRef>
+          <a:effectRef idx="0">
+            <a:schemeClr val="accent1"/>
+          </a:effectRef>
+          <a:fontRef idx="minor">
+            <a:schemeClr val="lt1"/>
+          </a:fontRef>
+        </p:style>
+        <p:txBody>
+          <a:bodyPr rtlCol="0" anchor="ctr"/>
+          <a:lstStyle/>
+          <a:p>
+            <a:pPr algn="ctr"/>
+            <a:r>
+              <a:rPr lang="en-US" altLang="ko-KR" sz="2800" dirty="0">
+                <a:solidFill>
+                  <a:schemeClr val="tx1"/>
+                </a:solidFill>
+              </a:rPr>
+              <a:t>3</a:t>
+            </a:r>
+            <a:endParaRPr lang="ko-KR" altLang="en-US" sz="2800" dirty="0">
+              <a:solidFill>
+                <a:schemeClr val="tx1"/>
+              </a:solidFill>
+            </a:endParaRPr>
+          </a:p>
+        </p:txBody>
+      </p:sp>
+      <p:sp>
+        <p:nvSpPr>
+          <p:cNvPr id="45" name="타원 44">
+            <a:extLst>
+              <a:ext uri="{FF2B5EF4-FFF2-40B4-BE49-F238E27FC236}">
+                <a16:creationId xmlns:a16="http://schemas.microsoft.com/office/drawing/2014/main" id="{563D74F2-4303-49E1-8509-1DEFDE0B1B5B}"/>
+              </a:ext>
+            </a:extLst>
+          </p:cNvPr>
+          <p:cNvSpPr/>
+          <p:nvPr/>
+        </p:nvSpPr>
+        <p:spPr>
+          <a:xfrm>
+            <a:off x="1640816" y="3735060"/>
+            <a:ext cx="692728" cy="665018"/>
+          </a:xfrm>
+          <a:prstGeom prst="ellipse">
+            <a:avLst/>
+          </a:prstGeom>
+          <a:noFill/>
+          <a:ln>
+            <a:solidFill>
+              <a:schemeClr val="tx1"/>
+            </a:solidFill>
+          </a:ln>
+        </p:spPr>
+        <p:style>
+          <a:lnRef idx="2">
+            <a:schemeClr val="accent1">
+              <a:shade val="50000"/>
+            </a:schemeClr>
+          </a:lnRef>
+          <a:fillRef idx="1">
+            <a:schemeClr val="accent1"/>
+          </a:fillRef>
+          <a:effectRef idx="0">
+            <a:schemeClr val="accent1"/>
+          </a:effectRef>
+          <a:fontRef idx="minor">
+            <a:schemeClr val="lt1"/>
+          </a:fontRef>
+        </p:style>
+        <p:txBody>
+          <a:bodyPr rtlCol="0" anchor="ctr"/>
+          <a:lstStyle/>
+          <a:p>
+            <a:pPr algn="ctr"/>
+            <a:r>
+              <a:rPr lang="en-US" altLang="ko-KR" sz="2800" dirty="0">
+                <a:solidFill>
+                  <a:schemeClr val="tx1"/>
+                </a:solidFill>
+              </a:rPr>
+              <a:t>4</a:t>
+            </a:r>
+            <a:endParaRPr lang="ko-KR" altLang="en-US" sz="2800" dirty="0">
+              <a:solidFill>
+                <a:schemeClr val="tx1"/>
+              </a:solidFill>
+            </a:endParaRPr>
+          </a:p>
+        </p:txBody>
+      </p:sp>
+      <p:sp>
+        <p:nvSpPr>
+          <p:cNvPr id="54" name="원호 53">
+            <a:extLst>
+              <a:ext uri="{FF2B5EF4-FFF2-40B4-BE49-F238E27FC236}">
+                <a16:creationId xmlns:a16="http://schemas.microsoft.com/office/drawing/2014/main" id="{E5C06815-E4F9-4683-A3D4-80CBF456E4DC}"/>
+              </a:ext>
+            </a:extLst>
+          </p:cNvPr>
+          <p:cNvSpPr/>
+          <p:nvPr/>
+        </p:nvSpPr>
+        <p:spPr>
+          <a:xfrm>
+            <a:off x="1317696" y="1135992"/>
+            <a:ext cx="914400" cy="914400"/>
+          </a:xfrm>
+          <a:prstGeom prst="arc">
+            <a:avLst>
+              <a:gd name="adj1" fmla="val 6357855"/>
+              <a:gd name="adj2" fmla="val 597034"/>
+            </a:avLst>
+          </a:prstGeom>
+        </p:spPr>
+        <p:style>
+          <a:lnRef idx="1">
+            <a:schemeClr val="dk1"/>
+          </a:lnRef>
+          <a:fillRef idx="0">
+            <a:schemeClr val="dk1"/>
+          </a:fillRef>
+          <a:effectRef idx="0">
+            <a:schemeClr val="dk1"/>
+          </a:effectRef>
+          <a:fontRef idx="minor">
+            <a:schemeClr val="tx1"/>
+          </a:fontRef>
+        </p:style>
+        <p:txBody>
+          <a:bodyPr rtlCol="0" anchor="ctr"/>
+          <a:lstStyle/>
+          <a:p>
+            <a:pPr algn="ctr"/>
+            <a:endParaRPr lang="ko-KR" altLang="en-US"/>
+          </a:p>
+        </p:txBody>
+      </p:sp>
+      <p:cxnSp>
+        <p:nvCxnSpPr>
+          <p:cNvPr id="58" name="직선 연결선 57">
+            <a:extLst>
+              <a:ext uri="{FF2B5EF4-FFF2-40B4-BE49-F238E27FC236}">
+                <a16:creationId xmlns:a16="http://schemas.microsoft.com/office/drawing/2014/main" id="{7E9069B8-819D-46FD-A2A3-ED244CDD36B9}"/>
+              </a:ext>
+            </a:extLst>
+          </p:cNvPr>
+          <p:cNvCxnSpPr>
+            <a:cxnSpLocks/>
+            <a:stCxn id="66" idx="6"/>
+            <a:endCxn id="67" idx="2"/>
+          </p:cNvCxnSpPr>
+          <p:nvPr/>
+        </p:nvCxnSpPr>
+        <p:spPr>
+          <a:xfrm>
+            <a:off x="8319775" y="1932832"/>
+            <a:ext cx="1671706" cy="0"/>
+          </a:xfrm>
+          <a:prstGeom prst="line">
+            <a:avLst/>
+          </a:prstGeom>
+          <a:ln>
+            <a:headEnd type="none"/>
+            <a:tailEnd type="none"/>
+          </a:ln>
+        </p:spPr>
+        <p:style>
+          <a:lnRef idx="1">
+            <a:schemeClr val="dk1"/>
+          </a:lnRef>
+          <a:fillRef idx="0">
+            <a:schemeClr val="dk1"/>
+          </a:fillRef>
+          <a:effectRef idx="0">
+            <a:schemeClr val="dk1"/>
+          </a:effectRef>
+          <a:fontRef idx="minor">
+            <a:schemeClr val="tx1"/>
+          </a:fontRef>
+        </p:style>
+      </p:cxnSp>
+      <p:cxnSp>
+        <p:nvCxnSpPr>
+          <p:cNvPr id="59" name="직선 연결선 58">
+            <a:extLst>
+              <a:ext uri="{FF2B5EF4-FFF2-40B4-BE49-F238E27FC236}">
+                <a16:creationId xmlns:a16="http://schemas.microsoft.com/office/drawing/2014/main" id="{FAF223EF-FD0E-4A44-8B05-48AB496E9DB8}"/>
+              </a:ext>
+            </a:extLst>
+          </p:cNvPr>
+          <p:cNvCxnSpPr>
+            <a:cxnSpLocks/>
+            <a:stCxn id="69" idx="6"/>
+            <a:endCxn id="68" idx="2"/>
+          </p:cNvCxnSpPr>
+          <p:nvPr/>
+        </p:nvCxnSpPr>
+        <p:spPr>
+          <a:xfrm>
+            <a:off x="8319775" y="4067569"/>
+            <a:ext cx="1671706" cy="0"/>
+          </a:xfrm>
+          <a:prstGeom prst="line">
+            <a:avLst/>
+          </a:prstGeom>
+          <a:ln>
+            <a:headEnd type="none"/>
+            <a:tailEnd type="none"/>
+          </a:ln>
+        </p:spPr>
+        <p:style>
+          <a:lnRef idx="1">
+            <a:schemeClr val="dk1"/>
+          </a:lnRef>
+          <a:fillRef idx="0">
+            <a:schemeClr val="dk1"/>
+          </a:fillRef>
+          <a:effectRef idx="0">
+            <a:schemeClr val="dk1"/>
+          </a:effectRef>
+          <a:fontRef idx="minor">
+            <a:schemeClr val="tx1"/>
+          </a:fontRef>
+        </p:style>
+      </p:cxnSp>
+      <p:cxnSp>
+        <p:nvCxnSpPr>
+          <p:cNvPr id="60" name="직선 연결선 59">
+            <a:extLst>
+              <a:ext uri="{FF2B5EF4-FFF2-40B4-BE49-F238E27FC236}">
+                <a16:creationId xmlns:a16="http://schemas.microsoft.com/office/drawing/2014/main" id="{20C08349-A8F2-4C17-AE39-D8352BC8953E}"/>
+              </a:ext>
+            </a:extLst>
+          </p:cNvPr>
+          <p:cNvCxnSpPr>
+            <a:cxnSpLocks/>
+            <a:stCxn id="67" idx="4"/>
+            <a:endCxn id="68" idx="0"/>
+          </p:cNvCxnSpPr>
+          <p:nvPr/>
+        </p:nvCxnSpPr>
+        <p:spPr>
+          <a:xfrm>
+            <a:off x="10337845" y="2265341"/>
+            <a:ext cx="0" cy="1469719"/>
+          </a:xfrm>
+          <a:prstGeom prst="line">
+            <a:avLst/>
+          </a:prstGeom>
+          <a:ln>
+            <a:headEnd type="none"/>
+            <a:tailEnd type="none"/>
+          </a:ln>
+        </p:spPr>
+        <p:style>
+          <a:lnRef idx="1">
+            <a:schemeClr val="dk1"/>
+          </a:lnRef>
+          <a:fillRef idx="0">
+            <a:schemeClr val="dk1"/>
+          </a:fillRef>
+          <a:effectRef idx="0">
+            <a:schemeClr val="dk1"/>
+          </a:effectRef>
+          <a:fontRef idx="minor">
+            <a:schemeClr val="tx1"/>
+          </a:fontRef>
+        </p:style>
+      </p:cxnSp>
+      <p:sp>
+        <p:nvSpPr>
+          <p:cNvPr id="65" name="TextBox 64">
+            <a:extLst>
+              <a:ext uri="{FF2B5EF4-FFF2-40B4-BE49-F238E27FC236}">
+                <a16:creationId xmlns:a16="http://schemas.microsoft.com/office/drawing/2014/main" id="{38BC7381-AACA-48D5-B927-C55779C9E641}"/>
+              </a:ext>
+            </a:extLst>
+          </p:cNvPr>
+          <p:cNvSpPr txBox="1"/>
+          <p:nvPr/>
+        </p:nvSpPr>
+        <p:spPr>
+          <a:xfrm>
+            <a:off x="7373687" y="5040559"/>
+            <a:ext cx="3310522" cy="523220"/>
+          </a:xfrm>
+          <a:prstGeom prst="rect">
+            <a:avLst/>
+          </a:prstGeom>
+          <a:noFill/>
+        </p:spPr>
+        <p:txBody>
+          <a:bodyPr wrap="none" rtlCol="0">
+            <a:spAutoFit/>
+          </a:bodyPr>
+          <a:lstStyle/>
+          <a:p>
+            <a:r>
+              <a:rPr lang="ko-KR" altLang="en-US" sz="2800" dirty="0"/>
+              <a:t>단순 그래프가 아님</a:t>
+            </a:r>
+          </a:p>
+        </p:txBody>
+      </p:sp>
+      <p:sp>
+        <p:nvSpPr>
+          <p:cNvPr id="66" name="타원 65">
+            <a:extLst>
+              <a:ext uri="{FF2B5EF4-FFF2-40B4-BE49-F238E27FC236}">
+                <a16:creationId xmlns:a16="http://schemas.microsoft.com/office/drawing/2014/main" id="{ADDA561E-FEB7-45FE-96E3-101952CD9F61}"/>
+              </a:ext>
+            </a:extLst>
+          </p:cNvPr>
+          <p:cNvSpPr/>
+          <p:nvPr/>
+        </p:nvSpPr>
+        <p:spPr>
+          <a:xfrm>
+            <a:off x="7627047" y="1600323"/>
+            <a:ext cx="692728" cy="665018"/>
+          </a:xfrm>
+          <a:prstGeom prst="ellipse">
+            <a:avLst/>
+          </a:prstGeom>
+          <a:noFill/>
+          <a:ln>
+            <a:solidFill>
+              <a:schemeClr val="tx1"/>
+            </a:solidFill>
+          </a:ln>
+        </p:spPr>
+        <p:style>
+          <a:lnRef idx="2">
+            <a:schemeClr val="accent1">
+              <a:shade val="50000"/>
+            </a:schemeClr>
+          </a:lnRef>
+          <a:fillRef idx="1">
+            <a:schemeClr val="accent1"/>
+          </a:fillRef>
+          <a:effectRef idx="0">
+            <a:schemeClr val="accent1"/>
+          </a:effectRef>
+          <a:fontRef idx="minor">
+            <a:schemeClr val="lt1"/>
+          </a:fontRef>
+        </p:style>
+        <p:txBody>
+          <a:bodyPr rtlCol="0" anchor="ctr"/>
+          <a:lstStyle/>
+          <a:p>
+            <a:pPr algn="ctr"/>
+            <a:r>
+              <a:rPr lang="en-US" altLang="ko-KR" sz="2800" dirty="0">
+                <a:solidFill>
+                  <a:schemeClr val="tx1"/>
+                </a:solidFill>
+              </a:rPr>
+              <a:t>1</a:t>
+            </a:r>
+            <a:endParaRPr lang="ko-KR" altLang="en-US" sz="2800" dirty="0">
+              <a:solidFill>
+                <a:schemeClr val="tx1"/>
+              </a:solidFill>
+            </a:endParaRPr>
+          </a:p>
+        </p:txBody>
+      </p:sp>
+      <p:sp>
+        <p:nvSpPr>
+          <p:cNvPr id="67" name="타원 66">
+            <a:extLst>
+              <a:ext uri="{FF2B5EF4-FFF2-40B4-BE49-F238E27FC236}">
+                <a16:creationId xmlns:a16="http://schemas.microsoft.com/office/drawing/2014/main" id="{3027CAA9-4170-4406-A1B0-A6C6C2B92425}"/>
+              </a:ext>
+            </a:extLst>
+          </p:cNvPr>
+          <p:cNvSpPr/>
+          <p:nvPr/>
+        </p:nvSpPr>
+        <p:spPr>
+          <a:xfrm>
+            <a:off x="9991481" y="1600323"/>
+            <a:ext cx="692728" cy="665018"/>
+          </a:xfrm>
+          <a:prstGeom prst="ellipse">
+            <a:avLst/>
+          </a:prstGeom>
+          <a:noFill/>
+          <a:ln>
+            <a:solidFill>
+              <a:schemeClr val="tx1"/>
+            </a:solidFill>
+          </a:ln>
+        </p:spPr>
+        <p:style>
+          <a:lnRef idx="2">
+            <a:schemeClr val="accent1">
+              <a:shade val="50000"/>
+            </a:schemeClr>
+          </a:lnRef>
+          <a:fillRef idx="1">
+            <a:schemeClr val="accent1"/>
+          </a:fillRef>
+          <a:effectRef idx="0">
+            <a:schemeClr val="accent1"/>
+          </a:effectRef>
+          <a:fontRef idx="minor">
+            <a:schemeClr val="lt1"/>
+          </a:fontRef>
+        </p:style>
+        <p:txBody>
+          <a:bodyPr rtlCol="0" anchor="ctr"/>
+          <a:lstStyle/>
+          <a:p>
+            <a:pPr algn="ctr"/>
+            <a:r>
+              <a:rPr lang="en-US" altLang="ko-KR" sz="2800" dirty="0">
+                <a:solidFill>
+                  <a:schemeClr val="tx1"/>
+                </a:solidFill>
+              </a:rPr>
+              <a:t>2</a:t>
+            </a:r>
+            <a:endParaRPr lang="ko-KR" altLang="en-US" sz="2800" dirty="0">
+              <a:solidFill>
+                <a:schemeClr val="tx1"/>
+              </a:solidFill>
+            </a:endParaRPr>
+          </a:p>
+        </p:txBody>
+      </p:sp>
+      <p:sp>
+        <p:nvSpPr>
+          <p:cNvPr id="68" name="타원 67">
+            <a:extLst>
+              <a:ext uri="{FF2B5EF4-FFF2-40B4-BE49-F238E27FC236}">
+                <a16:creationId xmlns:a16="http://schemas.microsoft.com/office/drawing/2014/main" id="{4DF5901F-931B-4F61-B337-5A51226C74AE}"/>
+              </a:ext>
+            </a:extLst>
+          </p:cNvPr>
+          <p:cNvSpPr/>
+          <p:nvPr/>
+        </p:nvSpPr>
+        <p:spPr>
+          <a:xfrm>
+            <a:off x="9991481" y="3735060"/>
+            <a:ext cx="692728" cy="665018"/>
+          </a:xfrm>
+          <a:prstGeom prst="ellipse">
+            <a:avLst/>
+          </a:prstGeom>
+          <a:noFill/>
+          <a:ln>
+            <a:solidFill>
+              <a:schemeClr val="tx1"/>
+            </a:solidFill>
+          </a:ln>
+        </p:spPr>
+        <p:style>
+          <a:lnRef idx="2">
+            <a:schemeClr val="accent1">
+              <a:shade val="50000"/>
+            </a:schemeClr>
+          </a:lnRef>
+          <a:fillRef idx="1">
+            <a:schemeClr val="accent1"/>
+          </a:fillRef>
+          <a:effectRef idx="0">
+            <a:schemeClr val="accent1"/>
+          </a:effectRef>
+          <a:fontRef idx="minor">
+            <a:schemeClr val="lt1"/>
+          </a:fontRef>
+        </p:style>
+        <p:txBody>
+          <a:bodyPr rtlCol="0" anchor="ctr"/>
+          <a:lstStyle/>
+          <a:p>
+            <a:pPr algn="ctr"/>
+            <a:r>
+              <a:rPr lang="en-US" altLang="ko-KR" sz="2800" dirty="0">
+                <a:solidFill>
+                  <a:schemeClr val="tx1"/>
+                </a:solidFill>
+              </a:rPr>
+              <a:t>3</a:t>
+            </a:r>
+            <a:endParaRPr lang="ko-KR" altLang="en-US" sz="2800" dirty="0">
+              <a:solidFill>
+                <a:schemeClr val="tx1"/>
+              </a:solidFill>
+            </a:endParaRPr>
+          </a:p>
+        </p:txBody>
+      </p:sp>
+      <p:sp>
+        <p:nvSpPr>
+          <p:cNvPr id="69" name="타원 68">
+            <a:extLst>
+              <a:ext uri="{FF2B5EF4-FFF2-40B4-BE49-F238E27FC236}">
+                <a16:creationId xmlns:a16="http://schemas.microsoft.com/office/drawing/2014/main" id="{2CC24AC8-CD31-4007-B062-5D8B5D51282E}"/>
+              </a:ext>
+            </a:extLst>
+          </p:cNvPr>
+          <p:cNvSpPr/>
+          <p:nvPr/>
+        </p:nvSpPr>
+        <p:spPr>
+          <a:xfrm>
+            <a:off x="7627047" y="3735060"/>
+            <a:ext cx="692728" cy="665018"/>
+          </a:xfrm>
+          <a:prstGeom prst="ellipse">
+            <a:avLst/>
+          </a:prstGeom>
+          <a:noFill/>
+          <a:ln>
+            <a:solidFill>
+              <a:schemeClr val="tx1"/>
+            </a:solidFill>
+          </a:ln>
+        </p:spPr>
+        <p:style>
+          <a:lnRef idx="2">
+            <a:schemeClr val="accent1">
+              <a:shade val="50000"/>
+            </a:schemeClr>
+          </a:lnRef>
+          <a:fillRef idx="1">
+            <a:schemeClr val="accent1"/>
+          </a:fillRef>
+          <a:effectRef idx="0">
+            <a:schemeClr val="accent1"/>
+          </a:effectRef>
+          <a:fontRef idx="minor">
+            <a:schemeClr val="lt1"/>
+          </a:fontRef>
+        </p:style>
+        <p:txBody>
+          <a:bodyPr rtlCol="0" anchor="ctr"/>
+          <a:lstStyle/>
+          <a:p>
+            <a:pPr algn="ctr"/>
+            <a:r>
+              <a:rPr lang="en-US" altLang="ko-KR" sz="2800" dirty="0">
+                <a:solidFill>
+                  <a:schemeClr val="tx1"/>
+                </a:solidFill>
+              </a:rPr>
+              <a:t>4</a:t>
+            </a:r>
+            <a:endParaRPr lang="ko-KR" altLang="en-US" sz="2800" dirty="0">
+              <a:solidFill>
+                <a:schemeClr val="tx1"/>
+              </a:solidFill>
+            </a:endParaRPr>
+          </a:p>
+        </p:txBody>
+      </p:sp>
+      <p:sp>
+        <p:nvSpPr>
+          <p:cNvPr id="70" name="원호 69">
+            <a:extLst>
+              <a:ext uri="{FF2B5EF4-FFF2-40B4-BE49-F238E27FC236}">
+                <a16:creationId xmlns:a16="http://schemas.microsoft.com/office/drawing/2014/main" id="{87BE5BC2-0077-424F-B763-CA2FC5E59E2C}"/>
+              </a:ext>
+            </a:extLst>
+          </p:cNvPr>
+          <p:cNvSpPr/>
+          <p:nvPr/>
+        </p:nvSpPr>
+        <p:spPr>
+          <a:xfrm>
+            <a:off x="7303927" y="1135992"/>
+            <a:ext cx="914400" cy="914400"/>
+          </a:xfrm>
+          <a:prstGeom prst="arc">
+            <a:avLst>
+              <a:gd name="adj1" fmla="val 6357855"/>
+              <a:gd name="adj2" fmla="val 597034"/>
+            </a:avLst>
+          </a:prstGeom>
+          <a:ln>
+            <a:headEnd type="none"/>
+            <a:tailEnd type="none"/>
+          </a:ln>
+        </p:spPr>
+        <p:style>
+          <a:lnRef idx="1">
+            <a:schemeClr val="dk1"/>
+          </a:lnRef>
+          <a:fillRef idx="0">
+            <a:schemeClr val="dk1"/>
+          </a:fillRef>
+          <a:effectRef idx="0">
+            <a:schemeClr val="dk1"/>
+          </a:effectRef>
+          <a:fontRef idx="minor">
+            <a:schemeClr val="tx1"/>
+          </a:fontRef>
+        </p:style>
+        <p:txBody>
+          <a:bodyPr rtlCol="0" anchor="ctr"/>
+          <a:lstStyle/>
+          <a:p>
+            <a:pPr algn="ctr"/>
+            <a:endParaRPr lang="ko-KR" altLang="en-US"/>
+          </a:p>
+        </p:txBody>
+      </p:sp>
+      <p:cxnSp>
+        <p:nvCxnSpPr>
+          <p:cNvPr id="6" name="직선 연결선 5">
+            <a:extLst>
+              <a:ext uri="{FF2B5EF4-FFF2-40B4-BE49-F238E27FC236}">
+                <a16:creationId xmlns:a16="http://schemas.microsoft.com/office/drawing/2014/main" id="{C949A196-C92D-41BA-BF0C-8E33C0FA3143}"/>
+              </a:ext>
+            </a:extLst>
+          </p:cNvPr>
+          <p:cNvCxnSpPr>
+            <a:cxnSpLocks/>
+            <a:stCxn id="69" idx="7"/>
+          </p:cNvCxnSpPr>
+          <p:nvPr/>
+        </p:nvCxnSpPr>
+        <p:spPr>
+          <a:xfrm flipV="1">
+            <a:off x="8218327" y="2571888"/>
+            <a:ext cx="398884" cy="1260562"/>
+          </a:xfrm>
+          <a:prstGeom prst="line">
+            <a:avLst/>
+          </a:prstGeom>
+          <a:ln/>
+        </p:spPr>
+        <p:style>
+          <a:lnRef idx="1">
+            <a:schemeClr val="dk1"/>
+          </a:lnRef>
+          <a:fillRef idx="0">
+            <a:schemeClr val="dk1"/>
+          </a:fillRef>
+          <a:effectRef idx="0">
+            <a:schemeClr val="dk1"/>
+          </a:effectRef>
+          <a:fontRef idx="minor">
+            <a:schemeClr val="tx1"/>
+          </a:fontRef>
+        </p:style>
+      </p:cxnSp>
+      <p:cxnSp>
+        <p:nvCxnSpPr>
+          <p:cNvPr id="10" name="직선 연결선 9">
+            <a:extLst>
+              <a:ext uri="{FF2B5EF4-FFF2-40B4-BE49-F238E27FC236}">
+                <a16:creationId xmlns:a16="http://schemas.microsoft.com/office/drawing/2014/main" id="{51B3CB62-2A55-4367-A98D-AC4F0FD36D27}"/>
+              </a:ext>
+            </a:extLst>
+          </p:cNvPr>
+          <p:cNvCxnSpPr>
+            <a:cxnSpLocks/>
+            <a:endCxn id="67" idx="3"/>
+          </p:cNvCxnSpPr>
+          <p:nvPr/>
+        </p:nvCxnSpPr>
+        <p:spPr>
+          <a:xfrm flipV="1">
+            <a:off x="8617211" y="2167951"/>
+            <a:ext cx="1475718" cy="403937"/>
+          </a:xfrm>
+          <a:prstGeom prst="line">
+            <a:avLst/>
+          </a:prstGeom>
+        </p:spPr>
+        <p:style>
+          <a:lnRef idx="1">
+            <a:schemeClr val="dk1"/>
+          </a:lnRef>
+          <a:fillRef idx="0">
+            <a:schemeClr val="dk1"/>
+          </a:fillRef>
+          <a:effectRef idx="0">
+            <a:schemeClr val="dk1"/>
+          </a:effectRef>
+          <a:fontRef idx="minor">
+            <a:schemeClr val="tx1"/>
+          </a:fontRef>
+        </p:style>
+      </p:cxnSp>
+      <p:cxnSp>
+        <p:nvCxnSpPr>
+          <p:cNvPr id="14" name="직선 연결선 13">
+            <a:extLst>
+              <a:ext uri="{FF2B5EF4-FFF2-40B4-BE49-F238E27FC236}">
+                <a16:creationId xmlns:a16="http://schemas.microsoft.com/office/drawing/2014/main" id="{C7C4162D-E879-432E-9C4D-76DCCC060AA1}"/>
+              </a:ext>
+            </a:extLst>
+          </p:cNvPr>
+          <p:cNvCxnSpPr>
+            <a:cxnSpLocks/>
+            <a:stCxn id="69" idx="7"/>
+          </p:cNvCxnSpPr>
+          <p:nvPr/>
+        </p:nvCxnSpPr>
+        <p:spPr>
+          <a:xfrm flipV="1">
+            <a:off x="8218327" y="3520111"/>
+            <a:ext cx="1426791" cy="312339"/>
+          </a:xfrm>
+          <a:prstGeom prst="line">
+            <a:avLst/>
+          </a:prstGeom>
+        </p:spPr>
+        <p:style>
+          <a:lnRef idx="1">
+            <a:schemeClr val="dk1"/>
+          </a:lnRef>
+          <a:fillRef idx="0">
+            <a:schemeClr val="dk1"/>
+          </a:fillRef>
+          <a:effectRef idx="0">
+            <a:schemeClr val="dk1"/>
+          </a:effectRef>
+          <a:fontRef idx="minor">
+            <a:schemeClr val="tx1"/>
+          </a:fontRef>
+        </p:style>
+      </p:cxnSp>
+      <p:cxnSp>
+        <p:nvCxnSpPr>
+          <p:cNvPr id="16" name="직선 연결선 15">
+            <a:extLst>
+              <a:ext uri="{FF2B5EF4-FFF2-40B4-BE49-F238E27FC236}">
+                <a16:creationId xmlns:a16="http://schemas.microsoft.com/office/drawing/2014/main" id="{884FC7D2-1742-4E45-A539-AE04A931761A}"/>
+              </a:ext>
+            </a:extLst>
+          </p:cNvPr>
+          <p:cNvCxnSpPr>
+            <a:cxnSpLocks/>
+            <a:endCxn id="67" idx="3"/>
+          </p:cNvCxnSpPr>
+          <p:nvPr/>
+        </p:nvCxnSpPr>
+        <p:spPr>
+          <a:xfrm flipV="1">
+            <a:off x="9645118" y="2167951"/>
+            <a:ext cx="447811" cy="1352160"/>
+          </a:xfrm>
+          <a:prstGeom prst="line">
+            <a:avLst/>
+          </a:prstGeom>
+        </p:spPr>
+        <p:style>
+          <a:lnRef idx="1">
+            <a:schemeClr val="dk1"/>
+          </a:lnRef>
+          <a:fillRef idx="0">
+            <a:schemeClr val="dk1"/>
+          </a:fillRef>
+          <a:effectRef idx="0">
+            <a:schemeClr val="dk1"/>
+          </a:effectRef>
+          <a:fontRef idx="minor">
+            <a:schemeClr val="tx1"/>
+          </a:fontRef>
+        </p:style>
+      </p:cxnSp>
+    </p:spTree>
+    <p:extLst>
+      <p:ext uri="{BB962C8B-B14F-4D97-AF65-F5344CB8AC3E}">
+        <p14:creationId xmlns:p14="http://schemas.microsoft.com/office/powerpoint/2010/main" val="1628062674"/>
       </p:ext>
     </p:extLst>
   </p:cSld>

</xml_diff>